<commit_message>
Dynamic view - RuleManager
</commit_message>
<xml_diff>
--- a/doc/dynamic view.pptx
+++ b/doc/dynamic view.pptx
@@ -109,17 +109,16 @@
   </p:defaultTextStyle>
   <p:extLst>
     <p:ext uri="{521415D9-36F7-43E2-AB2F-B90AF26B5E84}">
-      <p14:sectionLst xmlns:p14="http://schemas.microsoft.com/office/powerpoint/2010/main" xmlns="">
+      <p14:sectionLst xmlns:p14="http://schemas.microsoft.com/office/powerpoint/2010/main">
         <p14:section name="기본 구역" id="{8842BCD3-E84E-4C92-B413-F11C840B25B4}">
           <p14:sldIdLst>
-            <p14:sldId id="307"/>
             <p14:sldId id="308"/>
           </p14:sldIdLst>
         </p14:section>
       </p14:sectionLst>
     </p:ext>
     <p:ext uri="{EFAFB233-063F-42B5-8137-9DF3F51BA10A}">
-      <p15:sldGuideLst xmlns:p15="http://schemas.microsoft.com/office/powerpoint/2012/main" xmlns="">
+      <p15:sldGuideLst xmlns="" xmlns:p15="http://schemas.microsoft.com/office/powerpoint/2012/main">
         <p15:guide id="1" orient="horz" pos="527">
           <p15:clr>
             <a:srgbClr val="A4A3A4"/>
@@ -148,7 +147,7 @@
       </p15:sldGuideLst>
     </p:ext>
     <p:ext uri="{2D200454-40CA-4A62-9FC3-DE9A4176ACB9}">
-      <p15:notesGuideLst xmlns:p15="http://schemas.microsoft.com/office/powerpoint/2012/main" xmlns="">
+      <p15:notesGuideLst xmlns="" xmlns:p15="http://schemas.microsoft.com/office/powerpoint/2012/main">
         <p15:guide id="1" orient="horz" pos="2879">
           <p15:clr>
             <a:srgbClr val="A4A3A4"/>
@@ -263,7 +262,7 @@
               <a:pPr lvl="0">
                 <a:defRPr lang="ko-KR" altLang="en-US"/>
               </a:pPr>
-              <a:t>2015-06-16</a:t>
+              <a:t>2015-06-17</a:t>
             </a:fld>
             <a:endParaRPr lang="ko-KR" altLang="en-US"/>
           </a:p>
@@ -452,7 +451,7 @@
     </p:spTree>
     <p:extLst>
       <p:ext uri="{BB962C8B-B14F-4D97-AF65-F5344CB8AC3E}">
-        <p14:creationId xmlns:p14="http://schemas.microsoft.com/office/powerpoint/2010/main" xmlns="" val="222442409"/>
+        <p14:creationId xmlns:p14="http://schemas.microsoft.com/office/powerpoint/2010/main" val="222442409"/>
       </p:ext>
     </p:extLst>
   </p:cSld>
@@ -633,7 +632,7 @@
     </p:spTree>
     <p:extLst>
       <p:ext uri="{BB962C8B-B14F-4D97-AF65-F5344CB8AC3E}">
-        <p14:creationId xmlns:p14="http://schemas.microsoft.com/office/powerpoint/2010/main" xmlns="" val="2504396503"/>
+        <p14:creationId xmlns:p14="http://schemas.microsoft.com/office/powerpoint/2010/main" val="2504396503"/>
       </p:ext>
     </p:extLst>
   </p:cSld>
@@ -672,7 +671,7 @@
           <a:blip r:embed="rId3" cstate="print">
             <a:extLst>
               <a:ext uri="{28A0092B-C50C-407E-A947-70E740481C1C}">
-                <a14:useLocalDpi xmlns:a14="http://schemas.microsoft.com/office/drawing/2010/main" xmlns="" val="0"/>
+                <a14:useLocalDpi xmlns:a14="http://schemas.microsoft.com/office/drawing/2010/main" val="0"/>
               </a:ext>
             </a:extLst>
           </a:blip>
@@ -692,7 +691,7 @@
           <a:noFill/>
           <a:extLst>
             <a:ext uri="{909E8E84-426E-40DD-AFC4-6F175D3DCCD1}">
-              <a14:hiddenFill xmlns:a14="http://schemas.microsoft.com/office/drawing/2010/main" xmlns="">
+              <a14:hiddenFill xmlns:a14="http://schemas.microsoft.com/office/drawing/2010/main">
                 <a:solidFill>
                   <a:srgbClr val="FFFFFF"/>
                 </a:solidFill>
@@ -868,7 +867,7 @@
     </p:spTree>
     <p:extLst>
       <p:ext uri="{BB962C8B-B14F-4D97-AF65-F5344CB8AC3E}">
-        <p14:creationId xmlns:p14="http://schemas.microsoft.com/office/powerpoint/2010/main" xmlns="" val="3710351474"/>
+        <p14:creationId xmlns:p14="http://schemas.microsoft.com/office/powerpoint/2010/main" val="3710351474"/>
       </p:ext>
     </p:extLst>
   </p:cSld>
@@ -1048,7 +1047,7 @@
     </p:spTree>
     <p:extLst>
       <p:ext uri="{BB962C8B-B14F-4D97-AF65-F5344CB8AC3E}">
-        <p14:creationId xmlns:p14="http://schemas.microsoft.com/office/powerpoint/2010/main" xmlns="" val="649258608"/>
+        <p14:creationId xmlns:p14="http://schemas.microsoft.com/office/powerpoint/2010/main" val="649258608"/>
       </p:ext>
     </p:extLst>
   </p:cSld>
@@ -1297,7 +1296,7 @@
           <a:blip r:embed="rId5" cstate="print">
             <a:extLst>
               <a:ext uri="{28A0092B-C50C-407E-A947-70E740481C1C}">
-                <a14:useLocalDpi xmlns:a14="http://schemas.microsoft.com/office/drawing/2010/main" xmlns="" val="0"/>
+                <a14:useLocalDpi xmlns:a14="http://schemas.microsoft.com/office/drawing/2010/main" val="0"/>
               </a:ext>
             </a:extLst>
           </a:blip>
@@ -1317,7 +1316,7 @@
           <a:noFill/>
           <a:extLst>
             <a:ext uri="{909E8E84-426E-40DD-AFC4-6F175D3DCCD1}">
-              <a14:hiddenFill xmlns:a14="http://schemas.microsoft.com/office/drawing/2010/main" xmlns="">
+              <a14:hiddenFill xmlns:a14="http://schemas.microsoft.com/office/drawing/2010/main">
                 <a:solidFill>
                   <a:srgbClr val="FFFFFF"/>
                 </a:solidFill>
@@ -1329,7 +1328,7 @@
     </p:spTree>
     <p:extLst>
       <p:ext uri="{BB962C8B-B14F-4D97-AF65-F5344CB8AC3E}">
-        <p14:creationId xmlns:p14="http://schemas.microsoft.com/office/powerpoint/2010/main" xmlns="" val="117676409"/>
+        <p14:creationId xmlns:p14="http://schemas.microsoft.com/office/powerpoint/2010/main" val="117676409"/>
       </p:ext>
     </p:extLst>
   </p:cSld>
@@ -1753,11 +1752,7 @@
           <a:p>
             <a:r>
               <a:rPr lang="en-US" altLang="ko-KR" dirty="0" smtClean="0"/>
-              <a:t>5.3 Dynamic </a:t>
-            </a:r>
-            <a:r>
-              <a:rPr lang="en-US" altLang="ko-KR" dirty="0" smtClean="0"/>
-              <a:t>View</a:t>
+              <a:t>5.3 Dynamic View</a:t>
             </a:r>
             <a:endParaRPr lang="ko-KR" altLang="en-US" dirty="0"/>
           </a:p>
@@ -2191,14 +2186,14 @@
       </p:sp>
       <p:sp>
         <p:nvSpPr>
-          <p:cNvPr id="24" name="원통 23"/>
-          <p:cNvSpPr/>
-          <p:nvPr/>
-        </p:nvSpPr>
-        <p:spPr>
-          <a:xfrm>
-            <a:off x="4860032" y="1124744"/>
-            <a:ext cx="648072" cy="432048"/>
+          <p:cNvPr id="25" name="원통 24"/>
+          <p:cNvSpPr/>
+          <p:nvPr/>
+        </p:nvSpPr>
+        <p:spPr>
+          <a:xfrm>
+            <a:off x="827584" y="1556792"/>
+            <a:ext cx="792088" cy="576064"/>
           </a:xfrm>
           <a:prstGeom prst="can">
             <a:avLst/>
@@ -2241,7 +2236,7 @@
                   <a:schemeClr val="bg1"/>
                 </a:solidFill>
               </a:rPr>
-              <a:t>Rule set</a:t>
+              <a:t>User</a:t>
             </a:r>
           </a:p>
           <a:p>
@@ -2264,13 +2259,13 @@
       </p:sp>
       <p:sp>
         <p:nvSpPr>
-          <p:cNvPr id="25" name="원통 24"/>
-          <p:cNvSpPr/>
-          <p:nvPr/>
-        </p:nvSpPr>
-        <p:spPr>
-          <a:xfrm>
-            <a:off x="827584" y="1556792"/>
+          <p:cNvPr id="26" name="원통 25"/>
+          <p:cNvSpPr/>
+          <p:nvPr/>
+        </p:nvSpPr>
+        <p:spPr>
+          <a:xfrm>
+            <a:off x="3059832" y="1556792"/>
             <a:ext cx="792088" cy="576064"/>
           </a:xfrm>
           <a:prstGeom prst="can">
@@ -2314,7 +2309,7 @@
                   <a:schemeClr val="bg1"/>
                 </a:solidFill>
               </a:rPr>
-              <a:t>User</a:t>
+              <a:t>Log</a:t>
             </a:r>
           </a:p>
           <a:p>
@@ -2337,79 +2332,6 @@
       </p:sp>
       <p:sp>
         <p:nvSpPr>
-          <p:cNvPr id="26" name="원통 25"/>
-          <p:cNvSpPr/>
-          <p:nvPr/>
-        </p:nvSpPr>
-        <p:spPr>
-          <a:xfrm>
-            <a:off x="3059832" y="1556792"/>
-            <a:ext cx="792088" cy="576064"/>
-          </a:xfrm>
-          <a:prstGeom prst="can">
-            <a:avLst/>
-          </a:prstGeom>
-          <a:solidFill>
-            <a:schemeClr val="tx1">
-              <a:lumMod val="85000"/>
-            </a:schemeClr>
-          </a:solidFill>
-          <a:ln w="6350">
-            <a:solidFill>
-              <a:schemeClr val="bg1"/>
-            </a:solidFill>
-          </a:ln>
-        </p:spPr>
-        <p:style>
-          <a:lnRef idx="2">
-            <a:schemeClr val="accent1">
-              <a:shade val="50000"/>
-            </a:schemeClr>
-          </a:lnRef>
-          <a:fillRef idx="1">
-            <a:schemeClr val="accent1"/>
-          </a:fillRef>
-          <a:effectRef idx="0">
-            <a:schemeClr val="accent1"/>
-          </a:effectRef>
-          <a:fontRef idx="minor">
-            <a:schemeClr val="lt1"/>
-          </a:fontRef>
-        </p:style>
-        <p:txBody>
-          <a:bodyPr rtlCol="0" anchor="ctr"/>
-          <a:lstStyle/>
-          <a:p>
-            <a:pPr algn="ctr"/>
-            <a:r>
-              <a:rPr lang="en-US" altLang="ko-KR" sz="1000" dirty="0" smtClean="0">
-                <a:solidFill>
-                  <a:schemeClr val="bg1"/>
-                </a:solidFill>
-              </a:rPr>
-              <a:t>Log</a:t>
-            </a:r>
-          </a:p>
-          <a:p>
-            <a:pPr algn="ctr"/>
-            <a:r>
-              <a:rPr lang="en-US" altLang="ko-KR" sz="1000" dirty="0" smtClean="0">
-                <a:solidFill>
-                  <a:schemeClr val="bg1"/>
-                </a:solidFill>
-              </a:rPr>
-              <a:t>DB</a:t>
-            </a:r>
-            <a:endParaRPr lang="ko-KR" altLang="en-US" sz="1000" dirty="0">
-              <a:solidFill>
-                <a:schemeClr val="bg1"/>
-              </a:solidFill>
-            </a:endParaRPr>
-          </a:p>
-        </p:txBody>
-      </p:sp>
-      <p:sp>
-        <p:nvSpPr>
           <p:cNvPr id="45" name="직사각형 44"/>
           <p:cNvSpPr/>
           <p:nvPr/>
@@ -2815,50 +2737,6 @@
       </p:sp>
       <p:sp>
         <p:nvSpPr>
-          <p:cNvPr id="136" name="직사각형 135"/>
-          <p:cNvSpPr/>
-          <p:nvPr/>
-        </p:nvSpPr>
-        <p:spPr>
-          <a:xfrm>
-            <a:off x="4572000" y="3284984"/>
-            <a:ext cx="72008" cy="72008"/>
-          </a:xfrm>
-          <a:prstGeom prst="rect">
-            <a:avLst/>
-          </a:prstGeom>
-          <a:noFill/>
-          <a:ln>
-            <a:noFill/>
-          </a:ln>
-        </p:spPr>
-        <p:style>
-          <a:lnRef idx="2">
-            <a:schemeClr val="accent1">
-              <a:shade val="50000"/>
-            </a:schemeClr>
-          </a:lnRef>
-          <a:fillRef idx="1">
-            <a:schemeClr val="accent1"/>
-          </a:fillRef>
-          <a:effectRef idx="0">
-            <a:schemeClr val="accent1"/>
-          </a:effectRef>
-          <a:fontRef idx="minor">
-            <a:schemeClr val="lt1"/>
-          </a:fontRef>
-        </p:style>
-        <p:txBody>
-          <a:bodyPr rtlCol="0" anchor="ctr"/>
-          <a:lstStyle/>
-          <a:p>
-            <a:pPr algn="ctr"/>
-            <a:endParaRPr lang="ko-KR" altLang="en-US"/>
-          </a:p>
-        </p:txBody>
-      </p:sp>
-      <p:sp>
-        <p:nvSpPr>
           <p:cNvPr id="143" name="직사각형 142"/>
           <p:cNvSpPr/>
           <p:nvPr/>
@@ -3649,38 +3527,6 @@
           </a:p>
         </p:txBody>
       </p:sp>
-      <p:cxnSp>
-        <p:nvCxnSpPr>
-          <p:cNvPr id="217" name="꺾인 연결선 216"/>
-          <p:cNvCxnSpPr/>
-          <p:nvPr/>
-        </p:nvCxnSpPr>
-        <p:spPr>
-          <a:xfrm rot="5400000" flipH="1" flipV="1">
-            <a:off x="4788024" y="2096852"/>
-            <a:ext cx="72008" cy="12700"/>
-          </a:xfrm>
-          <a:prstGeom prst="bentConnector3">
-            <a:avLst>
-              <a:gd name="adj1" fmla="val 50000"/>
-            </a:avLst>
-          </a:prstGeom>
-        </p:spPr>
-        <p:style>
-          <a:lnRef idx="1">
-            <a:schemeClr val="accent1"/>
-          </a:lnRef>
-          <a:fillRef idx="0">
-            <a:schemeClr val="accent1"/>
-          </a:fillRef>
-          <a:effectRef idx="0">
-            <a:schemeClr val="accent1"/>
-          </a:effectRef>
-          <a:fontRef idx="minor">
-            <a:schemeClr val="tx1"/>
-          </a:fontRef>
-        </p:style>
-      </p:cxnSp>
       <p:sp>
         <p:nvSpPr>
           <p:cNvPr id="221" name="직사각형 220"/>
@@ -5849,488 +5695,6 @@
       </p:sp>
       <p:sp>
         <p:nvSpPr>
-          <p:cNvPr id="374" name="직사각형 373"/>
-          <p:cNvSpPr/>
-          <p:nvPr/>
-        </p:nvSpPr>
-        <p:spPr>
-          <a:xfrm>
-            <a:off x="4860032" y="1700808"/>
-            <a:ext cx="648072" cy="648072"/>
-          </a:xfrm>
-          <a:prstGeom prst="rect">
-            <a:avLst/>
-          </a:prstGeom>
-          <a:solidFill>
-            <a:schemeClr val="tx1">
-              <a:lumMod val="85000"/>
-            </a:schemeClr>
-          </a:solidFill>
-          <a:ln w="6350">
-            <a:solidFill>
-              <a:schemeClr val="bg1"/>
-            </a:solidFill>
-          </a:ln>
-        </p:spPr>
-        <p:style>
-          <a:lnRef idx="2">
-            <a:schemeClr val="accent1">
-              <a:shade val="50000"/>
-            </a:schemeClr>
-          </a:lnRef>
-          <a:fillRef idx="1">
-            <a:schemeClr val="accent1"/>
-          </a:fillRef>
-          <a:effectRef idx="0">
-            <a:schemeClr val="accent1"/>
-          </a:effectRef>
-          <a:fontRef idx="minor">
-            <a:schemeClr val="lt1"/>
-          </a:fontRef>
-        </p:style>
-        <p:txBody>
-          <a:bodyPr rtlCol="0" anchor="ctr"/>
-          <a:lstStyle/>
-          <a:p>
-            <a:pPr algn="ctr"/>
-            <a:r>
-              <a:rPr lang="en-US" altLang="ko-KR" sz="1000" dirty="0" smtClean="0">
-                <a:solidFill>
-                  <a:schemeClr val="bg1"/>
-                </a:solidFill>
-              </a:rPr>
-              <a:t>Rule </a:t>
-            </a:r>
-          </a:p>
-          <a:p>
-            <a:pPr algn="ctr"/>
-            <a:r>
-              <a:rPr lang="en-US" altLang="ko-KR" sz="1000" dirty="0" smtClean="0">
-                <a:solidFill>
-                  <a:schemeClr val="bg1"/>
-                </a:solidFill>
-              </a:rPr>
-              <a:t>Set</a:t>
-            </a:r>
-            <a:endParaRPr lang="ko-KR" altLang="en-US" sz="1000" dirty="0">
-              <a:solidFill>
-                <a:schemeClr val="bg1"/>
-              </a:solidFill>
-            </a:endParaRPr>
-          </a:p>
-        </p:txBody>
-      </p:sp>
-      <p:sp>
-        <p:nvSpPr>
-          <p:cNvPr id="394" name="직사각형 393"/>
-          <p:cNvSpPr/>
-          <p:nvPr/>
-        </p:nvSpPr>
-        <p:spPr>
-          <a:xfrm>
-            <a:off x="5652120" y="2204864"/>
-            <a:ext cx="504056" cy="144016"/>
-          </a:xfrm>
-          <a:prstGeom prst="rect">
-            <a:avLst/>
-          </a:prstGeom>
-          <a:solidFill>
-            <a:schemeClr val="accent6">
-              <a:lumMod val="60000"/>
-              <a:lumOff val="40000"/>
-            </a:schemeClr>
-          </a:solidFill>
-          <a:ln w="6350">
-            <a:solidFill>
-              <a:schemeClr val="bg1"/>
-            </a:solidFill>
-          </a:ln>
-        </p:spPr>
-        <p:style>
-          <a:lnRef idx="2">
-            <a:schemeClr val="accent1">
-              <a:shade val="50000"/>
-            </a:schemeClr>
-          </a:lnRef>
-          <a:fillRef idx="1">
-            <a:schemeClr val="accent1"/>
-          </a:fillRef>
-          <a:effectRef idx="0">
-            <a:schemeClr val="accent1"/>
-          </a:effectRef>
-          <a:fontRef idx="minor">
-            <a:schemeClr val="lt1"/>
-          </a:fontRef>
-        </p:style>
-        <p:txBody>
-          <a:bodyPr rtlCol="0" anchor="ctr"/>
-          <a:lstStyle/>
-          <a:p>
-            <a:pPr algn="ctr"/>
-            <a:r>
-              <a:rPr lang="en-US" altLang="ko-KR" sz="800" dirty="0" smtClean="0">
-                <a:solidFill>
-                  <a:schemeClr val="bg1"/>
-                </a:solidFill>
-              </a:rPr>
-              <a:t>state</a:t>
-            </a:r>
-            <a:endParaRPr lang="ko-KR" altLang="en-US" sz="800" dirty="0">
-              <a:solidFill>
-                <a:schemeClr val="bg1"/>
-              </a:solidFill>
-            </a:endParaRPr>
-          </a:p>
-        </p:txBody>
-      </p:sp>
-      <p:sp>
-        <p:nvSpPr>
-          <p:cNvPr id="395" name="직사각형 394"/>
-          <p:cNvSpPr/>
-          <p:nvPr/>
-        </p:nvSpPr>
-        <p:spPr>
-          <a:xfrm>
-            <a:off x="6228184" y="2204864"/>
-            <a:ext cx="504056" cy="144016"/>
-          </a:xfrm>
-          <a:prstGeom prst="rect">
-            <a:avLst/>
-          </a:prstGeom>
-          <a:solidFill>
-            <a:schemeClr val="accent6">
-              <a:lumMod val="60000"/>
-              <a:lumOff val="40000"/>
-            </a:schemeClr>
-          </a:solidFill>
-          <a:ln w="6350">
-            <a:solidFill>
-              <a:schemeClr val="bg1"/>
-            </a:solidFill>
-          </a:ln>
-        </p:spPr>
-        <p:style>
-          <a:lnRef idx="2">
-            <a:schemeClr val="accent1">
-              <a:shade val="50000"/>
-            </a:schemeClr>
-          </a:lnRef>
-          <a:fillRef idx="1">
-            <a:schemeClr val="accent1"/>
-          </a:fillRef>
-          <a:effectRef idx="0">
-            <a:schemeClr val="accent1"/>
-          </a:effectRef>
-          <a:fontRef idx="minor">
-            <a:schemeClr val="lt1"/>
-          </a:fontRef>
-        </p:style>
-        <p:txBody>
-          <a:bodyPr rtlCol="0" anchor="ctr"/>
-          <a:lstStyle/>
-          <a:p>
-            <a:pPr algn="ctr"/>
-            <a:r>
-              <a:rPr lang="en-US" altLang="ko-KR" sz="800" dirty="0" smtClean="0">
-                <a:solidFill>
-                  <a:schemeClr val="bg1"/>
-                </a:solidFill>
-              </a:rPr>
-              <a:t>node</a:t>
-            </a:r>
-            <a:endParaRPr lang="ko-KR" altLang="en-US" sz="800" dirty="0">
-              <a:solidFill>
-                <a:schemeClr val="bg1"/>
-              </a:solidFill>
-            </a:endParaRPr>
-          </a:p>
-        </p:txBody>
-      </p:sp>
-      <p:sp>
-        <p:nvSpPr>
-          <p:cNvPr id="396" name="직사각형 395"/>
-          <p:cNvSpPr/>
-          <p:nvPr/>
-        </p:nvSpPr>
-        <p:spPr>
-          <a:xfrm>
-            <a:off x="6804248" y="2204864"/>
-            <a:ext cx="504056" cy="144016"/>
-          </a:xfrm>
-          <a:prstGeom prst="rect">
-            <a:avLst/>
-          </a:prstGeom>
-          <a:solidFill>
-            <a:schemeClr val="accent6">
-              <a:lumMod val="60000"/>
-              <a:lumOff val="40000"/>
-            </a:schemeClr>
-          </a:solidFill>
-          <a:ln w="6350">
-            <a:solidFill>
-              <a:schemeClr val="bg1"/>
-            </a:solidFill>
-          </a:ln>
-        </p:spPr>
-        <p:style>
-          <a:lnRef idx="2">
-            <a:schemeClr val="accent1">
-              <a:shade val="50000"/>
-            </a:schemeClr>
-          </a:lnRef>
-          <a:fillRef idx="1">
-            <a:schemeClr val="accent1"/>
-          </a:fillRef>
-          <a:effectRef idx="0">
-            <a:schemeClr val="accent1"/>
-          </a:effectRef>
-          <a:fontRef idx="minor">
-            <a:schemeClr val="lt1"/>
-          </a:fontRef>
-        </p:style>
-        <p:txBody>
-          <a:bodyPr rtlCol="0" anchor="ctr"/>
-          <a:lstStyle/>
-          <a:p>
-            <a:pPr algn="ctr"/>
-            <a:r>
-              <a:rPr lang="en-US" altLang="ko-KR" sz="800" dirty="0" smtClean="0">
-                <a:solidFill>
-                  <a:schemeClr val="bg1"/>
-                </a:solidFill>
-              </a:rPr>
-              <a:t>rule</a:t>
-            </a:r>
-            <a:endParaRPr lang="ko-KR" altLang="en-US" sz="800" dirty="0">
-              <a:solidFill>
-                <a:schemeClr val="bg1"/>
-              </a:solidFill>
-            </a:endParaRPr>
-          </a:p>
-        </p:txBody>
-      </p:sp>
-      <p:sp>
-        <p:nvSpPr>
-          <p:cNvPr id="397" name="직사각형 396"/>
-          <p:cNvSpPr/>
-          <p:nvPr/>
-        </p:nvSpPr>
-        <p:spPr>
-          <a:xfrm>
-            <a:off x="7380312" y="2204864"/>
-            <a:ext cx="504056" cy="144016"/>
-          </a:xfrm>
-          <a:prstGeom prst="rect">
-            <a:avLst/>
-          </a:prstGeom>
-          <a:solidFill>
-            <a:schemeClr val="accent6">
-              <a:lumMod val="60000"/>
-              <a:lumOff val="40000"/>
-            </a:schemeClr>
-          </a:solidFill>
-          <a:ln w="6350">
-            <a:solidFill>
-              <a:schemeClr val="bg1"/>
-            </a:solidFill>
-          </a:ln>
-        </p:spPr>
-        <p:style>
-          <a:lnRef idx="2">
-            <a:schemeClr val="accent1">
-              <a:shade val="50000"/>
-            </a:schemeClr>
-          </a:lnRef>
-          <a:fillRef idx="1">
-            <a:schemeClr val="accent1"/>
-          </a:fillRef>
-          <a:effectRef idx="0">
-            <a:schemeClr val="accent1"/>
-          </a:effectRef>
-          <a:fontRef idx="minor">
-            <a:schemeClr val="lt1"/>
-          </a:fontRef>
-        </p:style>
-        <p:txBody>
-          <a:bodyPr rtlCol="0" anchor="ctr"/>
-          <a:lstStyle/>
-          <a:p>
-            <a:pPr algn="ctr"/>
-            <a:r>
-              <a:rPr lang="en-US" altLang="ko-KR" sz="800" dirty="0" smtClean="0">
-                <a:solidFill>
-                  <a:schemeClr val="bg1"/>
-                </a:solidFill>
-              </a:rPr>
-              <a:t>action</a:t>
-            </a:r>
-            <a:endParaRPr lang="ko-KR" altLang="en-US" sz="800" dirty="0">
-              <a:solidFill>
-                <a:schemeClr val="bg1"/>
-              </a:solidFill>
-            </a:endParaRPr>
-          </a:p>
-        </p:txBody>
-      </p:sp>
-      <p:cxnSp>
-        <p:nvCxnSpPr>
-          <p:cNvPr id="410" name="꺾인 연결선 409"/>
-          <p:cNvCxnSpPr>
-            <a:stCxn id="374" idx="0"/>
-            <a:endCxn id="24" idx="4"/>
-          </p:cNvCxnSpPr>
-          <p:nvPr/>
-        </p:nvCxnSpPr>
-        <p:spPr>
-          <a:xfrm rot="5400000" flipH="1" flipV="1">
-            <a:off x="5166066" y="1358770"/>
-            <a:ext cx="360040" cy="324036"/>
-          </a:xfrm>
-          <a:prstGeom prst="bentConnector4">
-            <a:avLst>
-              <a:gd name="adj1" fmla="val 20000"/>
-              <a:gd name="adj2" fmla="val 170548"/>
-            </a:avLst>
-          </a:prstGeom>
-          <a:ln>
-            <a:solidFill>
-              <a:srgbClr val="7030A0"/>
-            </a:solidFill>
-            <a:headEnd type="oval" w="sm" len="sm"/>
-            <a:tailEnd type="triangle" w="sm" len="sm"/>
-          </a:ln>
-        </p:spPr>
-        <p:style>
-          <a:lnRef idx="1">
-            <a:schemeClr val="accent1"/>
-          </a:lnRef>
-          <a:fillRef idx="0">
-            <a:schemeClr val="accent1"/>
-          </a:fillRef>
-          <a:effectRef idx="0">
-            <a:schemeClr val="accent1"/>
-          </a:effectRef>
-          <a:fontRef idx="minor">
-            <a:schemeClr val="tx1"/>
-          </a:fontRef>
-        </p:style>
-      </p:cxnSp>
-      <p:sp>
-        <p:nvSpPr>
-          <p:cNvPr id="449" name="TextBox 448"/>
-          <p:cNvSpPr txBox="1"/>
-          <p:nvPr/>
-        </p:nvSpPr>
-        <p:spPr>
-          <a:xfrm>
-            <a:off x="5652120" y="1340768"/>
-            <a:ext cx="864096" cy="215444"/>
-          </a:xfrm>
-          <a:prstGeom prst="rect">
-            <a:avLst/>
-          </a:prstGeom>
-          <a:noFill/>
-        </p:spPr>
-        <p:txBody>
-          <a:bodyPr wrap="square" rtlCol="0">
-            <a:spAutoFit/>
-          </a:bodyPr>
-          <a:lstStyle/>
-          <a:p>
-            <a:r>
-              <a:rPr lang="en-US" altLang="ko-KR" sz="800" dirty="0" smtClean="0">
-                <a:solidFill>
-                  <a:schemeClr val="bg1"/>
-                </a:solidFill>
-              </a:rPr>
-              <a:t>save rule</a:t>
-            </a:r>
-            <a:endParaRPr lang="ko-KR" altLang="en-US" sz="800" dirty="0">
-              <a:solidFill>
-                <a:schemeClr val="bg1"/>
-              </a:solidFill>
-            </a:endParaRPr>
-          </a:p>
-        </p:txBody>
-      </p:sp>
-      <p:sp>
-        <p:nvSpPr>
-          <p:cNvPr id="452" name="TextBox 451"/>
-          <p:cNvSpPr txBox="1"/>
-          <p:nvPr/>
-        </p:nvSpPr>
-        <p:spPr>
-          <a:xfrm>
-            <a:off x="4572000" y="1484784"/>
-            <a:ext cx="864096" cy="215444"/>
-          </a:xfrm>
-          <a:prstGeom prst="rect">
-            <a:avLst/>
-          </a:prstGeom>
-          <a:noFill/>
-        </p:spPr>
-        <p:txBody>
-          <a:bodyPr wrap="square" rtlCol="0">
-            <a:spAutoFit/>
-          </a:bodyPr>
-          <a:lstStyle/>
-          <a:p>
-            <a:r>
-              <a:rPr lang="en-US" altLang="ko-KR" sz="800" dirty="0" smtClean="0">
-                <a:solidFill>
-                  <a:schemeClr val="bg1"/>
-                </a:solidFill>
-              </a:rPr>
-              <a:t>load rule</a:t>
-            </a:r>
-            <a:endParaRPr lang="ko-KR" altLang="en-US" sz="800" dirty="0">
-              <a:solidFill>
-                <a:schemeClr val="bg1"/>
-              </a:solidFill>
-            </a:endParaRPr>
-          </a:p>
-        </p:txBody>
-      </p:sp>
-      <p:sp>
-        <p:nvSpPr>
-          <p:cNvPr id="453" name="TextBox 452"/>
-          <p:cNvSpPr txBox="1"/>
-          <p:nvPr/>
-        </p:nvSpPr>
-        <p:spPr>
-          <a:xfrm>
-            <a:off x="6660232" y="1485364"/>
-            <a:ext cx="1152128" cy="215444"/>
-          </a:xfrm>
-          <a:prstGeom prst="rect">
-            <a:avLst/>
-          </a:prstGeom>
-          <a:noFill/>
-        </p:spPr>
-        <p:txBody>
-          <a:bodyPr wrap="square" rtlCol="0">
-            <a:spAutoFit/>
-          </a:bodyPr>
-          <a:lstStyle/>
-          <a:p>
-            <a:r>
-              <a:rPr lang="en-US" altLang="ko-KR" sz="800" dirty="0" smtClean="0">
-                <a:solidFill>
-                  <a:schemeClr val="bg1"/>
-                </a:solidFill>
-              </a:rPr>
-              <a:t>register timed action</a:t>
-            </a:r>
-            <a:endParaRPr lang="ko-KR" altLang="en-US" sz="800" dirty="0">
-              <a:solidFill>
-                <a:schemeClr val="bg1"/>
-              </a:solidFill>
-            </a:endParaRPr>
-          </a:p>
-        </p:txBody>
-      </p:sp>
-      <p:sp>
-        <p:nvSpPr>
           <p:cNvPr id="478" name="TextBox 477"/>
           <p:cNvSpPr txBox="1"/>
           <p:nvPr/>
@@ -6367,129 +5731,6 @@
           </a:p>
         </p:txBody>
       </p:sp>
-      <p:sp>
-        <p:nvSpPr>
-          <p:cNvPr id="479" name="타원 478"/>
-          <p:cNvSpPr/>
-          <p:nvPr/>
-        </p:nvSpPr>
-        <p:spPr>
-          <a:xfrm>
-            <a:off x="7308304" y="1196752"/>
-            <a:ext cx="935336" cy="288032"/>
-          </a:xfrm>
-          <a:prstGeom prst="ellipse">
-            <a:avLst/>
-          </a:prstGeom>
-          <a:solidFill>
-            <a:schemeClr val="tx1">
-              <a:lumMod val="85000"/>
-            </a:schemeClr>
-          </a:solidFill>
-          <a:ln w="3175">
-            <a:solidFill>
-              <a:schemeClr val="bg1"/>
-            </a:solidFill>
-          </a:ln>
-        </p:spPr>
-        <p:style>
-          <a:lnRef idx="2">
-            <a:schemeClr val="accent1">
-              <a:shade val="50000"/>
-            </a:schemeClr>
-          </a:lnRef>
-          <a:fillRef idx="1">
-            <a:schemeClr val="accent1"/>
-          </a:fillRef>
-          <a:effectRef idx="0">
-            <a:schemeClr val="accent1"/>
-          </a:effectRef>
-          <a:fontRef idx="minor">
-            <a:schemeClr val="lt1"/>
-          </a:fontRef>
-        </p:style>
-        <p:txBody>
-          <a:bodyPr rtlCol="0" anchor="ctr"/>
-          <a:lstStyle/>
-          <a:p>
-            <a:pPr algn="ctr"/>
-            <a:r>
-              <a:rPr lang="en-US" altLang="ko-KR" sz="800" dirty="0" smtClean="0">
-                <a:solidFill>
-                  <a:schemeClr val="bg1"/>
-                </a:solidFill>
-              </a:rPr>
-              <a:t>scheduler</a:t>
-            </a:r>
-            <a:endParaRPr lang="ko-KR" altLang="en-US" sz="800" dirty="0">
-              <a:solidFill>
-                <a:schemeClr val="bg1"/>
-              </a:solidFill>
-            </a:endParaRPr>
-          </a:p>
-        </p:txBody>
-      </p:sp>
-      <p:sp>
-        <p:nvSpPr>
-          <p:cNvPr id="486" name="TextBox 485"/>
-          <p:cNvSpPr txBox="1"/>
-          <p:nvPr/>
-        </p:nvSpPr>
-        <p:spPr>
-          <a:xfrm>
-            <a:off x="7812360" y="1556792"/>
-            <a:ext cx="574528" cy="461665"/>
-          </a:xfrm>
-          <a:prstGeom prst="rect">
-            <a:avLst/>
-          </a:prstGeom>
-          <a:noFill/>
-        </p:spPr>
-        <p:txBody>
-          <a:bodyPr wrap="square" rtlCol="0">
-            <a:spAutoFit/>
-          </a:bodyPr>
-          <a:lstStyle/>
-          <a:p>
-            <a:pPr algn="ctr"/>
-            <a:r>
-              <a:rPr lang="en-US" altLang="ko-KR" sz="800" dirty="0" smtClean="0">
-                <a:solidFill>
-                  <a:schemeClr val="bg1"/>
-                </a:solidFill>
-              </a:rPr>
-              <a:t>timed </a:t>
-            </a:r>
-          </a:p>
-          <a:p>
-            <a:pPr algn="ctr"/>
-            <a:r>
-              <a:rPr lang="en-US" altLang="ko-KR" sz="800" dirty="0" smtClean="0">
-                <a:solidFill>
-                  <a:schemeClr val="bg1"/>
-                </a:solidFill>
-              </a:rPr>
-              <a:t>action </a:t>
-            </a:r>
-          </a:p>
-          <a:p>
-            <a:pPr algn="ctr"/>
-            <a:r>
-              <a:rPr lang="en-US" altLang="ko-KR" sz="800" dirty="0" smtClean="0">
-                <a:solidFill>
-                  <a:schemeClr val="bg1"/>
-                </a:solidFill>
-              </a:rPr>
-              <a:t>event</a:t>
-            </a:r>
-            <a:endParaRPr lang="ko-KR" altLang="en-US" sz="800" dirty="0">
-              <a:solidFill>
-                <a:schemeClr val="bg1"/>
-              </a:solidFill>
-            </a:endParaRPr>
-          </a:p>
-        </p:txBody>
-      </p:sp>
       <p:cxnSp>
         <p:nvCxnSpPr>
           <p:cNvPr id="501" name="꺾인 연결선 425"/>
@@ -6701,1075 +5942,6 @@
       </p:sp>
       <p:sp>
         <p:nvSpPr>
-          <p:cNvPr id="535" name="직사각형 534"/>
-          <p:cNvSpPr/>
-          <p:nvPr/>
-        </p:nvSpPr>
-        <p:spPr>
-          <a:xfrm>
-            <a:off x="5940152" y="3068960"/>
-            <a:ext cx="72008" cy="72008"/>
-          </a:xfrm>
-          <a:prstGeom prst="rect">
-            <a:avLst/>
-          </a:prstGeom>
-          <a:noFill/>
-          <a:ln>
-            <a:noFill/>
-          </a:ln>
-        </p:spPr>
-        <p:style>
-          <a:lnRef idx="2">
-            <a:schemeClr val="accent1">
-              <a:shade val="50000"/>
-            </a:schemeClr>
-          </a:lnRef>
-          <a:fillRef idx="1">
-            <a:schemeClr val="accent1"/>
-          </a:fillRef>
-          <a:effectRef idx="0">
-            <a:schemeClr val="accent1"/>
-          </a:effectRef>
-          <a:fontRef idx="minor">
-            <a:schemeClr val="lt1"/>
-          </a:fontRef>
-        </p:style>
-        <p:txBody>
-          <a:bodyPr rtlCol="0" anchor="ctr"/>
-          <a:lstStyle/>
-          <a:p>
-            <a:pPr algn="ctr"/>
-            <a:endParaRPr lang="ko-KR" altLang="en-US"/>
-          </a:p>
-        </p:txBody>
-      </p:sp>
-      <p:sp>
-        <p:nvSpPr>
-          <p:cNvPr id="536" name="직사각형 535"/>
-          <p:cNvSpPr/>
-          <p:nvPr/>
-        </p:nvSpPr>
-        <p:spPr>
-          <a:xfrm>
-            <a:off x="5940152" y="2276872"/>
-            <a:ext cx="72008" cy="72008"/>
-          </a:xfrm>
-          <a:prstGeom prst="rect">
-            <a:avLst/>
-          </a:prstGeom>
-          <a:noFill/>
-          <a:ln>
-            <a:noFill/>
-          </a:ln>
-        </p:spPr>
-        <p:style>
-          <a:lnRef idx="2">
-            <a:schemeClr val="accent1">
-              <a:shade val="50000"/>
-            </a:schemeClr>
-          </a:lnRef>
-          <a:fillRef idx="1">
-            <a:schemeClr val="accent1"/>
-          </a:fillRef>
-          <a:effectRef idx="0">
-            <a:schemeClr val="accent1"/>
-          </a:effectRef>
-          <a:fontRef idx="minor">
-            <a:schemeClr val="lt1"/>
-          </a:fontRef>
-        </p:style>
-        <p:txBody>
-          <a:bodyPr rtlCol="0" anchor="ctr"/>
-          <a:lstStyle/>
-          <a:p>
-            <a:pPr algn="ctr"/>
-            <a:endParaRPr lang="ko-KR" altLang="en-US"/>
-          </a:p>
-        </p:txBody>
-      </p:sp>
-      <p:sp>
-        <p:nvSpPr>
-          <p:cNvPr id="538" name="직사각형 537"/>
-          <p:cNvSpPr/>
-          <p:nvPr/>
-        </p:nvSpPr>
-        <p:spPr>
-          <a:xfrm>
-            <a:off x="5868144" y="2276872"/>
-            <a:ext cx="72008" cy="72008"/>
-          </a:xfrm>
-          <a:prstGeom prst="rect">
-            <a:avLst/>
-          </a:prstGeom>
-          <a:noFill/>
-          <a:ln>
-            <a:noFill/>
-          </a:ln>
-        </p:spPr>
-        <p:style>
-          <a:lnRef idx="2">
-            <a:schemeClr val="accent1">
-              <a:shade val="50000"/>
-            </a:schemeClr>
-          </a:lnRef>
-          <a:fillRef idx="1">
-            <a:schemeClr val="accent1"/>
-          </a:fillRef>
-          <a:effectRef idx="0">
-            <a:schemeClr val="accent1"/>
-          </a:effectRef>
-          <a:fontRef idx="minor">
-            <a:schemeClr val="lt1"/>
-          </a:fontRef>
-        </p:style>
-        <p:txBody>
-          <a:bodyPr rtlCol="0" anchor="ctr"/>
-          <a:lstStyle/>
-          <a:p>
-            <a:pPr algn="ctr"/>
-            <a:endParaRPr lang="ko-KR" altLang="en-US"/>
-          </a:p>
-        </p:txBody>
-      </p:sp>
-      <p:sp>
-        <p:nvSpPr>
-          <p:cNvPr id="539" name="직사각형 538"/>
-          <p:cNvSpPr/>
-          <p:nvPr/>
-        </p:nvSpPr>
-        <p:spPr>
-          <a:xfrm>
-            <a:off x="5868144" y="3068960"/>
-            <a:ext cx="72008" cy="72008"/>
-          </a:xfrm>
-          <a:prstGeom prst="rect">
-            <a:avLst/>
-          </a:prstGeom>
-          <a:noFill/>
-          <a:ln>
-            <a:noFill/>
-          </a:ln>
-        </p:spPr>
-        <p:style>
-          <a:lnRef idx="2">
-            <a:schemeClr val="accent1">
-              <a:shade val="50000"/>
-            </a:schemeClr>
-          </a:lnRef>
-          <a:fillRef idx="1">
-            <a:schemeClr val="accent1"/>
-          </a:fillRef>
-          <a:effectRef idx="0">
-            <a:schemeClr val="accent1"/>
-          </a:effectRef>
-          <a:fontRef idx="minor">
-            <a:schemeClr val="lt1"/>
-          </a:fontRef>
-        </p:style>
-        <p:txBody>
-          <a:bodyPr rtlCol="0" anchor="ctr"/>
-          <a:lstStyle/>
-          <a:p>
-            <a:pPr algn="ctr"/>
-            <a:endParaRPr lang="ko-KR" altLang="en-US"/>
-          </a:p>
-        </p:txBody>
-      </p:sp>
-      <p:sp>
-        <p:nvSpPr>
-          <p:cNvPr id="545" name="직사각형 544"/>
-          <p:cNvSpPr/>
-          <p:nvPr/>
-        </p:nvSpPr>
-        <p:spPr>
-          <a:xfrm>
-            <a:off x="6516216" y="3068960"/>
-            <a:ext cx="72008" cy="72008"/>
-          </a:xfrm>
-          <a:prstGeom prst="rect">
-            <a:avLst/>
-          </a:prstGeom>
-          <a:noFill/>
-          <a:ln>
-            <a:noFill/>
-          </a:ln>
-        </p:spPr>
-        <p:style>
-          <a:lnRef idx="2">
-            <a:schemeClr val="accent1">
-              <a:shade val="50000"/>
-            </a:schemeClr>
-          </a:lnRef>
-          <a:fillRef idx="1">
-            <a:schemeClr val="accent1"/>
-          </a:fillRef>
-          <a:effectRef idx="0">
-            <a:schemeClr val="accent1"/>
-          </a:effectRef>
-          <a:fontRef idx="minor">
-            <a:schemeClr val="lt1"/>
-          </a:fontRef>
-        </p:style>
-        <p:txBody>
-          <a:bodyPr rtlCol="0" anchor="ctr"/>
-          <a:lstStyle/>
-          <a:p>
-            <a:pPr algn="ctr"/>
-            <a:endParaRPr lang="ko-KR" altLang="en-US"/>
-          </a:p>
-        </p:txBody>
-      </p:sp>
-      <p:sp>
-        <p:nvSpPr>
-          <p:cNvPr id="546" name="직사각형 545"/>
-          <p:cNvSpPr/>
-          <p:nvPr/>
-        </p:nvSpPr>
-        <p:spPr>
-          <a:xfrm>
-            <a:off x="6516216" y="2276872"/>
-            <a:ext cx="72008" cy="72008"/>
-          </a:xfrm>
-          <a:prstGeom prst="rect">
-            <a:avLst/>
-          </a:prstGeom>
-          <a:noFill/>
-          <a:ln>
-            <a:noFill/>
-          </a:ln>
-        </p:spPr>
-        <p:style>
-          <a:lnRef idx="2">
-            <a:schemeClr val="accent1">
-              <a:shade val="50000"/>
-            </a:schemeClr>
-          </a:lnRef>
-          <a:fillRef idx="1">
-            <a:schemeClr val="accent1"/>
-          </a:fillRef>
-          <a:effectRef idx="0">
-            <a:schemeClr val="accent1"/>
-          </a:effectRef>
-          <a:fontRef idx="minor">
-            <a:schemeClr val="lt1"/>
-          </a:fontRef>
-        </p:style>
-        <p:txBody>
-          <a:bodyPr rtlCol="0" anchor="ctr"/>
-          <a:lstStyle/>
-          <a:p>
-            <a:pPr algn="ctr"/>
-            <a:endParaRPr lang="ko-KR" altLang="en-US"/>
-          </a:p>
-        </p:txBody>
-      </p:sp>
-      <p:sp>
-        <p:nvSpPr>
-          <p:cNvPr id="548" name="직사각형 547"/>
-          <p:cNvSpPr/>
-          <p:nvPr/>
-        </p:nvSpPr>
-        <p:spPr>
-          <a:xfrm>
-            <a:off x="6444208" y="2276872"/>
-            <a:ext cx="72008" cy="72008"/>
-          </a:xfrm>
-          <a:prstGeom prst="rect">
-            <a:avLst/>
-          </a:prstGeom>
-          <a:noFill/>
-          <a:ln>
-            <a:noFill/>
-          </a:ln>
-        </p:spPr>
-        <p:style>
-          <a:lnRef idx="2">
-            <a:schemeClr val="accent1">
-              <a:shade val="50000"/>
-            </a:schemeClr>
-          </a:lnRef>
-          <a:fillRef idx="1">
-            <a:schemeClr val="accent1"/>
-          </a:fillRef>
-          <a:effectRef idx="0">
-            <a:schemeClr val="accent1"/>
-          </a:effectRef>
-          <a:fontRef idx="minor">
-            <a:schemeClr val="lt1"/>
-          </a:fontRef>
-        </p:style>
-        <p:txBody>
-          <a:bodyPr rtlCol="0" anchor="ctr"/>
-          <a:lstStyle/>
-          <a:p>
-            <a:pPr algn="ctr"/>
-            <a:endParaRPr lang="ko-KR" altLang="en-US"/>
-          </a:p>
-        </p:txBody>
-      </p:sp>
-      <p:sp>
-        <p:nvSpPr>
-          <p:cNvPr id="549" name="직사각형 548"/>
-          <p:cNvSpPr/>
-          <p:nvPr/>
-        </p:nvSpPr>
-        <p:spPr>
-          <a:xfrm>
-            <a:off x="6444208" y="3068960"/>
-            <a:ext cx="72008" cy="72008"/>
-          </a:xfrm>
-          <a:prstGeom prst="rect">
-            <a:avLst/>
-          </a:prstGeom>
-          <a:noFill/>
-          <a:ln>
-            <a:noFill/>
-          </a:ln>
-        </p:spPr>
-        <p:style>
-          <a:lnRef idx="2">
-            <a:schemeClr val="accent1">
-              <a:shade val="50000"/>
-            </a:schemeClr>
-          </a:lnRef>
-          <a:fillRef idx="1">
-            <a:schemeClr val="accent1"/>
-          </a:fillRef>
-          <a:effectRef idx="0">
-            <a:schemeClr val="accent1"/>
-          </a:effectRef>
-          <a:fontRef idx="minor">
-            <a:schemeClr val="lt1"/>
-          </a:fontRef>
-        </p:style>
-        <p:txBody>
-          <a:bodyPr rtlCol="0" anchor="ctr"/>
-          <a:lstStyle/>
-          <a:p>
-            <a:pPr algn="ctr"/>
-            <a:endParaRPr lang="ko-KR" altLang="en-US"/>
-          </a:p>
-        </p:txBody>
-      </p:sp>
-      <p:sp>
-        <p:nvSpPr>
-          <p:cNvPr id="551" name="직사각형 550"/>
-          <p:cNvSpPr/>
-          <p:nvPr/>
-        </p:nvSpPr>
-        <p:spPr>
-          <a:xfrm>
-            <a:off x="7092280" y="3068960"/>
-            <a:ext cx="72008" cy="72008"/>
-          </a:xfrm>
-          <a:prstGeom prst="rect">
-            <a:avLst/>
-          </a:prstGeom>
-          <a:noFill/>
-          <a:ln>
-            <a:noFill/>
-          </a:ln>
-        </p:spPr>
-        <p:style>
-          <a:lnRef idx="2">
-            <a:schemeClr val="accent1">
-              <a:shade val="50000"/>
-            </a:schemeClr>
-          </a:lnRef>
-          <a:fillRef idx="1">
-            <a:schemeClr val="accent1"/>
-          </a:fillRef>
-          <a:effectRef idx="0">
-            <a:schemeClr val="accent1"/>
-          </a:effectRef>
-          <a:fontRef idx="minor">
-            <a:schemeClr val="lt1"/>
-          </a:fontRef>
-        </p:style>
-        <p:txBody>
-          <a:bodyPr rtlCol="0" anchor="ctr"/>
-          <a:lstStyle/>
-          <a:p>
-            <a:pPr algn="ctr"/>
-            <a:endParaRPr lang="ko-KR" altLang="en-US"/>
-          </a:p>
-        </p:txBody>
-      </p:sp>
-      <p:sp>
-        <p:nvSpPr>
-          <p:cNvPr id="552" name="직사각형 551"/>
-          <p:cNvSpPr/>
-          <p:nvPr/>
-        </p:nvSpPr>
-        <p:spPr>
-          <a:xfrm>
-            <a:off x="7092280" y="2276872"/>
-            <a:ext cx="72008" cy="72008"/>
-          </a:xfrm>
-          <a:prstGeom prst="rect">
-            <a:avLst/>
-          </a:prstGeom>
-          <a:noFill/>
-          <a:ln>
-            <a:noFill/>
-          </a:ln>
-        </p:spPr>
-        <p:style>
-          <a:lnRef idx="2">
-            <a:schemeClr val="accent1">
-              <a:shade val="50000"/>
-            </a:schemeClr>
-          </a:lnRef>
-          <a:fillRef idx="1">
-            <a:schemeClr val="accent1"/>
-          </a:fillRef>
-          <a:effectRef idx="0">
-            <a:schemeClr val="accent1"/>
-          </a:effectRef>
-          <a:fontRef idx="minor">
-            <a:schemeClr val="lt1"/>
-          </a:fontRef>
-        </p:style>
-        <p:txBody>
-          <a:bodyPr rtlCol="0" anchor="ctr"/>
-          <a:lstStyle/>
-          <a:p>
-            <a:pPr algn="ctr"/>
-            <a:endParaRPr lang="ko-KR" altLang="en-US"/>
-          </a:p>
-        </p:txBody>
-      </p:sp>
-      <p:sp>
-        <p:nvSpPr>
-          <p:cNvPr id="554" name="직사각형 553"/>
-          <p:cNvSpPr/>
-          <p:nvPr/>
-        </p:nvSpPr>
-        <p:spPr>
-          <a:xfrm>
-            <a:off x="7020272" y="2276872"/>
-            <a:ext cx="72008" cy="72008"/>
-          </a:xfrm>
-          <a:prstGeom prst="rect">
-            <a:avLst/>
-          </a:prstGeom>
-          <a:noFill/>
-          <a:ln>
-            <a:noFill/>
-          </a:ln>
-        </p:spPr>
-        <p:style>
-          <a:lnRef idx="2">
-            <a:schemeClr val="accent1">
-              <a:shade val="50000"/>
-            </a:schemeClr>
-          </a:lnRef>
-          <a:fillRef idx="1">
-            <a:schemeClr val="accent1"/>
-          </a:fillRef>
-          <a:effectRef idx="0">
-            <a:schemeClr val="accent1"/>
-          </a:effectRef>
-          <a:fontRef idx="minor">
-            <a:schemeClr val="lt1"/>
-          </a:fontRef>
-        </p:style>
-        <p:txBody>
-          <a:bodyPr rtlCol="0" anchor="ctr"/>
-          <a:lstStyle/>
-          <a:p>
-            <a:pPr algn="ctr"/>
-            <a:endParaRPr lang="ko-KR" altLang="en-US"/>
-          </a:p>
-        </p:txBody>
-      </p:sp>
-      <p:sp>
-        <p:nvSpPr>
-          <p:cNvPr id="555" name="직사각형 554"/>
-          <p:cNvSpPr/>
-          <p:nvPr/>
-        </p:nvSpPr>
-        <p:spPr>
-          <a:xfrm>
-            <a:off x="7020272" y="3068960"/>
-            <a:ext cx="72008" cy="72008"/>
-          </a:xfrm>
-          <a:prstGeom prst="rect">
-            <a:avLst/>
-          </a:prstGeom>
-          <a:noFill/>
-          <a:ln>
-            <a:noFill/>
-          </a:ln>
-        </p:spPr>
-        <p:style>
-          <a:lnRef idx="2">
-            <a:schemeClr val="accent1">
-              <a:shade val="50000"/>
-            </a:schemeClr>
-          </a:lnRef>
-          <a:fillRef idx="1">
-            <a:schemeClr val="accent1"/>
-          </a:fillRef>
-          <a:effectRef idx="0">
-            <a:schemeClr val="accent1"/>
-          </a:effectRef>
-          <a:fontRef idx="minor">
-            <a:schemeClr val="lt1"/>
-          </a:fontRef>
-        </p:style>
-        <p:txBody>
-          <a:bodyPr rtlCol="0" anchor="ctr"/>
-          <a:lstStyle/>
-          <a:p>
-            <a:pPr algn="ctr"/>
-            <a:endParaRPr lang="ko-KR" altLang="en-US"/>
-          </a:p>
-        </p:txBody>
-      </p:sp>
-      <p:sp>
-        <p:nvSpPr>
-          <p:cNvPr id="557" name="직사각형 556"/>
-          <p:cNvSpPr/>
-          <p:nvPr/>
-        </p:nvSpPr>
-        <p:spPr>
-          <a:xfrm>
-            <a:off x="7668344" y="3068960"/>
-            <a:ext cx="72008" cy="72008"/>
-          </a:xfrm>
-          <a:prstGeom prst="rect">
-            <a:avLst/>
-          </a:prstGeom>
-          <a:noFill/>
-          <a:ln>
-            <a:noFill/>
-          </a:ln>
-        </p:spPr>
-        <p:style>
-          <a:lnRef idx="2">
-            <a:schemeClr val="accent1">
-              <a:shade val="50000"/>
-            </a:schemeClr>
-          </a:lnRef>
-          <a:fillRef idx="1">
-            <a:schemeClr val="accent1"/>
-          </a:fillRef>
-          <a:effectRef idx="0">
-            <a:schemeClr val="accent1"/>
-          </a:effectRef>
-          <a:fontRef idx="minor">
-            <a:schemeClr val="lt1"/>
-          </a:fontRef>
-        </p:style>
-        <p:txBody>
-          <a:bodyPr rtlCol="0" anchor="ctr"/>
-          <a:lstStyle/>
-          <a:p>
-            <a:pPr algn="ctr"/>
-            <a:endParaRPr lang="ko-KR" altLang="en-US"/>
-          </a:p>
-        </p:txBody>
-      </p:sp>
-      <p:sp>
-        <p:nvSpPr>
-          <p:cNvPr id="558" name="직사각형 557"/>
-          <p:cNvSpPr/>
-          <p:nvPr/>
-        </p:nvSpPr>
-        <p:spPr>
-          <a:xfrm>
-            <a:off x="7668344" y="2276872"/>
-            <a:ext cx="72008" cy="72008"/>
-          </a:xfrm>
-          <a:prstGeom prst="rect">
-            <a:avLst/>
-          </a:prstGeom>
-          <a:noFill/>
-          <a:ln>
-            <a:noFill/>
-          </a:ln>
-        </p:spPr>
-        <p:style>
-          <a:lnRef idx="2">
-            <a:schemeClr val="accent1">
-              <a:shade val="50000"/>
-            </a:schemeClr>
-          </a:lnRef>
-          <a:fillRef idx="1">
-            <a:schemeClr val="accent1"/>
-          </a:fillRef>
-          <a:effectRef idx="0">
-            <a:schemeClr val="accent1"/>
-          </a:effectRef>
-          <a:fontRef idx="minor">
-            <a:schemeClr val="lt1"/>
-          </a:fontRef>
-        </p:style>
-        <p:txBody>
-          <a:bodyPr rtlCol="0" anchor="ctr"/>
-          <a:lstStyle/>
-          <a:p>
-            <a:pPr algn="ctr"/>
-            <a:endParaRPr lang="ko-KR" altLang="en-US"/>
-          </a:p>
-        </p:txBody>
-      </p:sp>
-      <p:sp>
-        <p:nvSpPr>
-          <p:cNvPr id="560" name="직사각형 559"/>
-          <p:cNvSpPr/>
-          <p:nvPr/>
-        </p:nvSpPr>
-        <p:spPr>
-          <a:xfrm>
-            <a:off x="7596336" y="2276872"/>
-            <a:ext cx="72008" cy="72008"/>
-          </a:xfrm>
-          <a:prstGeom prst="rect">
-            <a:avLst/>
-          </a:prstGeom>
-          <a:noFill/>
-          <a:ln>
-            <a:noFill/>
-          </a:ln>
-        </p:spPr>
-        <p:style>
-          <a:lnRef idx="2">
-            <a:schemeClr val="accent1">
-              <a:shade val="50000"/>
-            </a:schemeClr>
-          </a:lnRef>
-          <a:fillRef idx="1">
-            <a:schemeClr val="accent1"/>
-          </a:fillRef>
-          <a:effectRef idx="0">
-            <a:schemeClr val="accent1"/>
-          </a:effectRef>
-          <a:fontRef idx="minor">
-            <a:schemeClr val="lt1"/>
-          </a:fontRef>
-        </p:style>
-        <p:txBody>
-          <a:bodyPr rtlCol="0" anchor="ctr"/>
-          <a:lstStyle/>
-          <a:p>
-            <a:pPr algn="ctr"/>
-            <a:endParaRPr lang="ko-KR" altLang="en-US"/>
-          </a:p>
-        </p:txBody>
-      </p:sp>
-      <p:sp>
-        <p:nvSpPr>
-          <p:cNvPr id="561" name="직사각형 560"/>
-          <p:cNvSpPr/>
-          <p:nvPr/>
-        </p:nvSpPr>
-        <p:spPr>
-          <a:xfrm>
-            <a:off x="7596336" y="3068960"/>
-            <a:ext cx="72008" cy="72008"/>
-          </a:xfrm>
-          <a:prstGeom prst="rect">
-            <a:avLst/>
-          </a:prstGeom>
-          <a:noFill/>
-          <a:ln>
-            <a:noFill/>
-          </a:ln>
-        </p:spPr>
-        <p:style>
-          <a:lnRef idx="2">
-            <a:schemeClr val="accent1">
-              <a:shade val="50000"/>
-            </a:schemeClr>
-          </a:lnRef>
-          <a:fillRef idx="1">
-            <a:schemeClr val="accent1"/>
-          </a:fillRef>
-          <a:effectRef idx="0">
-            <a:schemeClr val="accent1"/>
-          </a:effectRef>
-          <a:fontRef idx="minor">
-            <a:schemeClr val="lt1"/>
-          </a:fontRef>
-        </p:style>
-        <p:txBody>
-          <a:bodyPr rtlCol="0" anchor="ctr"/>
-          <a:lstStyle/>
-          <a:p>
-            <a:pPr algn="ctr"/>
-            <a:endParaRPr lang="ko-KR" altLang="en-US"/>
-          </a:p>
-        </p:txBody>
-      </p:sp>
-      <p:cxnSp>
-        <p:nvCxnSpPr>
-          <p:cNvPr id="566" name="꺾인 연결선 412"/>
-          <p:cNvCxnSpPr>
-            <a:endCxn id="394" idx="0"/>
-          </p:cNvCxnSpPr>
-          <p:nvPr/>
-        </p:nvCxnSpPr>
-        <p:spPr>
-          <a:xfrm>
-            <a:off x="5508104" y="2132856"/>
-            <a:ext cx="396044" cy="72008"/>
-          </a:xfrm>
-          <a:prstGeom prst="bentConnector2">
-            <a:avLst/>
-          </a:prstGeom>
-          <a:ln>
-            <a:solidFill>
-              <a:srgbClr val="7030A0"/>
-            </a:solidFill>
-            <a:headEnd type="oval" w="sm" len="sm"/>
-            <a:tailEnd type="triangle" w="sm" len="sm"/>
-          </a:ln>
-        </p:spPr>
-        <p:style>
-          <a:lnRef idx="1">
-            <a:schemeClr val="accent1"/>
-          </a:lnRef>
-          <a:fillRef idx="0">
-            <a:schemeClr val="accent1"/>
-          </a:fillRef>
-          <a:effectRef idx="0">
-            <a:schemeClr val="accent1"/>
-          </a:effectRef>
-          <a:fontRef idx="minor">
-            <a:schemeClr val="tx1"/>
-          </a:fontRef>
-        </p:style>
-      </p:cxnSp>
-      <p:cxnSp>
-        <p:nvCxnSpPr>
-          <p:cNvPr id="569" name="꺾인 연결선 412"/>
-          <p:cNvCxnSpPr>
-            <a:endCxn id="395" idx="0"/>
-          </p:cNvCxnSpPr>
-          <p:nvPr/>
-        </p:nvCxnSpPr>
-        <p:spPr>
-          <a:xfrm>
-            <a:off x="5508104" y="2060848"/>
-            <a:ext cx="972108" cy="144016"/>
-          </a:xfrm>
-          <a:prstGeom prst="bentConnector2">
-            <a:avLst/>
-          </a:prstGeom>
-          <a:ln>
-            <a:solidFill>
-              <a:srgbClr val="7030A0"/>
-            </a:solidFill>
-            <a:headEnd type="oval" w="sm" len="sm"/>
-            <a:tailEnd type="triangle" w="sm" len="sm"/>
-          </a:ln>
-        </p:spPr>
-        <p:style>
-          <a:lnRef idx="1">
-            <a:schemeClr val="accent1"/>
-          </a:lnRef>
-          <a:fillRef idx="0">
-            <a:schemeClr val="accent1"/>
-          </a:fillRef>
-          <a:effectRef idx="0">
-            <a:schemeClr val="accent1"/>
-          </a:effectRef>
-          <a:fontRef idx="minor">
-            <a:schemeClr val="tx1"/>
-          </a:fontRef>
-        </p:style>
-      </p:cxnSp>
-      <p:cxnSp>
-        <p:nvCxnSpPr>
-          <p:cNvPr id="571" name="꺾인 연결선 412"/>
-          <p:cNvCxnSpPr>
-            <a:endCxn id="396" idx="0"/>
-          </p:cNvCxnSpPr>
-          <p:nvPr/>
-        </p:nvCxnSpPr>
-        <p:spPr>
-          <a:xfrm>
-            <a:off x="5508104" y="1988840"/>
-            <a:ext cx="1548172" cy="216024"/>
-          </a:xfrm>
-          <a:prstGeom prst="bentConnector2">
-            <a:avLst/>
-          </a:prstGeom>
-          <a:ln>
-            <a:solidFill>
-              <a:srgbClr val="7030A0"/>
-            </a:solidFill>
-            <a:headEnd type="oval" w="sm" len="sm"/>
-            <a:tailEnd type="triangle" w="sm" len="sm"/>
-          </a:ln>
-        </p:spPr>
-        <p:style>
-          <a:lnRef idx="1">
-            <a:schemeClr val="accent1"/>
-          </a:lnRef>
-          <a:fillRef idx="0">
-            <a:schemeClr val="accent1"/>
-          </a:fillRef>
-          <a:effectRef idx="0">
-            <a:schemeClr val="accent1"/>
-          </a:effectRef>
-          <a:fontRef idx="minor">
-            <a:schemeClr val="tx1"/>
-          </a:fontRef>
-        </p:style>
-      </p:cxnSp>
-      <p:cxnSp>
-        <p:nvCxnSpPr>
-          <p:cNvPr id="574" name="꺾인 연결선 412"/>
-          <p:cNvCxnSpPr>
-            <a:endCxn id="397" idx="0"/>
-          </p:cNvCxnSpPr>
-          <p:nvPr/>
-        </p:nvCxnSpPr>
-        <p:spPr>
-          <a:xfrm>
-            <a:off x="5508104" y="1916832"/>
-            <a:ext cx="2124236" cy="288032"/>
-          </a:xfrm>
-          <a:prstGeom prst="bentConnector2">
-            <a:avLst/>
-          </a:prstGeom>
-          <a:ln>
-            <a:solidFill>
-              <a:srgbClr val="7030A0"/>
-            </a:solidFill>
-            <a:headEnd type="oval" w="sm" len="sm"/>
-            <a:tailEnd type="triangle" w="sm" len="sm"/>
-          </a:ln>
-        </p:spPr>
-        <p:style>
-          <a:lnRef idx="1">
-            <a:schemeClr val="accent1"/>
-          </a:lnRef>
-          <a:fillRef idx="0">
-            <a:schemeClr val="accent1"/>
-          </a:fillRef>
-          <a:effectRef idx="0">
-            <a:schemeClr val="accent1"/>
-          </a:effectRef>
-          <a:fontRef idx="minor">
-            <a:schemeClr val="tx1"/>
-          </a:fontRef>
-        </p:style>
-      </p:cxnSp>
-      <p:cxnSp>
-        <p:nvCxnSpPr>
-          <p:cNvPr id="583" name="꺾인 연결선 425"/>
-          <p:cNvCxnSpPr>
-            <a:endCxn id="479" idx="4"/>
-          </p:cNvCxnSpPr>
-          <p:nvPr/>
-        </p:nvCxnSpPr>
-        <p:spPr>
-          <a:xfrm rot="5400000" flipH="1" flipV="1">
-            <a:off x="7398122" y="1827014"/>
-            <a:ext cx="720080" cy="35620"/>
-          </a:xfrm>
-          <a:prstGeom prst="bentConnector3">
-            <a:avLst>
-              <a:gd name="adj1" fmla="val 50000"/>
-            </a:avLst>
-          </a:prstGeom>
-          <a:ln>
-            <a:solidFill>
-              <a:srgbClr val="7030A0"/>
-            </a:solidFill>
-            <a:headEnd type="oval" w="sm" len="sm"/>
-            <a:tailEnd type="triangle" w="sm" len="sm"/>
-          </a:ln>
-        </p:spPr>
-        <p:style>
-          <a:lnRef idx="1">
-            <a:schemeClr val="accent1"/>
-          </a:lnRef>
-          <a:fillRef idx="0">
-            <a:schemeClr val="accent1"/>
-          </a:fillRef>
-          <a:effectRef idx="0">
-            <a:schemeClr val="accent1"/>
-          </a:effectRef>
-          <a:fontRef idx="minor">
-            <a:schemeClr val="tx1"/>
-          </a:fontRef>
-        </p:style>
-      </p:cxnSp>
-      <p:sp>
-        <p:nvSpPr>
-          <p:cNvPr id="586" name="직사각형 585"/>
-          <p:cNvSpPr/>
-          <p:nvPr/>
-        </p:nvSpPr>
-        <p:spPr>
-          <a:xfrm>
-            <a:off x="8388424" y="3068960"/>
-            <a:ext cx="72008" cy="72008"/>
-          </a:xfrm>
-          <a:prstGeom prst="rect">
-            <a:avLst/>
-          </a:prstGeom>
-          <a:noFill/>
-          <a:ln>
-            <a:noFill/>
-          </a:ln>
-        </p:spPr>
-        <p:style>
-          <a:lnRef idx="2">
-            <a:schemeClr val="accent1">
-              <a:shade val="50000"/>
-            </a:schemeClr>
-          </a:lnRef>
-          <a:fillRef idx="1">
-            <a:schemeClr val="accent1"/>
-          </a:fillRef>
-          <a:effectRef idx="0">
-            <a:schemeClr val="accent1"/>
-          </a:effectRef>
-          <a:fontRef idx="minor">
-            <a:schemeClr val="lt1"/>
-          </a:fontRef>
-        </p:style>
-        <p:txBody>
-          <a:bodyPr rtlCol="0" anchor="ctr"/>
-          <a:lstStyle/>
-          <a:p>
-            <a:pPr algn="ctr"/>
-            <a:endParaRPr lang="ko-KR" altLang="en-US"/>
-          </a:p>
-        </p:txBody>
-      </p:sp>
-      <p:sp>
-        <p:nvSpPr>
-          <p:cNvPr id="587" name="직사각형 586"/>
-          <p:cNvSpPr/>
-          <p:nvPr/>
-        </p:nvSpPr>
-        <p:spPr>
-          <a:xfrm>
-            <a:off x="7884368" y="1412776"/>
-            <a:ext cx="72008" cy="72008"/>
-          </a:xfrm>
-          <a:prstGeom prst="rect">
-            <a:avLst/>
-          </a:prstGeom>
-          <a:noFill/>
-          <a:ln>
-            <a:noFill/>
-          </a:ln>
-        </p:spPr>
-        <p:style>
-          <a:lnRef idx="2">
-            <a:schemeClr val="accent1">
-              <a:shade val="50000"/>
-            </a:schemeClr>
-          </a:lnRef>
-          <a:fillRef idx="1">
-            <a:schemeClr val="accent1"/>
-          </a:fillRef>
-          <a:effectRef idx="0">
-            <a:schemeClr val="accent1"/>
-          </a:effectRef>
-          <a:fontRef idx="minor">
-            <a:schemeClr val="lt1"/>
-          </a:fontRef>
-        </p:style>
-        <p:txBody>
-          <a:bodyPr rtlCol="0" anchor="ctr"/>
-          <a:lstStyle/>
-          <a:p>
-            <a:pPr algn="ctr"/>
-            <a:endParaRPr lang="ko-KR" altLang="en-US"/>
-          </a:p>
-        </p:txBody>
-      </p:sp>
-      <p:sp>
-        <p:nvSpPr>
-          <p:cNvPr id="593" name="TextBox 592"/>
-          <p:cNvSpPr txBox="1"/>
-          <p:nvPr/>
-        </p:nvSpPr>
-        <p:spPr>
-          <a:xfrm>
-            <a:off x="5796136" y="1715400"/>
-            <a:ext cx="1584176" cy="215444"/>
-          </a:xfrm>
-          <a:prstGeom prst="rect">
-            <a:avLst/>
-          </a:prstGeom>
-          <a:noFill/>
-        </p:spPr>
-        <p:txBody>
-          <a:bodyPr wrap="square" rtlCol="0">
-            <a:spAutoFit/>
-          </a:bodyPr>
-          <a:lstStyle/>
-          <a:p>
-            <a:r>
-              <a:rPr lang="en-US" altLang="ko-KR" sz="800" dirty="0" smtClean="0">
-                <a:solidFill>
-                  <a:schemeClr val="bg1"/>
-                </a:solidFill>
-              </a:rPr>
-              <a:t>match rule condition</a:t>
-            </a:r>
-            <a:endParaRPr lang="ko-KR" altLang="en-US" sz="800" dirty="0">
-              <a:solidFill>
-                <a:schemeClr val="bg1"/>
-              </a:solidFill>
-            </a:endParaRPr>
-          </a:p>
-        </p:txBody>
-      </p:sp>
-      <p:cxnSp>
-        <p:nvCxnSpPr>
-          <p:cNvPr id="607" name="꺾인 연결선 409"/>
-          <p:cNvCxnSpPr>
-            <a:stCxn id="24" idx="2"/>
-            <a:endCxn id="374" idx="1"/>
-          </p:cNvCxnSpPr>
-          <p:nvPr/>
-        </p:nvCxnSpPr>
-        <p:spPr>
-          <a:xfrm rot="10800000" flipV="1">
-            <a:off x="4860032" y="1340768"/>
-            <a:ext cx="12700" cy="684076"/>
-          </a:xfrm>
-          <a:prstGeom prst="bentConnector3">
-            <a:avLst>
-              <a:gd name="adj1" fmla="val 1800000"/>
-            </a:avLst>
-          </a:prstGeom>
-          <a:ln>
-            <a:solidFill>
-              <a:srgbClr val="7030A0"/>
-            </a:solidFill>
-            <a:headEnd type="oval" w="sm" len="sm"/>
-            <a:tailEnd type="triangle" w="sm" len="sm"/>
-          </a:ln>
-        </p:spPr>
-        <p:style>
-          <a:lnRef idx="1">
-            <a:schemeClr val="accent1"/>
-          </a:lnRef>
-          <a:fillRef idx="0">
-            <a:schemeClr val="accent1"/>
-          </a:fillRef>
-          <a:effectRef idx="0">
-            <a:schemeClr val="accent1"/>
-          </a:effectRef>
-          <a:fontRef idx="minor">
-            <a:schemeClr val="tx1"/>
-          </a:fontRef>
-        </p:style>
-      </p:cxnSp>
-      <p:sp>
-        <p:nvSpPr>
           <p:cNvPr id="612" name="직사각형 611"/>
           <p:cNvSpPr/>
           <p:nvPr/>
@@ -7858,39 +6030,6 @@
                 <a:schemeClr val="bg1"/>
               </a:solidFill>
             </a:endParaRPr>
-          </a:p>
-        </p:txBody>
-      </p:sp>
-      <p:sp>
-        <p:nvSpPr>
-          <p:cNvPr id="614" name="직사각형 613"/>
-          <p:cNvSpPr/>
-          <p:nvPr/>
-        </p:nvSpPr>
-        <p:spPr>
-          <a:xfrm>
-            <a:off x="6084168" y="1052736"/>
-            <a:ext cx="936104" cy="215444"/>
-          </a:xfrm>
-          <a:prstGeom prst="rect">
-            <a:avLst/>
-          </a:prstGeom>
-        </p:spPr>
-        <p:txBody>
-          <a:bodyPr wrap="square">
-            <a:spAutoFit/>
-          </a:bodyPr>
-          <a:lstStyle/>
-          <a:p>
-            <a:pPr algn="ctr"/>
-            <a:r>
-              <a:rPr lang="en-US" altLang="ko-KR" sz="800" dirty="0" smtClean="0">
-                <a:solidFill>
-                  <a:srgbClr val="FF0000"/>
-                </a:solidFill>
-              </a:rPr>
-              <a:t>Rule manager</a:t>
-            </a:r>
           </a:p>
         </p:txBody>
       </p:sp>
@@ -8618,57 +6757,6 @@
           </a:fontRef>
         </p:style>
       </p:cxnSp>
-      <p:sp>
-        <p:nvSpPr>
-          <p:cNvPr id="392" name="직사각형 391"/>
-          <p:cNvSpPr/>
-          <p:nvPr/>
-        </p:nvSpPr>
-        <p:spPr>
-          <a:xfrm>
-            <a:off x="4572000" y="1052736"/>
-            <a:ext cx="3960440" cy="1368152"/>
-          </a:xfrm>
-          <a:prstGeom prst="rect">
-            <a:avLst/>
-          </a:prstGeom>
-          <a:noFill/>
-          <a:ln w="9525">
-            <a:solidFill>
-              <a:srgbClr val="FF0000"/>
-            </a:solidFill>
-            <a:prstDash val="dash"/>
-          </a:ln>
-        </p:spPr>
-        <p:style>
-          <a:lnRef idx="2">
-            <a:schemeClr val="accent1">
-              <a:shade val="50000"/>
-            </a:schemeClr>
-          </a:lnRef>
-          <a:fillRef idx="1">
-            <a:schemeClr val="accent1"/>
-          </a:fillRef>
-          <a:effectRef idx="0">
-            <a:schemeClr val="accent1"/>
-          </a:effectRef>
-          <a:fontRef idx="minor">
-            <a:schemeClr val="lt1"/>
-          </a:fontRef>
-        </p:style>
-        <p:txBody>
-          <a:bodyPr rtlCol="0" anchor="ctr" anchorCtr="0"/>
-          <a:lstStyle/>
-          <a:p>
-            <a:pPr algn="r"/>
-            <a:endParaRPr lang="en-US" altLang="ko-KR" sz="800" dirty="0" smtClean="0">
-              <a:solidFill>
-                <a:srgbClr val="FF0000"/>
-              </a:solidFill>
-            </a:endParaRPr>
-          </a:p>
-        </p:txBody>
-      </p:sp>
       <p:cxnSp>
         <p:nvCxnSpPr>
           <p:cNvPr id="393" name="꺾인 연결선 425"/>
@@ -9813,199 +7901,8 @@
       </p:cxnSp>
       <p:cxnSp>
         <p:nvCxnSpPr>
-          <p:cNvPr id="203" name="꺾인 연결선 202"/>
-          <p:cNvCxnSpPr>
-            <a:stCxn id="536" idx="2"/>
-            <a:endCxn id="535" idx="0"/>
-          </p:cNvCxnSpPr>
-          <p:nvPr/>
-        </p:nvCxnSpPr>
-        <p:spPr>
-          <a:xfrm rot="5400000">
-            <a:off x="5616116" y="2708920"/>
-            <a:ext cx="720080" cy="12700"/>
-          </a:xfrm>
-          <a:prstGeom prst="bentConnector3">
-            <a:avLst>
-              <a:gd name="adj1" fmla="val 50000"/>
-            </a:avLst>
-          </a:prstGeom>
-          <a:ln>
-            <a:tailEnd type="triangle" w="sm" len="sm"/>
-          </a:ln>
-        </p:spPr>
-        <p:style>
-          <a:lnRef idx="1">
-            <a:schemeClr val="accent1"/>
-          </a:lnRef>
-          <a:fillRef idx="0">
-            <a:schemeClr val="accent1"/>
-          </a:fillRef>
-          <a:effectRef idx="0">
-            <a:schemeClr val="accent1"/>
-          </a:effectRef>
-          <a:fontRef idx="minor">
-            <a:schemeClr val="tx1"/>
-          </a:fontRef>
-        </p:style>
-      </p:cxnSp>
-      <p:cxnSp>
-        <p:nvCxnSpPr>
-          <p:cNvPr id="223" name="꺾인 연결선 222"/>
-          <p:cNvCxnSpPr>
-            <a:stCxn id="546" idx="2"/>
-            <a:endCxn id="545" idx="0"/>
-          </p:cNvCxnSpPr>
-          <p:nvPr/>
-        </p:nvCxnSpPr>
-        <p:spPr>
-          <a:xfrm rot="5400000">
-            <a:off x="6192180" y="2708920"/>
-            <a:ext cx="720080" cy="12700"/>
-          </a:xfrm>
-          <a:prstGeom prst="bentConnector3">
-            <a:avLst>
-              <a:gd name="adj1" fmla="val 50000"/>
-            </a:avLst>
-          </a:prstGeom>
-          <a:ln>
-            <a:tailEnd type="triangle" w="sm" len="sm"/>
-          </a:ln>
-        </p:spPr>
-        <p:style>
-          <a:lnRef idx="1">
-            <a:schemeClr val="accent1"/>
-          </a:lnRef>
-          <a:fillRef idx="0">
-            <a:schemeClr val="accent1"/>
-          </a:fillRef>
-          <a:effectRef idx="0">
-            <a:schemeClr val="accent1"/>
-          </a:effectRef>
-          <a:fontRef idx="minor">
-            <a:schemeClr val="tx1"/>
-          </a:fontRef>
-        </p:style>
-      </p:cxnSp>
-      <p:cxnSp>
-        <p:nvCxnSpPr>
-          <p:cNvPr id="232" name="꺾인 연결선 231"/>
-          <p:cNvCxnSpPr>
-            <a:stCxn id="552" idx="2"/>
-            <a:endCxn id="551" idx="0"/>
-          </p:cNvCxnSpPr>
-          <p:nvPr/>
-        </p:nvCxnSpPr>
-        <p:spPr>
-          <a:xfrm rot="5400000">
-            <a:off x="6768244" y="2708920"/>
-            <a:ext cx="720080" cy="12700"/>
-          </a:xfrm>
-          <a:prstGeom prst="bentConnector3">
-            <a:avLst>
-              <a:gd name="adj1" fmla="val 50000"/>
-            </a:avLst>
-          </a:prstGeom>
-          <a:ln>
-            <a:tailEnd type="triangle" w="sm" len="sm"/>
-          </a:ln>
-        </p:spPr>
-        <p:style>
-          <a:lnRef idx="1">
-            <a:schemeClr val="accent1"/>
-          </a:lnRef>
-          <a:fillRef idx="0">
-            <a:schemeClr val="accent1"/>
-          </a:fillRef>
-          <a:effectRef idx="0">
-            <a:schemeClr val="accent1"/>
-          </a:effectRef>
-          <a:fontRef idx="minor">
-            <a:schemeClr val="tx1"/>
-          </a:fontRef>
-        </p:style>
-      </p:cxnSp>
-      <p:cxnSp>
-        <p:nvCxnSpPr>
-          <p:cNvPr id="235" name="꺾인 연결선 234"/>
-          <p:cNvCxnSpPr>
-            <a:stCxn id="558" idx="2"/>
-            <a:endCxn id="557" idx="0"/>
-          </p:cNvCxnSpPr>
-          <p:nvPr/>
-        </p:nvCxnSpPr>
-        <p:spPr>
-          <a:xfrm rot="5400000">
-            <a:off x="7344308" y="2708920"/>
-            <a:ext cx="720080" cy="12700"/>
-          </a:xfrm>
-          <a:prstGeom prst="bentConnector3">
-            <a:avLst>
-              <a:gd name="adj1" fmla="val 50000"/>
-            </a:avLst>
-          </a:prstGeom>
-          <a:ln>
-            <a:tailEnd type="triangle" w="sm" len="sm"/>
-          </a:ln>
-        </p:spPr>
-        <p:style>
-          <a:lnRef idx="1">
-            <a:schemeClr val="accent1"/>
-          </a:lnRef>
-          <a:fillRef idx="0">
-            <a:schemeClr val="accent1"/>
-          </a:fillRef>
-          <a:effectRef idx="0">
-            <a:schemeClr val="accent1"/>
-          </a:effectRef>
-          <a:fontRef idx="minor">
-            <a:schemeClr val="tx1"/>
-          </a:fontRef>
-        </p:style>
-      </p:cxnSp>
-      <p:cxnSp>
-        <p:nvCxnSpPr>
-          <p:cNvPr id="238" name="꺾인 연결선 237"/>
-          <p:cNvCxnSpPr>
-            <a:stCxn id="587" idx="2"/>
-            <a:endCxn id="586" idx="0"/>
-          </p:cNvCxnSpPr>
-          <p:nvPr/>
-        </p:nvCxnSpPr>
-        <p:spPr>
-          <a:xfrm rot="16200000" flipH="1">
-            <a:off x="7380312" y="2024844"/>
-            <a:ext cx="1584176" cy="504056"/>
-          </a:xfrm>
-          <a:prstGeom prst="bentConnector3">
-            <a:avLst>
-              <a:gd name="adj1" fmla="val 50000"/>
-            </a:avLst>
-          </a:prstGeom>
-          <a:ln>
-            <a:tailEnd type="triangle" w="sm" len="sm"/>
-          </a:ln>
-        </p:spPr>
-        <p:style>
-          <a:lnRef idx="1">
-            <a:schemeClr val="accent1"/>
-          </a:lnRef>
-          <a:fillRef idx="0">
-            <a:schemeClr val="accent1"/>
-          </a:fillRef>
-          <a:effectRef idx="0">
-            <a:schemeClr val="accent1"/>
-          </a:effectRef>
-          <a:fontRef idx="minor">
-            <a:schemeClr val="tx1"/>
-          </a:fontRef>
-        </p:style>
-      </p:cxnSp>
-      <p:cxnSp>
-        <p:nvCxnSpPr>
           <p:cNvPr id="245" name="꺾인 연결선 244"/>
           <p:cNvCxnSpPr>
-            <a:stCxn id="136" idx="2"/>
             <a:endCxn id="135" idx="0"/>
           </p:cNvCxnSpPr>
           <p:nvPr/>
@@ -10155,158 +8052,6 @@
       </p:cxnSp>
       <p:cxnSp>
         <p:nvCxnSpPr>
-          <p:cNvPr id="274" name="꺾인 연결선 273"/>
-          <p:cNvCxnSpPr>
-            <a:stCxn id="539" idx="0"/>
-            <a:endCxn id="538" idx="2"/>
-          </p:cNvCxnSpPr>
-          <p:nvPr/>
-        </p:nvCxnSpPr>
-        <p:spPr>
-          <a:xfrm rot="5400000" flipH="1" flipV="1">
-            <a:off x="5544108" y="2708920"/>
-            <a:ext cx="720080" cy="12700"/>
-          </a:xfrm>
-          <a:prstGeom prst="bentConnector3">
-            <a:avLst>
-              <a:gd name="adj1" fmla="val 50000"/>
-            </a:avLst>
-          </a:prstGeom>
-          <a:ln>
-            <a:tailEnd type="triangle" w="sm" len="sm"/>
-          </a:ln>
-        </p:spPr>
-        <p:style>
-          <a:lnRef idx="1">
-            <a:schemeClr val="accent1"/>
-          </a:lnRef>
-          <a:fillRef idx="0">
-            <a:schemeClr val="accent1"/>
-          </a:fillRef>
-          <a:effectRef idx="0">
-            <a:schemeClr val="accent1"/>
-          </a:effectRef>
-          <a:fontRef idx="minor">
-            <a:schemeClr val="tx1"/>
-          </a:fontRef>
-        </p:style>
-      </p:cxnSp>
-      <p:cxnSp>
-        <p:nvCxnSpPr>
-          <p:cNvPr id="283" name="꺾인 연결선 282"/>
-          <p:cNvCxnSpPr>
-            <a:stCxn id="549" idx="0"/>
-            <a:endCxn id="548" idx="2"/>
-          </p:cNvCxnSpPr>
-          <p:nvPr/>
-        </p:nvCxnSpPr>
-        <p:spPr>
-          <a:xfrm rot="5400000" flipH="1" flipV="1">
-            <a:off x="6120172" y="2708920"/>
-            <a:ext cx="720080" cy="12700"/>
-          </a:xfrm>
-          <a:prstGeom prst="bentConnector3">
-            <a:avLst>
-              <a:gd name="adj1" fmla="val 50000"/>
-            </a:avLst>
-          </a:prstGeom>
-          <a:ln>
-            <a:tailEnd type="triangle" w="sm" len="sm"/>
-          </a:ln>
-        </p:spPr>
-        <p:style>
-          <a:lnRef idx="1">
-            <a:schemeClr val="accent1"/>
-          </a:lnRef>
-          <a:fillRef idx="0">
-            <a:schemeClr val="accent1"/>
-          </a:fillRef>
-          <a:effectRef idx="0">
-            <a:schemeClr val="accent1"/>
-          </a:effectRef>
-          <a:fontRef idx="minor">
-            <a:schemeClr val="tx1"/>
-          </a:fontRef>
-        </p:style>
-      </p:cxnSp>
-      <p:cxnSp>
-        <p:nvCxnSpPr>
-          <p:cNvPr id="290" name="꺾인 연결선 289"/>
-          <p:cNvCxnSpPr>
-            <a:stCxn id="555" idx="0"/>
-            <a:endCxn id="554" idx="2"/>
-          </p:cNvCxnSpPr>
-          <p:nvPr/>
-        </p:nvCxnSpPr>
-        <p:spPr>
-          <a:xfrm rot="5400000" flipH="1" flipV="1">
-            <a:off x="6696236" y="2708920"/>
-            <a:ext cx="720080" cy="12700"/>
-          </a:xfrm>
-          <a:prstGeom prst="bentConnector3">
-            <a:avLst>
-              <a:gd name="adj1" fmla="val 50000"/>
-            </a:avLst>
-          </a:prstGeom>
-          <a:ln>
-            <a:tailEnd type="triangle" w="sm" len="sm"/>
-          </a:ln>
-        </p:spPr>
-        <p:style>
-          <a:lnRef idx="1">
-            <a:schemeClr val="accent1"/>
-          </a:lnRef>
-          <a:fillRef idx="0">
-            <a:schemeClr val="accent1"/>
-          </a:fillRef>
-          <a:effectRef idx="0">
-            <a:schemeClr val="accent1"/>
-          </a:effectRef>
-          <a:fontRef idx="minor">
-            <a:schemeClr val="tx1"/>
-          </a:fontRef>
-        </p:style>
-      </p:cxnSp>
-      <p:cxnSp>
-        <p:nvCxnSpPr>
-          <p:cNvPr id="294" name="꺾인 연결선 293"/>
-          <p:cNvCxnSpPr>
-            <a:stCxn id="561" idx="0"/>
-            <a:endCxn id="560" idx="2"/>
-          </p:cNvCxnSpPr>
-          <p:nvPr/>
-        </p:nvCxnSpPr>
-        <p:spPr>
-          <a:xfrm rot="5400000" flipH="1" flipV="1">
-            <a:off x="7272300" y="2708920"/>
-            <a:ext cx="720080" cy="12700"/>
-          </a:xfrm>
-          <a:prstGeom prst="bentConnector3">
-            <a:avLst>
-              <a:gd name="adj1" fmla="val 50000"/>
-            </a:avLst>
-          </a:prstGeom>
-          <a:ln>
-            <a:tailEnd type="triangle" w="sm" len="sm"/>
-          </a:ln>
-        </p:spPr>
-        <p:style>
-          <a:lnRef idx="1">
-            <a:schemeClr val="accent1"/>
-          </a:lnRef>
-          <a:fillRef idx="0">
-            <a:schemeClr val="accent1"/>
-          </a:fillRef>
-          <a:effectRef idx="0">
-            <a:schemeClr val="accent1"/>
-          </a:effectRef>
-          <a:fontRef idx="minor">
-            <a:schemeClr val="tx1"/>
-          </a:fontRef>
-        </p:style>
-      </p:cxnSp>
-      <p:cxnSp>
-        <p:nvCxnSpPr>
           <p:cNvPr id="298" name="꺾인 연결선 297"/>
           <p:cNvCxnSpPr>
             <a:stCxn id="163" idx="0"/>
@@ -10380,10 +8125,2471 @@
           </a:fontRef>
         </p:style>
       </p:cxnSp>
+      <p:sp>
+        <p:nvSpPr>
+          <p:cNvPr id="195" name="직사각형 194"/>
+          <p:cNvSpPr/>
+          <p:nvPr/>
+        </p:nvSpPr>
+        <p:spPr>
+          <a:xfrm>
+            <a:off x="4355976" y="2708920"/>
+            <a:ext cx="72008" cy="72008"/>
+          </a:xfrm>
+          <a:prstGeom prst="rect">
+            <a:avLst/>
+          </a:prstGeom>
+          <a:noFill/>
+          <a:ln>
+            <a:noFill/>
+          </a:ln>
+        </p:spPr>
+        <p:style>
+          <a:lnRef idx="2">
+            <a:schemeClr val="accent1">
+              <a:shade val="50000"/>
+            </a:schemeClr>
+          </a:lnRef>
+          <a:fillRef idx="1">
+            <a:schemeClr val="accent1"/>
+          </a:fillRef>
+          <a:effectRef idx="0">
+            <a:schemeClr val="accent1"/>
+          </a:effectRef>
+          <a:fontRef idx="minor">
+            <a:schemeClr val="lt1"/>
+          </a:fontRef>
+        </p:style>
+        <p:txBody>
+          <a:bodyPr rtlCol="0" anchor="ctr"/>
+          <a:lstStyle/>
+          <a:p>
+            <a:pPr algn="ctr"/>
+            <a:endParaRPr lang="ko-KR" altLang="en-US"/>
+          </a:p>
+        </p:txBody>
+      </p:sp>
+      <p:sp>
+        <p:nvSpPr>
+          <p:cNvPr id="198" name="직사각형 197"/>
+          <p:cNvSpPr/>
+          <p:nvPr/>
+        </p:nvSpPr>
+        <p:spPr>
+          <a:xfrm>
+            <a:off x="4355976" y="3068960"/>
+            <a:ext cx="72008" cy="72008"/>
+          </a:xfrm>
+          <a:prstGeom prst="rect">
+            <a:avLst/>
+          </a:prstGeom>
+          <a:noFill/>
+          <a:ln>
+            <a:noFill/>
+          </a:ln>
+        </p:spPr>
+        <p:style>
+          <a:lnRef idx="2">
+            <a:schemeClr val="accent1">
+              <a:shade val="50000"/>
+            </a:schemeClr>
+          </a:lnRef>
+          <a:fillRef idx="1">
+            <a:schemeClr val="accent1"/>
+          </a:fillRef>
+          <a:effectRef idx="0">
+            <a:schemeClr val="accent1"/>
+          </a:effectRef>
+          <a:fontRef idx="minor">
+            <a:schemeClr val="lt1"/>
+          </a:fontRef>
+        </p:style>
+        <p:txBody>
+          <a:bodyPr rtlCol="0" anchor="ctr"/>
+          <a:lstStyle/>
+          <a:p>
+            <a:pPr algn="ctr"/>
+            <a:endParaRPr lang="ko-KR" altLang="en-US"/>
+          </a:p>
+        </p:txBody>
+      </p:sp>
+      <p:sp>
+        <p:nvSpPr>
+          <p:cNvPr id="199" name="직사각형 198"/>
+          <p:cNvSpPr/>
+          <p:nvPr/>
+        </p:nvSpPr>
+        <p:spPr>
+          <a:xfrm>
+            <a:off x="6166950" y="1626900"/>
+            <a:ext cx="687620" cy="234906"/>
+          </a:xfrm>
+          <a:prstGeom prst="rect">
+            <a:avLst/>
+          </a:prstGeom>
+          <a:solidFill>
+            <a:schemeClr val="accent6">
+              <a:lumMod val="60000"/>
+              <a:lumOff val="40000"/>
+            </a:schemeClr>
+          </a:solidFill>
+          <a:ln w="6350">
+            <a:solidFill>
+              <a:schemeClr val="bg1"/>
+            </a:solidFill>
+          </a:ln>
+        </p:spPr>
+        <p:style>
+          <a:lnRef idx="2">
+            <a:schemeClr val="accent1">
+              <a:shade val="50000"/>
+            </a:schemeClr>
+          </a:lnRef>
+          <a:fillRef idx="1">
+            <a:schemeClr val="accent1"/>
+          </a:fillRef>
+          <a:effectRef idx="0">
+            <a:schemeClr val="accent1"/>
+          </a:effectRef>
+          <a:fontRef idx="minor">
+            <a:schemeClr val="lt1"/>
+          </a:fontRef>
+        </p:style>
+        <p:txBody>
+          <a:bodyPr rtlCol="0" anchor="ctr"/>
+          <a:lstStyle/>
+          <a:p>
+            <a:pPr algn="ctr"/>
+            <a:r>
+              <a:rPr lang="en-US" altLang="ko-KR" sz="800" dirty="0" err="1" smtClean="0">
+                <a:solidFill>
+                  <a:schemeClr val="bg1"/>
+                </a:solidFill>
+              </a:rPr>
+              <a:t>RuleSet</a:t>
+            </a:r>
+            <a:endParaRPr lang="ko-KR" altLang="en-US" sz="800" dirty="0">
+              <a:solidFill>
+                <a:schemeClr val="bg1"/>
+              </a:solidFill>
+            </a:endParaRPr>
+          </a:p>
+        </p:txBody>
+      </p:sp>
+      <p:sp>
+        <p:nvSpPr>
+          <p:cNvPr id="202" name="TextBox 201"/>
+          <p:cNvSpPr txBox="1"/>
+          <p:nvPr/>
+        </p:nvSpPr>
+        <p:spPr>
+          <a:xfrm>
+            <a:off x="6234338" y="1030876"/>
+            <a:ext cx="774086" cy="215444"/>
+          </a:xfrm>
+          <a:prstGeom prst="rect">
+            <a:avLst/>
+          </a:prstGeom>
+          <a:noFill/>
+        </p:spPr>
+        <p:txBody>
+          <a:bodyPr wrap="square" rtlCol="0">
+            <a:spAutoFit/>
+          </a:bodyPr>
+          <a:lstStyle/>
+          <a:p>
+            <a:r>
+              <a:rPr lang="en-US" altLang="ko-KR" sz="800" dirty="0" smtClean="0">
+                <a:solidFill>
+                  <a:schemeClr val="bg1"/>
+                </a:solidFill>
+              </a:rPr>
+              <a:t>save rule </a:t>
+            </a:r>
+          </a:p>
+        </p:txBody>
+      </p:sp>
+      <p:sp>
+        <p:nvSpPr>
+          <p:cNvPr id="207" name="TextBox 206"/>
+          <p:cNvSpPr txBox="1"/>
+          <p:nvPr/>
+        </p:nvSpPr>
+        <p:spPr>
+          <a:xfrm>
+            <a:off x="6033972" y="1340768"/>
+            <a:ext cx="864096" cy="215444"/>
+          </a:xfrm>
+          <a:prstGeom prst="rect">
+            <a:avLst/>
+          </a:prstGeom>
+          <a:noFill/>
+        </p:spPr>
+        <p:txBody>
+          <a:bodyPr wrap="square" rtlCol="0">
+            <a:spAutoFit/>
+          </a:bodyPr>
+          <a:lstStyle/>
+          <a:p>
+            <a:r>
+              <a:rPr lang="en-US" altLang="ko-KR" sz="800" dirty="0" smtClean="0">
+                <a:solidFill>
+                  <a:schemeClr val="bg1"/>
+                </a:solidFill>
+              </a:rPr>
+              <a:t>load rules</a:t>
+            </a:r>
+            <a:endParaRPr lang="ko-KR" altLang="en-US" sz="800" dirty="0">
+              <a:solidFill>
+                <a:schemeClr val="bg1"/>
+              </a:solidFill>
+            </a:endParaRPr>
+          </a:p>
+        </p:txBody>
+      </p:sp>
+      <p:sp>
+        <p:nvSpPr>
+          <p:cNvPr id="211" name="TextBox 210"/>
+          <p:cNvSpPr txBox="1"/>
+          <p:nvPr/>
+        </p:nvSpPr>
+        <p:spPr>
+          <a:xfrm>
+            <a:off x="7221242" y="2385174"/>
+            <a:ext cx="1152128" cy="215444"/>
+          </a:xfrm>
+          <a:prstGeom prst="rect">
+            <a:avLst/>
+          </a:prstGeom>
+          <a:noFill/>
+        </p:spPr>
+        <p:txBody>
+          <a:bodyPr wrap="square" rtlCol="0">
+            <a:spAutoFit/>
+          </a:bodyPr>
+          <a:lstStyle/>
+          <a:p>
+            <a:r>
+              <a:rPr lang="en-US" altLang="ko-KR" sz="800" dirty="0" smtClean="0">
+                <a:solidFill>
+                  <a:schemeClr val="bg1"/>
+                </a:solidFill>
+              </a:rPr>
+              <a:t>register timed action</a:t>
+            </a:r>
+            <a:endParaRPr lang="ko-KR" altLang="en-US" sz="800" dirty="0">
+              <a:solidFill>
+                <a:schemeClr val="bg1"/>
+              </a:solidFill>
+            </a:endParaRPr>
+          </a:p>
+        </p:txBody>
+      </p:sp>
+      <p:sp>
+        <p:nvSpPr>
+          <p:cNvPr id="212" name="타원 211"/>
+          <p:cNvSpPr/>
+          <p:nvPr/>
+        </p:nvSpPr>
+        <p:spPr>
+          <a:xfrm>
+            <a:off x="7529158" y="963245"/>
+            <a:ext cx="935336" cy="288032"/>
+          </a:xfrm>
+          <a:prstGeom prst="ellipse">
+            <a:avLst/>
+          </a:prstGeom>
+          <a:solidFill>
+            <a:schemeClr val="tx1">
+              <a:lumMod val="85000"/>
+            </a:schemeClr>
+          </a:solidFill>
+          <a:ln w="3175">
+            <a:solidFill>
+              <a:schemeClr val="bg1"/>
+            </a:solidFill>
+          </a:ln>
+        </p:spPr>
+        <p:style>
+          <a:lnRef idx="2">
+            <a:schemeClr val="accent1">
+              <a:shade val="50000"/>
+            </a:schemeClr>
+          </a:lnRef>
+          <a:fillRef idx="1">
+            <a:schemeClr val="accent1"/>
+          </a:fillRef>
+          <a:effectRef idx="0">
+            <a:schemeClr val="accent1"/>
+          </a:effectRef>
+          <a:fontRef idx="minor">
+            <a:schemeClr val="lt1"/>
+          </a:fontRef>
+        </p:style>
+        <p:txBody>
+          <a:bodyPr rtlCol="0" anchor="ctr"/>
+          <a:lstStyle/>
+          <a:p>
+            <a:pPr algn="ctr"/>
+            <a:r>
+              <a:rPr lang="en-US" altLang="ko-KR" sz="800" dirty="0" smtClean="0">
+                <a:solidFill>
+                  <a:schemeClr val="bg1"/>
+                </a:solidFill>
+              </a:rPr>
+              <a:t>scheduler</a:t>
+            </a:r>
+            <a:endParaRPr lang="ko-KR" altLang="en-US" sz="800" dirty="0">
+              <a:solidFill>
+                <a:schemeClr val="bg1"/>
+              </a:solidFill>
+            </a:endParaRPr>
+          </a:p>
+        </p:txBody>
+      </p:sp>
+      <p:sp>
+        <p:nvSpPr>
+          <p:cNvPr id="213" name="TextBox 212"/>
+          <p:cNvSpPr txBox="1"/>
+          <p:nvPr/>
+        </p:nvSpPr>
+        <p:spPr>
+          <a:xfrm>
+            <a:off x="7834172" y="1245055"/>
+            <a:ext cx="842284" cy="338554"/>
+          </a:xfrm>
+          <a:prstGeom prst="rect">
+            <a:avLst/>
+          </a:prstGeom>
+          <a:noFill/>
+        </p:spPr>
+        <p:txBody>
+          <a:bodyPr wrap="square" rtlCol="0">
+            <a:spAutoFit/>
+          </a:bodyPr>
+          <a:lstStyle/>
+          <a:p>
+            <a:pPr algn="ctr"/>
+            <a:r>
+              <a:rPr lang="en-US" altLang="ko-KR" sz="800" dirty="0" smtClean="0">
+                <a:solidFill>
+                  <a:schemeClr val="bg1"/>
+                </a:solidFill>
+              </a:rPr>
+              <a:t>Delay action</a:t>
+            </a:r>
+          </a:p>
+          <a:p>
+            <a:pPr algn="ctr"/>
+            <a:r>
+              <a:rPr lang="en-US" altLang="ko-KR" sz="800" dirty="0" smtClean="0">
+                <a:solidFill>
+                  <a:schemeClr val="bg1"/>
+                </a:solidFill>
+              </a:rPr>
+              <a:t>action </a:t>
+            </a:r>
+          </a:p>
+        </p:txBody>
+      </p:sp>
+      <p:sp>
+        <p:nvSpPr>
+          <p:cNvPr id="214" name="직사각형 213"/>
+          <p:cNvSpPr/>
+          <p:nvPr/>
+        </p:nvSpPr>
+        <p:spPr>
+          <a:xfrm>
+            <a:off x="5940152" y="3068960"/>
+            <a:ext cx="72008" cy="72008"/>
+          </a:xfrm>
+          <a:prstGeom prst="rect">
+            <a:avLst/>
+          </a:prstGeom>
+          <a:noFill/>
+          <a:ln>
+            <a:noFill/>
+          </a:ln>
+        </p:spPr>
+        <p:style>
+          <a:lnRef idx="2">
+            <a:schemeClr val="accent1">
+              <a:shade val="50000"/>
+            </a:schemeClr>
+          </a:lnRef>
+          <a:fillRef idx="1">
+            <a:schemeClr val="accent1"/>
+          </a:fillRef>
+          <a:effectRef idx="0">
+            <a:schemeClr val="accent1"/>
+          </a:effectRef>
+          <a:fontRef idx="minor">
+            <a:schemeClr val="lt1"/>
+          </a:fontRef>
+        </p:style>
+        <p:txBody>
+          <a:bodyPr rtlCol="0" anchor="ctr"/>
+          <a:lstStyle/>
+          <a:p>
+            <a:pPr algn="ctr"/>
+            <a:endParaRPr lang="ko-KR" altLang="en-US"/>
+          </a:p>
+        </p:txBody>
+      </p:sp>
+      <p:sp>
+        <p:nvSpPr>
+          <p:cNvPr id="220" name="직사각형 219"/>
+          <p:cNvSpPr/>
+          <p:nvPr/>
+        </p:nvSpPr>
+        <p:spPr>
+          <a:xfrm>
+            <a:off x="5940152" y="2348879"/>
+            <a:ext cx="72008" cy="72008"/>
+          </a:xfrm>
+          <a:prstGeom prst="rect">
+            <a:avLst/>
+          </a:prstGeom>
+          <a:noFill/>
+          <a:ln>
+            <a:noFill/>
+          </a:ln>
+        </p:spPr>
+        <p:style>
+          <a:lnRef idx="2">
+            <a:schemeClr val="accent1">
+              <a:shade val="50000"/>
+            </a:schemeClr>
+          </a:lnRef>
+          <a:fillRef idx="1">
+            <a:schemeClr val="accent1"/>
+          </a:fillRef>
+          <a:effectRef idx="0">
+            <a:schemeClr val="accent1"/>
+          </a:effectRef>
+          <a:fontRef idx="minor">
+            <a:schemeClr val="lt1"/>
+          </a:fontRef>
+        </p:style>
+        <p:txBody>
+          <a:bodyPr rtlCol="0" anchor="ctr"/>
+          <a:lstStyle/>
+          <a:p>
+            <a:pPr algn="ctr"/>
+            <a:endParaRPr lang="ko-KR" altLang="en-US"/>
+          </a:p>
+        </p:txBody>
+      </p:sp>
+      <p:sp>
+        <p:nvSpPr>
+          <p:cNvPr id="226" name="직사각형 225"/>
+          <p:cNvSpPr/>
+          <p:nvPr/>
+        </p:nvSpPr>
+        <p:spPr>
+          <a:xfrm>
+            <a:off x="5868144" y="2348879"/>
+            <a:ext cx="72008" cy="72008"/>
+          </a:xfrm>
+          <a:prstGeom prst="rect">
+            <a:avLst/>
+          </a:prstGeom>
+          <a:noFill/>
+          <a:ln>
+            <a:noFill/>
+          </a:ln>
+        </p:spPr>
+        <p:style>
+          <a:lnRef idx="2">
+            <a:schemeClr val="accent1">
+              <a:shade val="50000"/>
+            </a:schemeClr>
+          </a:lnRef>
+          <a:fillRef idx="1">
+            <a:schemeClr val="accent1"/>
+          </a:fillRef>
+          <a:effectRef idx="0">
+            <a:schemeClr val="accent1"/>
+          </a:effectRef>
+          <a:fontRef idx="minor">
+            <a:schemeClr val="lt1"/>
+          </a:fontRef>
+        </p:style>
+        <p:txBody>
+          <a:bodyPr rtlCol="0" anchor="ctr"/>
+          <a:lstStyle/>
+          <a:p>
+            <a:pPr algn="ctr"/>
+            <a:endParaRPr lang="ko-KR" altLang="en-US"/>
+          </a:p>
+        </p:txBody>
+      </p:sp>
+      <p:sp>
+        <p:nvSpPr>
+          <p:cNvPr id="229" name="직사각형 228"/>
+          <p:cNvSpPr/>
+          <p:nvPr/>
+        </p:nvSpPr>
+        <p:spPr>
+          <a:xfrm>
+            <a:off x="5868144" y="3068960"/>
+            <a:ext cx="72008" cy="72008"/>
+          </a:xfrm>
+          <a:prstGeom prst="rect">
+            <a:avLst/>
+          </a:prstGeom>
+          <a:noFill/>
+          <a:ln>
+            <a:noFill/>
+          </a:ln>
+        </p:spPr>
+        <p:style>
+          <a:lnRef idx="2">
+            <a:schemeClr val="accent1">
+              <a:shade val="50000"/>
+            </a:schemeClr>
+          </a:lnRef>
+          <a:fillRef idx="1">
+            <a:schemeClr val="accent1"/>
+          </a:fillRef>
+          <a:effectRef idx="0">
+            <a:schemeClr val="accent1"/>
+          </a:effectRef>
+          <a:fontRef idx="minor">
+            <a:schemeClr val="lt1"/>
+          </a:fontRef>
+        </p:style>
+        <p:txBody>
+          <a:bodyPr rtlCol="0" anchor="ctr"/>
+          <a:lstStyle/>
+          <a:p>
+            <a:pPr algn="ctr"/>
+            <a:endParaRPr lang="ko-KR" altLang="en-US"/>
+          </a:p>
+        </p:txBody>
+      </p:sp>
+      <p:sp>
+        <p:nvSpPr>
+          <p:cNvPr id="233" name="직사각형 232"/>
+          <p:cNvSpPr/>
+          <p:nvPr/>
+        </p:nvSpPr>
+        <p:spPr>
+          <a:xfrm>
+            <a:off x="6516216" y="3068960"/>
+            <a:ext cx="72008" cy="72008"/>
+          </a:xfrm>
+          <a:prstGeom prst="rect">
+            <a:avLst/>
+          </a:prstGeom>
+          <a:noFill/>
+          <a:ln>
+            <a:noFill/>
+          </a:ln>
+        </p:spPr>
+        <p:style>
+          <a:lnRef idx="2">
+            <a:schemeClr val="accent1">
+              <a:shade val="50000"/>
+            </a:schemeClr>
+          </a:lnRef>
+          <a:fillRef idx="1">
+            <a:schemeClr val="accent1"/>
+          </a:fillRef>
+          <a:effectRef idx="0">
+            <a:schemeClr val="accent1"/>
+          </a:effectRef>
+          <a:fontRef idx="minor">
+            <a:schemeClr val="lt1"/>
+          </a:fontRef>
+        </p:style>
+        <p:txBody>
+          <a:bodyPr rtlCol="0" anchor="ctr"/>
+          <a:lstStyle/>
+          <a:p>
+            <a:pPr algn="ctr"/>
+            <a:endParaRPr lang="ko-KR" altLang="en-US"/>
+          </a:p>
+        </p:txBody>
+      </p:sp>
+      <p:sp>
+        <p:nvSpPr>
+          <p:cNvPr id="234" name="직사각형 233"/>
+          <p:cNvSpPr/>
+          <p:nvPr/>
+        </p:nvSpPr>
+        <p:spPr>
+          <a:xfrm>
+            <a:off x="6516216" y="2348879"/>
+            <a:ext cx="72008" cy="72008"/>
+          </a:xfrm>
+          <a:prstGeom prst="rect">
+            <a:avLst/>
+          </a:prstGeom>
+          <a:noFill/>
+          <a:ln>
+            <a:noFill/>
+          </a:ln>
+        </p:spPr>
+        <p:style>
+          <a:lnRef idx="2">
+            <a:schemeClr val="accent1">
+              <a:shade val="50000"/>
+            </a:schemeClr>
+          </a:lnRef>
+          <a:fillRef idx="1">
+            <a:schemeClr val="accent1"/>
+          </a:fillRef>
+          <a:effectRef idx="0">
+            <a:schemeClr val="accent1"/>
+          </a:effectRef>
+          <a:fontRef idx="minor">
+            <a:schemeClr val="lt1"/>
+          </a:fontRef>
+        </p:style>
+        <p:txBody>
+          <a:bodyPr rtlCol="0" anchor="ctr"/>
+          <a:lstStyle/>
+          <a:p>
+            <a:pPr algn="ctr"/>
+            <a:endParaRPr lang="ko-KR" altLang="en-US"/>
+          </a:p>
+        </p:txBody>
+      </p:sp>
+      <p:sp>
+        <p:nvSpPr>
+          <p:cNvPr id="236" name="직사각형 235"/>
+          <p:cNvSpPr/>
+          <p:nvPr/>
+        </p:nvSpPr>
+        <p:spPr>
+          <a:xfrm>
+            <a:off x="6444208" y="2348879"/>
+            <a:ext cx="72008" cy="72008"/>
+          </a:xfrm>
+          <a:prstGeom prst="rect">
+            <a:avLst/>
+          </a:prstGeom>
+          <a:noFill/>
+          <a:ln>
+            <a:noFill/>
+          </a:ln>
+        </p:spPr>
+        <p:style>
+          <a:lnRef idx="2">
+            <a:schemeClr val="accent1">
+              <a:shade val="50000"/>
+            </a:schemeClr>
+          </a:lnRef>
+          <a:fillRef idx="1">
+            <a:schemeClr val="accent1"/>
+          </a:fillRef>
+          <a:effectRef idx="0">
+            <a:schemeClr val="accent1"/>
+          </a:effectRef>
+          <a:fontRef idx="minor">
+            <a:schemeClr val="lt1"/>
+          </a:fontRef>
+        </p:style>
+        <p:txBody>
+          <a:bodyPr rtlCol="0" anchor="ctr"/>
+          <a:lstStyle/>
+          <a:p>
+            <a:pPr algn="ctr"/>
+            <a:endParaRPr lang="ko-KR" altLang="en-US"/>
+          </a:p>
+        </p:txBody>
+      </p:sp>
+      <p:sp>
+        <p:nvSpPr>
+          <p:cNvPr id="237" name="직사각형 236"/>
+          <p:cNvSpPr/>
+          <p:nvPr/>
+        </p:nvSpPr>
+        <p:spPr>
+          <a:xfrm>
+            <a:off x="6444208" y="3068960"/>
+            <a:ext cx="72008" cy="72008"/>
+          </a:xfrm>
+          <a:prstGeom prst="rect">
+            <a:avLst/>
+          </a:prstGeom>
+          <a:noFill/>
+          <a:ln>
+            <a:noFill/>
+          </a:ln>
+        </p:spPr>
+        <p:style>
+          <a:lnRef idx="2">
+            <a:schemeClr val="accent1">
+              <a:shade val="50000"/>
+            </a:schemeClr>
+          </a:lnRef>
+          <a:fillRef idx="1">
+            <a:schemeClr val="accent1"/>
+          </a:fillRef>
+          <a:effectRef idx="0">
+            <a:schemeClr val="accent1"/>
+          </a:effectRef>
+          <a:fontRef idx="minor">
+            <a:schemeClr val="lt1"/>
+          </a:fontRef>
+        </p:style>
+        <p:txBody>
+          <a:bodyPr rtlCol="0" anchor="ctr"/>
+          <a:lstStyle/>
+          <a:p>
+            <a:pPr algn="ctr"/>
+            <a:endParaRPr lang="ko-KR" altLang="en-US"/>
+          </a:p>
+        </p:txBody>
+      </p:sp>
+      <p:sp>
+        <p:nvSpPr>
+          <p:cNvPr id="241" name="직사각형 240"/>
+          <p:cNvSpPr/>
+          <p:nvPr/>
+        </p:nvSpPr>
+        <p:spPr>
+          <a:xfrm>
+            <a:off x="7092280" y="3068960"/>
+            <a:ext cx="72008" cy="72008"/>
+          </a:xfrm>
+          <a:prstGeom prst="rect">
+            <a:avLst/>
+          </a:prstGeom>
+          <a:noFill/>
+          <a:ln>
+            <a:noFill/>
+          </a:ln>
+        </p:spPr>
+        <p:style>
+          <a:lnRef idx="2">
+            <a:schemeClr val="accent1">
+              <a:shade val="50000"/>
+            </a:schemeClr>
+          </a:lnRef>
+          <a:fillRef idx="1">
+            <a:schemeClr val="accent1"/>
+          </a:fillRef>
+          <a:effectRef idx="0">
+            <a:schemeClr val="accent1"/>
+          </a:effectRef>
+          <a:fontRef idx="minor">
+            <a:schemeClr val="lt1"/>
+          </a:fontRef>
+        </p:style>
+        <p:txBody>
+          <a:bodyPr rtlCol="0" anchor="ctr"/>
+          <a:lstStyle/>
+          <a:p>
+            <a:pPr algn="ctr"/>
+            <a:endParaRPr lang="ko-KR" altLang="en-US"/>
+          </a:p>
+        </p:txBody>
+      </p:sp>
+      <p:sp>
+        <p:nvSpPr>
+          <p:cNvPr id="244" name="직사각형 243"/>
+          <p:cNvSpPr/>
+          <p:nvPr/>
+        </p:nvSpPr>
+        <p:spPr>
+          <a:xfrm>
+            <a:off x="7092280" y="2348879"/>
+            <a:ext cx="72008" cy="72008"/>
+          </a:xfrm>
+          <a:prstGeom prst="rect">
+            <a:avLst/>
+          </a:prstGeom>
+          <a:noFill/>
+          <a:ln>
+            <a:noFill/>
+          </a:ln>
+        </p:spPr>
+        <p:style>
+          <a:lnRef idx="2">
+            <a:schemeClr val="accent1">
+              <a:shade val="50000"/>
+            </a:schemeClr>
+          </a:lnRef>
+          <a:fillRef idx="1">
+            <a:schemeClr val="accent1"/>
+          </a:fillRef>
+          <a:effectRef idx="0">
+            <a:schemeClr val="accent1"/>
+          </a:effectRef>
+          <a:fontRef idx="minor">
+            <a:schemeClr val="lt1"/>
+          </a:fontRef>
+        </p:style>
+        <p:txBody>
+          <a:bodyPr rtlCol="0" anchor="ctr"/>
+          <a:lstStyle/>
+          <a:p>
+            <a:pPr algn="ctr"/>
+            <a:endParaRPr lang="ko-KR" altLang="en-US"/>
+          </a:p>
+        </p:txBody>
+      </p:sp>
+      <p:sp>
+        <p:nvSpPr>
+          <p:cNvPr id="246" name="직사각형 245"/>
+          <p:cNvSpPr/>
+          <p:nvPr/>
+        </p:nvSpPr>
+        <p:spPr>
+          <a:xfrm>
+            <a:off x="7020272" y="2348879"/>
+            <a:ext cx="72008" cy="72008"/>
+          </a:xfrm>
+          <a:prstGeom prst="rect">
+            <a:avLst/>
+          </a:prstGeom>
+          <a:noFill/>
+          <a:ln>
+            <a:noFill/>
+          </a:ln>
+        </p:spPr>
+        <p:style>
+          <a:lnRef idx="2">
+            <a:schemeClr val="accent1">
+              <a:shade val="50000"/>
+            </a:schemeClr>
+          </a:lnRef>
+          <a:fillRef idx="1">
+            <a:schemeClr val="accent1"/>
+          </a:fillRef>
+          <a:effectRef idx="0">
+            <a:schemeClr val="accent1"/>
+          </a:effectRef>
+          <a:fontRef idx="minor">
+            <a:schemeClr val="lt1"/>
+          </a:fontRef>
+        </p:style>
+        <p:txBody>
+          <a:bodyPr rtlCol="0" anchor="ctr"/>
+          <a:lstStyle/>
+          <a:p>
+            <a:pPr algn="ctr"/>
+            <a:endParaRPr lang="ko-KR" altLang="en-US"/>
+          </a:p>
+        </p:txBody>
+      </p:sp>
+      <p:sp>
+        <p:nvSpPr>
+          <p:cNvPr id="249" name="직사각형 248"/>
+          <p:cNvSpPr/>
+          <p:nvPr/>
+        </p:nvSpPr>
+        <p:spPr>
+          <a:xfrm>
+            <a:off x="7020272" y="3068960"/>
+            <a:ext cx="72008" cy="72008"/>
+          </a:xfrm>
+          <a:prstGeom prst="rect">
+            <a:avLst/>
+          </a:prstGeom>
+          <a:noFill/>
+          <a:ln>
+            <a:noFill/>
+          </a:ln>
+        </p:spPr>
+        <p:style>
+          <a:lnRef idx="2">
+            <a:schemeClr val="accent1">
+              <a:shade val="50000"/>
+            </a:schemeClr>
+          </a:lnRef>
+          <a:fillRef idx="1">
+            <a:schemeClr val="accent1"/>
+          </a:fillRef>
+          <a:effectRef idx="0">
+            <a:schemeClr val="accent1"/>
+          </a:effectRef>
+          <a:fontRef idx="minor">
+            <a:schemeClr val="lt1"/>
+          </a:fontRef>
+        </p:style>
+        <p:txBody>
+          <a:bodyPr rtlCol="0" anchor="ctr"/>
+          <a:lstStyle/>
+          <a:p>
+            <a:pPr algn="ctr"/>
+            <a:endParaRPr lang="ko-KR" altLang="en-US"/>
+          </a:p>
+        </p:txBody>
+      </p:sp>
+      <p:sp>
+        <p:nvSpPr>
+          <p:cNvPr id="253" name="직사각형 252"/>
+          <p:cNvSpPr/>
+          <p:nvPr/>
+        </p:nvSpPr>
+        <p:spPr>
+          <a:xfrm>
+            <a:off x="7668344" y="3068960"/>
+            <a:ext cx="72008" cy="72008"/>
+          </a:xfrm>
+          <a:prstGeom prst="rect">
+            <a:avLst/>
+          </a:prstGeom>
+          <a:noFill/>
+          <a:ln>
+            <a:noFill/>
+          </a:ln>
+        </p:spPr>
+        <p:style>
+          <a:lnRef idx="2">
+            <a:schemeClr val="accent1">
+              <a:shade val="50000"/>
+            </a:schemeClr>
+          </a:lnRef>
+          <a:fillRef idx="1">
+            <a:schemeClr val="accent1"/>
+          </a:fillRef>
+          <a:effectRef idx="0">
+            <a:schemeClr val="accent1"/>
+          </a:effectRef>
+          <a:fontRef idx="minor">
+            <a:schemeClr val="lt1"/>
+          </a:fontRef>
+        </p:style>
+        <p:txBody>
+          <a:bodyPr rtlCol="0" anchor="ctr"/>
+          <a:lstStyle/>
+          <a:p>
+            <a:pPr algn="ctr"/>
+            <a:endParaRPr lang="ko-KR" altLang="en-US"/>
+          </a:p>
+        </p:txBody>
+      </p:sp>
+      <p:sp>
+        <p:nvSpPr>
+          <p:cNvPr id="254" name="직사각형 253"/>
+          <p:cNvSpPr/>
+          <p:nvPr/>
+        </p:nvSpPr>
+        <p:spPr>
+          <a:xfrm>
+            <a:off x="7668344" y="2348879"/>
+            <a:ext cx="72008" cy="72008"/>
+          </a:xfrm>
+          <a:prstGeom prst="rect">
+            <a:avLst/>
+          </a:prstGeom>
+          <a:noFill/>
+          <a:ln>
+            <a:noFill/>
+          </a:ln>
+        </p:spPr>
+        <p:style>
+          <a:lnRef idx="2">
+            <a:schemeClr val="accent1">
+              <a:shade val="50000"/>
+            </a:schemeClr>
+          </a:lnRef>
+          <a:fillRef idx="1">
+            <a:schemeClr val="accent1"/>
+          </a:fillRef>
+          <a:effectRef idx="0">
+            <a:schemeClr val="accent1"/>
+          </a:effectRef>
+          <a:fontRef idx="minor">
+            <a:schemeClr val="lt1"/>
+          </a:fontRef>
+        </p:style>
+        <p:txBody>
+          <a:bodyPr rtlCol="0" anchor="ctr"/>
+          <a:lstStyle/>
+          <a:p>
+            <a:pPr algn="ctr"/>
+            <a:endParaRPr lang="ko-KR" altLang="en-US"/>
+          </a:p>
+        </p:txBody>
+      </p:sp>
+      <p:sp>
+        <p:nvSpPr>
+          <p:cNvPr id="257" name="직사각형 256"/>
+          <p:cNvSpPr/>
+          <p:nvPr/>
+        </p:nvSpPr>
+        <p:spPr>
+          <a:xfrm>
+            <a:off x="7596336" y="2348879"/>
+            <a:ext cx="72008" cy="72008"/>
+          </a:xfrm>
+          <a:prstGeom prst="rect">
+            <a:avLst/>
+          </a:prstGeom>
+          <a:noFill/>
+          <a:ln>
+            <a:noFill/>
+          </a:ln>
+        </p:spPr>
+        <p:style>
+          <a:lnRef idx="2">
+            <a:schemeClr val="accent1">
+              <a:shade val="50000"/>
+            </a:schemeClr>
+          </a:lnRef>
+          <a:fillRef idx="1">
+            <a:schemeClr val="accent1"/>
+          </a:fillRef>
+          <a:effectRef idx="0">
+            <a:schemeClr val="accent1"/>
+          </a:effectRef>
+          <a:fontRef idx="minor">
+            <a:schemeClr val="lt1"/>
+          </a:fontRef>
+        </p:style>
+        <p:txBody>
+          <a:bodyPr rtlCol="0" anchor="ctr"/>
+          <a:lstStyle/>
+          <a:p>
+            <a:pPr algn="ctr"/>
+            <a:endParaRPr lang="ko-KR" altLang="en-US"/>
+          </a:p>
+        </p:txBody>
+      </p:sp>
+      <p:sp>
+        <p:nvSpPr>
+          <p:cNvPr id="261" name="직사각형 260"/>
+          <p:cNvSpPr/>
+          <p:nvPr/>
+        </p:nvSpPr>
+        <p:spPr>
+          <a:xfrm>
+            <a:off x="7596336" y="3068960"/>
+            <a:ext cx="72008" cy="72008"/>
+          </a:xfrm>
+          <a:prstGeom prst="rect">
+            <a:avLst/>
+          </a:prstGeom>
+          <a:noFill/>
+          <a:ln>
+            <a:noFill/>
+          </a:ln>
+        </p:spPr>
+        <p:style>
+          <a:lnRef idx="2">
+            <a:schemeClr val="accent1">
+              <a:shade val="50000"/>
+            </a:schemeClr>
+          </a:lnRef>
+          <a:fillRef idx="1">
+            <a:schemeClr val="accent1"/>
+          </a:fillRef>
+          <a:effectRef idx="0">
+            <a:schemeClr val="accent1"/>
+          </a:effectRef>
+          <a:fontRef idx="minor">
+            <a:schemeClr val="lt1"/>
+          </a:fontRef>
+        </p:style>
+        <p:txBody>
+          <a:bodyPr rtlCol="0" anchor="ctr"/>
+          <a:lstStyle/>
+          <a:p>
+            <a:pPr algn="ctr"/>
+            <a:endParaRPr lang="ko-KR" altLang="en-US"/>
+          </a:p>
+        </p:txBody>
+      </p:sp>
+      <p:sp>
+        <p:nvSpPr>
+          <p:cNvPr id="262" name="직사각형 261"/>
+          <p:cNvSpPr/>
+          <p:nvPr/>
+        </p:nvSpPr>
+        <p:spPr>
+          <a:xfrm>
+            <a:off x="8388424" y="3068960"/>
+            <a:ext cx="72008" cy="72008"/>
+          </a:xfrm>
+          <a:prstGeom prst="rect">
+            <a:avLst/>
+          </a:prstGeom>
+          <a:noFill/>
+          <a:ln>
+            <a:noFill/>
+          </a:ln>
+        </p:spPr>
+        <p:style>
+          <a:lnRef idx="2">
+            <a:schemeClr val="accent1">
+              <a:shade val="50000"/>
+            </a:schemeClr>
+          </a:lnRef>
+          <a:fillRef idx="1">
+            <a:schemeClr val="accent1"/>
+          </a:fillRef>
+          <a:effectRef idx="0">
+            <a:schemeClr val="accent1"/>
+          </a:effectRef>
+          <a:fontRef idx="minor">
+            <a:schemeClr val="lt1"/>
+          </a:fontRef>
+        </p:style>
+        <p:txBody>
+          <a:bodyPr rtlCol="0" anchor="ctr"/>
+          <a:lstStyle/>
+          <a:p>
+            <a:pPr algn="ctr"/>
+            <a:endParaRPr lang="ko-KR" altLang="en-US"/>
+          </a:p>
+        </p:txBody>
+      </p:sp>
+      <p:sp>
+        <p:nvSpPr>
+          <p:cNvPr id="263" name="직사각형 262"/>
+          <p:cNvSpPr/>
+          <p:nvPr/>
+        </p:nvSpPr>
+        <p:spPr>
+          <a:xfrm>
+            <a:off x="8050196" y="1274672"/>
+            <a:ext cx="72008" cy="72008"/>
+          </a:xfrm>
+          <a:prstGeom prst="rect">
+            <a:avLst/>
+          </a:prstGeom>
+          <a:noFill/>
+          <a:ln>
+            <a:noFill/>
+          </a:ln>
+        </p:spPr>
+        <p:style>
+          <a:lnRef idx="2">
+            <a:schemeClr val="accent1">
+              <a:shade val="50000"/>
+            </a:schemeClr>
+          </a:lnRef>
+          <a:fillRef idx="1">
+            <a:schemeClr val="accent1"/>
+          </a:fillRef>
+          <a:effectRef idx="0">
+            <a:schemeClr val="accent1"/>
+          </a:effectRef>
+          <a:fontRef idx="minor">
+            <a:schemeClr val="lt1"/>
+          </a:fontRef>
+        </p:style>
+        <p:txBody>
+          <a:bodyPr rtlCol="0" anchor="ctr"/>
+          <a:lstStyle/>
+          <a:p>
+            <a:pPr algn="ctr"/>
+            <a:endParaRPr lang="ko-KR" altLang="en-US"/>
+          </a:p>
+        </p:txBody>
+      </p:sp>
+      <p:cxnSp>
+        <p:nvCxnSpPr>
+          <p:cNvPr id="264" name="꺾인 연결선 409"/>
+          <p:cNvCxnSpPr>
+            <a:stCxn id="309" idx="3"/>
+            <a:endCxn id="199" idx="0"/>
+          </p:cNvCxnSpPr>
+          <p:nvPr/>
+        </p:nvCxnSpPr>
+        <p:spPr>
+          <a:xfrm rot="16200000" flipH="1">
+            <a:off x="6017121" y="1133261"/>
+            <a:ext cx="214140" cy="773138"/>
+          </a:xfrm>
+          <a:prstGeom prst="bentConnector3">
+            <a:avLst>
+              <a:gd name="adj1" fmla="val 50000"/>
+            </a:avLst>
+          </a:prstGeom>
+          <a:ln>
+            <a:solidFill>
+              <a:srgbClr val="7030A0"/>
+            </a:solidFill>
+            <a:headEnd type="oval" w="sm" len="sm"/>
+            <a:tailEnd type="triangle" w="sm" len="sm"/>
+          </a:ln>
+        </p:spPr>
+        <p:style>
+          <a:lnRef idx="1">
+            <a:schemeClr val="accent1"/>
+          </a:lnRef>
+          <a:fillRef idx="0">
+            <a:schemeClr val="accent1"/>
+          </a:fillRef>
+          <a:effectRef idx="0">
+            <a:schemeClr val="accent1"/>
+          </a:effectRef>
+          <a:fontRef idx="minor">
+            <a:schemeClr val="tx1"/>
+          </a:fontRef>
+        </p:style>
+      </p:cxnSp>
+      <p:sp>
+        <p:nvSpPr>
+          <p:cNvPr id="268" name="직사각형 267"/>
+          <p:cNvSpPr/>
+          <p:nvPr/>
+        </p:nvSpPr>
+        <p:spPr>
+          <a:xfrm>
+            <a:off x="6084168" y="914632"/>
+            <a:ext cx="936104" cy="215444"/>
+          </a:xfrm>
+          <a:prstGeom prst="rect">
+            <a:avLst/>
+          </a:prstGeom>
+        </p:spPr>
+        <p:txBody>
+          <a:bodyPr wrap="square">
+            <a:spAutoFit/>
+          </a:bodyPr>
+          <a:lstStyle/>
+          <a:p>
+            <a:pPr algn="ctr"/>
+            <a:r>
+              <a:rPr lang="en-US" altLang="ko-KR" sz="800" dirty="0" smtClean="0">
+                <a:solidFill>
+                  <a:srgbClr val="FF0000"/>
+                </a:solidFill>
+              </a:rPr>
+              <a:t>Rule manager</a:t>
+            </a:r>
+          </a:p>
+        </p:txBody>
+      </p:sp>
+      <p:sp>
+        <p:nvSpPr>
+          <p:cNvPr id="271" name="직사각형 270"/>
+          <p:cNvSpPr/>
+          <p:nvPr/>
+        </p:nvSpPr>
+        <p:spPr>
+          <a:xfrm>
+            <a:off x="4572000" y="914632"/>
+            <a:ext cx="4031680" cy="1866296"/>
+          </a:xfrm>
+          <a:prstGeom prst="rect">
+            <a:avLst/>
+          </a:prstGeom>
+          <a:noFill/>
+          <a:ln w="9525">
+            <a:solidFill>
+              <a:srgbClr val="FF0000"/>
+            </a:solidFill>
+            <a:prstDash val="dash"/>
+          </a:ln>
+        </p:spPr>
+        <p:style>
+          <a:lnRef idx="2">
+            <a:schemeClr val="accent1">
+              <a:shade val="50000"/>
+            </a:schemeClr>
+          </a:lnRef>
+          <a:fillRef idx="1">
+            <a:schemeClr val="accent1"/>
+          </a:fillRef>
+          <a:effectRef idx="0">
+            <a:schemeClr val="accent1"/>
+          </a:effectRef>
+          <a:fontRef idx="minor">
+            <a:schemeClr val="lt1"/>
+          </a:fontRef>
+        </p:style>
+        <p:txBody>
+          <a:bodyPr rtlCol="0" anchor="ctr" anchorCtr="0"/>
+          <a:lstStyle/>
+          <a:p>
+            <a:pPr algn="r"/>
+            <a:endParaRPr lang="en-US" altLang="ko-KR" sz="800" dirty="0" smtClean="0">
+              <a:solidFill>
+                <a:srgbClr val="FF0000"/>
+              </a:solidFill>
+            </a:endParaRPr>
+          </a:p>
+        </p:txBody>
+      </p:sp>
+      <p:cxnSp>
+        <p:nvCxnSpPr>
+          <p:cNvPr id="277" name="꺾인 연결선 276"/>
+          <p:cNvCxnSpPr>
+            <a:stCxn id="315" idx="2"/>
+            <a:endCxn id="253" idx="0"/>
+          </p:cNvCxnSpPr>
+          <p:nvPr/>
+        </p:nvCxnSpPr>
+        <p:spPr>
+          <a:xfrm rot="16200000" flipH="1">
+            <a:off x="7095034" y="2459646"/>
+            <a:ext cx="1212916" cy="5712"/>
+          </a:xfrm>
+          <a:prstGeom prst="bentConnector3">
+            <a:avLst>
+              <a:gd name="adj1" fmla="val 50000"/>
+            </a:avLst>
+          </a:prstGeom>
+          <a:ln>
+            <a:tailEnd type="triangle" w="sm" len="sm"/>
+          </a:ln>
+        </p:spPr>
+        <p:style>
+          <a:lnRef idx="1">
+            <a:schemeClr val="accent1"/>
+          </a:lnRef>
+          <a:fillRef idx="0">
+            <a:schemeClr val="accent1"/>
+          </a:fillRef>
+          <a:effectRef idx="0">
+            <a:schemeClr val="accent1"/>
+          </a:effectRef>
+          <a:fontRef idx="minor">
+            <a:schemeClr val="tx1"/>
+          </a:fontRef>
+        </p:style>
+      </p:cxnSp>
+      <p:cxnSp>
+        <p:nvCxnSpPr>
+          <p:cNvPr id="280" name="꺾인 연결선 279"/>
+          <p:cNvCxnSpPr>
+            <a:stCxn id="229" idx="0"/>
+            <a:endCxn id="289" idx="2"/>
+          </p:cNvCxnSpPr>
+          <p:nvPr/>
+        </p:nvCxnSpPr>
+        <p:spPr>
+          <a:xfrm rot="5400000" flipH="1" flipV="1">
+            <a:off x="5811325" y="2873751"/>
+            <a:ext cx="288032" cy="102386"/>
+          </a:xfrm>
+          <a:prstGeom prst="bentConnector3">
+            <a:avLst>
+              <a:gd name="adj1" fmla="val 50000"/>
+            </a:avLst>
+          </a:prstGeom>
+          <a:ln>
+            <a:tailEnd type="triangle" w="sm" len="sm"/>
+          </a:ln>
+        </p:spPr>
+        <p:style>
+          <a:lnRef idx="1">
+            <a:schemeClr val="accent1"/>
+          </a:lnRef>
+          <a:fillRef idx="0">
+            <a:schemeClr val="accent1"/>
+          </a:fillRef>
+          <a:effectRef idx="0">
+            <a:schemeClr val="accent1"/>
+          </a:effectRef>
+          <a:fontRef idx="minor">
+            <a:schemeClr val="tx1"/>
+          </a:fontRef>
+        </p:style>
+      </p:cxnSp>
+      <p:sp>
+        <p:nvSpPr>
+          <p:cNvPr id="286" name="타원 285"/>
+          <p:cNvSpPr/>
+          <p:nvPr/>
+        </p:nvSpPr>
+        <p:spPr>
+          <a:xfrm>
+            <a:off x="5471607" y="1988840"/>
+            <a:ext cx="1504728" cy="222374"/>
+          </a:xfrm>
+          <a:prstGeom prst="ellipse">
+            <a:avLst/>
+          </a:prstGeom>
+          <a:solidFill>
+            <a:schemeClr val="tx1">
+              <a:lumMod val="85000"/>
+            </a:schemeClr>
+          </a:solidFill>
+          <a:ln w="3175">
+            <a:solidFill>
+              <a:schemeClr val="bg1"/>
+            </a:solidFill>
+          </a:ln>
+        </p:spPr>
+        <p:style>
+          <a:lnRef idx="2">
+            <a:schemeClr val="accent1">
+              <a:shade val="50000"/>
+            </a:schemeClr>
+          </a:lnRef>
+          <a:fillRef idx="1">
+            <a:schemeClr val="accent1"/>
+          </a:fillRef>
+          <a:effectRef idx="0">
+            <a:schemeClr val="accent1"/>
+          </a:effectRef>
+          <a:fontRef idx="minor">
+            <a:schemeClr val="lt1"/>
+          </a:fontRef>
+        </p:style>
+        <p:txBody>
+          <a:bodyPr rtlCol="0" anchor="ctr"/>
+          <a:lstStyle/>
+          <a:p>
+            <a:pPr algn="ctr"/>
+            <a:r>
+              <a:rPr lang="en-US" altLang="ko-KR" sz="800" dirty="0" smtClean="0">
+                <a:solidFill>
+                  <a:schemeClr val="bg1"/>
+                </a:solidFill>
+              </a:rPr>
+              <a:t>Rule Manager</a:t>
+            </a:r>
+            <a:endParaRPr lang="ko-KR" altLang="en-US" sz="800" dirty="0">
+              <a:solidFill>
+                <a:schemeClr val="bg1"/>
+              </a:solidFill>
+            </a:endParaRPr>
+          </a:p>
+        </p:txBody>
+      </p:sp>
+      <p:sp>
+        <p:nvSpPr>
+          <p:cNvPr id="289" name="직사각형 288"/>
+          <p:cNvSpPr/>
+          <p:nvPr/>
+        </p:nvSpPr>
+        <p:spPr>
+          <a:xfrm>
+            <a:off x="5100808" y="2492896"/>
+            <a:ext cx="1811451" cy="288032"/>
+          </a:xfrm>
+          <a:prstGeom prst="rect">
+            <a:avLst/>
+          </a:prstGeom>
+          <a:solidFill>
+            <a:schemeClr val="tx1">
+              <a:lumMod val="85000"/>
+            </a:schemeClr>
+          </a:solidFill>
+          <a:ln w="6350">
+            <a:solidFill>
+              <a:schemeClr val="bg1"/>
+            </a:solidFill>
+          </a:ln>
+        </p:spPr>
+        <p:style>
+          <a:lnRef idx="2">
+            <a:schemeClr val="accent1">
+              <a:shade val="50000"/>
+            </a:schemeClr>
+          </a:lnRef>
+          <a:fillRef idx="1">
+            <a:schemeClr val="accent1"/>
+          </a:fillRef>
+          <a:effectRef idx="0">
+            <a:schemeClr val="accent1"/>
+          </a:effectRef>
+          <a:fontRef idx="minor">
+            <a:schemeClr val="lt1"/>
+          </a:fontRef>
+        </p:style>
+        <p:txBody>
+          <a:bodyPr rtlCol="0" anchor="ctr"/>
+          <a:lstStyle/>
+          <a:p>
+            <a:pPr algn="ctr"/>
+            <a:r>
+              <a:rPr lang="en-US" altLang="ko-KR" sz="800" dirty="0" err="1" smtClean="0">
+                <a:solidFill>
+                  <a:schemeClr val="bg1"/>
+                </a:solidFill>
+              </a:rPr>
+              <a:t>RuleManager</a:t>
+            </a:r>
+            <a:endParaRPr lang="en-US" altLang="ko-KR" sz="800" dirty="0" smtClean="0">
+              <a:solidFill>
+                <a:schemeClr val="bg1"/>
+              </a:solidFill>
+            </a:endParaRPr>
+          </a:p>
+          <a:p>
+            <a:pPr algn="ctr"/>
+            <a:r>
+              <a:rPr lang="en-US" altLang="ko-KR" sz="800" dirty="0" smtClean="0">
+                <a:solidFill>
+                  <a:schemeClr val="bg1"/>
+                </a:solidFill>
+              </a:rPr>
+              <a:t>Event Receiver</a:t>
+            </a:r>
+            <a:endParaRPr lang="ko-KR" altLang="en-US" sz="800" dirty="0">
+              <a:solidFill>
+                <a:schemeClr val="bg1"/>
+              </a:solidFill>
+            </a:endParaRPr>
+          </a:p>
+        </p:txBody>
+      </p:sp>
+      <p:cxnSp>
+        <p:nvCxnSpPr>
+          <p:cNvPr id="291" name="직선 연결선 290"/>
+          <p:cNvCxnSpPr/>
+          <p:nvPr/>
+        </p:nvCxnSpPr>
+        <p:spPr>
+          <a:xfrm>
+            <a:off x="5820878" y="2299799"/>
+            <a:ext cx="402618" cy="0"/>
+          </a:xfrm>
+          <a:prstGeom prst="line">
+            <a:avLst/>
+          </a:prstGeom>
+          <a:ln>
+            <a:solidFill>
+              <a:schemeClr val="bg1"/>
+            </a:solidFill>
+          </a:ln>
+        </p:spPr>
+        <p:style>
+          <a:lnRef idx="1">
+            <a:schemeClr val="accent1"/>
+          </a:lnRef>
+          <a:fillRef idx="0">
+            <a:schemeClr val="accent1"/>
+          </a:fillRef>
+          <a:effectRef idx="0">
+            <a:schemeClr val="accent1"/>
+          </a:effectRef>
+          <a:fontRef idx="minor">
+            <a:schemeClr val="tx1"/>
+          </a:fontRef>
+        </p:style>
+      </p:cxnSp>
+      <p:cxnSp>
+        <p:nvCxnSpPr>
+          <p:cNvPr id="292" name="직선 연결선 291"/>
+          <p:cNvCxnSpPr/>
+          <p:nvPr/>
+        </p:nvCxnSpPr>
+        <p:spPr>
+          <a:xfrm>
+            <a:off x="5815656" y="2433716"/>
+            <a:ext cx="402466" cy="0"/>
+          </a:xfrm>
+          <a:prstGeom prst="line">
+            <a:avLst/>
+          </a:prstGeom>
+          <a:ln>
+            <a:solidFill>
+              <a:schemeClr val="bg1"/>
+            </a:solidFill>
+          </a:ln>
+        </p:spPr>
+        <p:style>
+          <a:lnRef idx="1">
+            <a:schemeClr val="accent1"/>
+          </a:lnRef>
+          <a:fillRef idx="0">
+            <a:schemeClr val="accent1"/>
+          </a:fillRef>
+          <a:effectRef idx="0">
+            <a:schemeClr val="accent1"/>
+          </a:effectRef>
+          <a:fontRef idx="minor">
+            <a:schemeClr val="tx1"/>
+          </a:fontRef>
+        </p:style>
+      </p:cxnSp>
+      <p:cxnSp>
+        <p:nvCxnSpPr>
+          <p:cNvPr id="295" name="직선 연결선 294"/>
+          <p:cNvCxnSpPr/>
+          <p:nvPr/>
+        </p:nvCxnSpPr>
+        <p:spPr>
+          <a:xfrm>
+            <a:off x="5887736" y="2299799"/>
+            <a:ext cx="0" cy="133917"/>
+          </a:xfrm>
+          <a:prstGeom prst="line">
+            <a:avLst/>
+          </a:prstGeom>
+          <a:ln>
+            <a:solidFill>
+              <a:schemeClr val="bg1"/>
+            </a:solidFill>
+          </a:ln>
+        </p:spPr>
+        <p:style>
+          <a:lnRef idx="1">
+            <a:schemeClr val="accent1"/>
+          </a:lnRef>
+          <a:fillRef idx="0">
+            <a:schemeClr val="accent1"/>
+          </a:fillRef>
+          <a:effectRef idx="0">
+            <a:schemeClr val="accent1"/>
+          </a:effectRef>
+          <a:fontRef idx="minor">
+            <a:schemeClr val="tx1"/>
+          </a:fontRef>
+        </p:style>
+      </p:cxnSp>
+      <p:cxnSp>
+        <p:nvCxnSpPr>
+          <p:cNvPr id="296" name="직선 연결선 295"/>
+          <p:cNvCxnSpPr/>
+          <p:nvPr/>
+        </p:nvCxnSpPr>
+        <p:spPr>
+          <a:xfrm>
+            <a:off x="6062886" y="2292580"/>
+            <a:ext cx="0" cy="133917"/>
+          </a:xfrm>
+          <a:prstGeom prst="line">
+            <a:avLst/>
+          </a:prstGeom>
+          <a:ln>
+            <a:solidFill>
+              <a:schemeClr val="bg1"/>
+            </a:solidFill>
+          </a:ln>
+        </p:spPr>
+        <p:style>
+          <a:lnRef idx="1">
+            <a:schemeClr val="accent1"/>
+          </a:lnRef>
+          <a:fillRef idx="0">
+            <a:schemeClr val="accent1"/>
+          </a:fillRef>
+          <a:effectRef idx="0">
+            <a:schemeClr val="accent1"/>
+          </a:effectRef>
+          <a:fontRef idx="minor">
+            <a:schemeClr val="tx1"/>
+          </a:fontRef>
+        </p:style>
+      </p:cxnSp>
+      <p:cxnSp>
+        <p:nvCxnSpPr>
+          <p:cNvPr id="299" name="직선 연결선 298"/>
+          <p:cNvCxnSpPr/>
+          <p:nvPr/>
+        </p:nvCxnSpPr>
+        <p:spPr>
+          <a:xfrm>
+            <a:off x="6146114" y="2288091"/>
+            <a:ext cx="0" cy="133917"/>
+          </a:xfrm>
+          <a:prstGeom prst="line">
+            <a:avLst/>
+          </a:prstGeom>
+          <a:ln>
+            <a:solidFill>
+              <a:schemeClr val="bg1"/>
+            </a:solidFill>
+          </a:ln>
+        </p:spPr>
+        <p:style>
+          <a:lnRef idx="1">
+            <a:schemeClr val="accent1"/>
+          </a:lnRef>
+          <a:fillRef idx="0">
+            <a:schemeClr val="accent1"/>
+          </a:fillRef>
+          <a:effectRef idx="0">
+            <a:schemeClr val="accent1"/>
+          </a:effectRef>
+          <a:fontRef idx="minor">
+            <a:schemeClr val="tx1"/>
+          </a:fontRef>
+        </p:style>
+      </p:cxnSp>
+      <p:cxnSp>
+        <p:nvCxnSpPr>
+          <p:cNvPr id="300" name="직선 연결선 299"/>
+          <p:cNvCxnSpPr/>
+          <p:nvPr/>
+        </p:nvCxnSpPr>
+        <p:spPr>
+          <a:xfrm>
+            <a:off x="5974048" y="2299799"/>
+            <a:ext cx="0" cy="122209"/>
+          </a:xfrm>
+          <a:prstGeom prst="line">
+            <a:avLst/>
+          </a:prstGeom>
+          <a:ln>
+            <a:solidFill>
+              <a:schemeClr val="bg1"/>
+            </a:solidFill>
+          </a:ln>
+        </p:spPr>
+        <p:style>
+          <a:lnRef idx="1">
+            <a:schemeClr val="accent1"/>
+          </a:lnRef>
+          <a:fillRef idx="0">
+            <a:schemeClr val="accent1"/>
+          </a:fillRef>
+          <a:effectRef idx="0">
+            <a:schemeClr val="accent1"/>
+          </a:effectRef>
+          <a:fontRef idx="minor">
+            <a:schemeClr val="tx1"/>
+          </a:fontRef>
+        </p:style>
+      </p:cxnSp>
+      <p:cxnSp>
+        <p:nvCxnSpPr>
+          <p:cNvPr id="301" name="꺾인 연결선 300"/>
+          <p:cNvCxnSpPr/>
+          <p:nvPr/>
+        </p:nvCxnSpPr>
+        <p:spPr>
+          <a:xfrm rot="5400000" flipH="1" flipV="1">
+            <a:off x="5937331" y="2495700"/>
+            <a:ext cx="138406" cy="1"/>
+          </a:xfrm>
+          <a:prstGeom prst="bentConnector3">
+            <a:avLst>
+              <a:gd name="adj1" fmla="val 50000"/>
+            </a:avLst>
+          </a:prstGeom>
+          <a:ln>
+            <a:tailEnd type="triangle" w="sm" len="sm"/>
+          </a:ln>
+        </p:spPr>
+        <p:style>
+          <a:lnRef idx="1">
+            <a:schemeClr val="accent1"/>
+          </a:lnRef>
+          <a:fillRef idx="0">
+            <a:schemeClr val="accent1"/>
+          </a:fillRef>
+          <a:effectRef idx="0">
+            <a:schemeClr val="accent1"/>
+          </a:effectRef>
+          <a:fontRef idx="minor">
+            <a:schemeClr val="tx1"/>
+          </a:fontRef>
+        </p:style>
+      </p:cxnSp>
+      <p:sp>
+        <p:nvSpPr>
+          <p:cNvPr id="302" name="직사각형 301"/>
+          <p:cNvSpPr/>
+          <p:nvPr/>
+        </p:nvSpPr>
+        <p:spPr>
+          <a:xfrm>
+            <a:off x="6826060" y="1340768"/>
+            <a:ext cx="144016" cy="108012"/>
+          </a:xfrm>
+          <a:prstGeom prst="rect">
+            <a:avLst/>
+          </a:prstGeom>
+          <a:noFill/>
+          <a:ln>
+            <a:noFill/>
+          </a:ln>
+        </p:spPr>
+        <p:style>
+          <a:lnRef idx="2">
+            <a:schemeClr val="accent1">
+              <a:shade val="50000"/>
+            </a:schemeClr>
+          </a:lnRef>
+          <a:fillRef idx="1">
+            <a:schemeClr val="accent1"/>
+          </a:fillRef>
+          <a:effectRef idx="0">
+            <a:schemeClr val="accent1"/>
+          </a:effectRef>
+          <a:fontRef idx="minor">
+            <a:schemeClr val="lt1"/>
+          </a:fontRef>
+        </p:style>
+        <p:txBody>
+          <a:bodyPr rtlCol="0" anchor="ctr"/>
+          <a:lstStyle/>
+          <a:p>
+            <a:pPr algn="ctr"/>
+            <a:endParaRPr lang="ko-KR" altLang="en-US"/>
+          </a:p>
+        </p:txBody>
+      </p:sp>
+      <p:cxnSp>
+        <p:nvCxnSpPr>
+          <p:cNvPr id="303" name="꺾인 연결선 302"/>
+          <p:cNvCxnSpPr>
+            <a:stCxn id="313" idx="1"/>
+            <a:endCxn id="304" idx="1"/>
+          </p:cNvCxnSpPr>
+          <p:nvPr/>
+        </p:nvCxnSpPr>
+        <p:spPr>
+          <a:xfrm rot="10800000" flipH="1">
+            <a:off x="5062847" y="1161123"/>
+            <a:ext cx="187497" cy="584691"/>
+          </a:xfrm>
+          <a:prstGeom prst="bentConnector3">
+            <a:avLst>
+              <a:gd name="adj1" fmla="val -121922"/>
+            </a:avLst>
+          </a:prstGeom>
+          <a:ln>
+            <a:solidFill>
+              <a:srgbClr val="7030A0"/>
+            </a:solidFill>
+            <a:headEnd type="oval" w="sm" len="sm"/>
+            <a:tailEnd type="triangle" w="sm" len="sm"/>
+          </a:ln>
+        </p:spPr>
+        <p:style>
+          <a:lnRef idx="1">
+            <a:schemeClr val="accent1"/>
+          </a:lnRef>
+          <a:fillRef idx="0">
+            <a:schemeClr val="accent1"/>
+          </a:fillRef>
+          <a:effectRef idx="0">
+            <a:schemeClr val="accent1"/>
+          </a:effectRef>
+          <a:fontRef idx="minor">
+            <a:schemeClr val="tx1"/>
+          </a:fontRef>
+        </p:style>
+      </p:cxnSp>
+      <p:sp>
+        <p:nvSpPr>
+          <p:cNvPr id="304" name="직사각형 303"/>
+          <p:cNvSpPr/>
+          <p:nvPr/>
+        </p:nvSpPr>
+        <p:spPr>
+          <a:xfrm>
+            <a:off x="5250345" y="1107261"/>
+            <a:ext cx="72008" cy="107722"/>
+          </a:xfrm>
+          <a:prstGeom prst="rect">
+            <a:avLst/>
+          </a:prstGeom>
+        </p:spPr>
+        <p:style>
+          <a:lnRef idx="2">
+            <a:schemeClr val="accent1">
+              <a:shade val="50000"/>
+            </a:schemeClr>
+          </a:lnRef>
+          <a:fillRef idx="1">
+            <a:schemeClr val="accent1"/>
+          </a:fillRef>
+          <a:effectRef idx="0">
+            <a:schemeClr val="accent1"/>
+          </a:effectRef>
+          <a:fontRef idx="minor">
+            <a:schemeClr val="lt1"/>
+          </a:fontRef>
+        </p:style>
+        <p:txBody>
+          <a:bodyPr rtlCol="0" anchor="ctr"/>
+          <a:lstStyle/>
+          <a:p>
+            <a:pPr algn="ctr"/>
+            <a:endParaRPr lang="ko-KR" altLang="en-US"/>
+          </a:p>
+        </p:txBody>
+      </p:sp>
+      <p:cxnSp>
+        <p:nvCxnSpPr>
+          <p:cNvPr id="305" name="꺾인 연결선 409"/>
+          <p:cNvCxnSpPr>
+            <a:endCxn id="313" idx="0"/>
+          </p:cNvCxnSpPr>
+          <p:nvPr/>
+        </p:nvCxnSpPr>
+        <p:spPr>
+          <a:xfrm rot="16200000" flipH="1">
+            <a:off x="5112015" y="1354914"/>
+            <a:ext cx="385191" cy="162580"/>
+          </a:xfrm>
+          <a:prstGeom prst="bentConnector3">
+            <a:avLst>
+              <a:gd name="adj1" fmla="val 50000"/>
+            </a:avLst>
+          </a:prstGeom>
+          <a:ln>
+            <a:solidFill>
+              <a:srgbClr val="7030A0"/>
+            </a:solidFill>
+            <a:headEnd type="oval" w="sm" len="sm"/>
+            <a:tailEnd type="triangle" w="sm" len="sm"/>
+          </a:ln>
+        </p:spPr>
+        <p:style>
+          <a:lnRef idx="1">
+            <a:schemeClr val="accent1"/>
+          </a:lnRef>
+          <a:fillRef idx="0">
+            <a:schemeClr val="accent1"/>
+          </a:fillRef>
+          <a:effectRef idx="0">
+            <a:schemeClr val="accent1"/>
+          </a:effectRef>
+          <a:fontRef idx="minor">
+            <a:schemeClr val="tx1"/>
+          </a:fontRef>
+        </p:style>
+      </p:cxnSp>
+      <p:sp>
+        <p:nvSpPr>
+          <p:cNvPr id="306" name="TextBox 305"/>
+          <p:cNvSpPr txBox="1"/>
+          <p:nvPr/>
+        </p:nvSpPr>
+        <p:spPr>
+          <a:xfrm rot="16200000">
+            <a:off x="4365267" y="1350059"/>
+            <a:ext cx="774086" cy="215444"/>
+          </a:xfrm>
+          <a:prstGeom prst="rect">
+            <a:avLst/>
+          </a:prstGeom>
+          <a:noFill/>
+        </p:spPr>
+        <p:txBody>
+          <a:bodyPr wrap="square" rtlCol="0">
+            <a:spAutoFit/>
+          </a:bodyPr>
+          <a:lstStyle/>
+          <a:p>
+            <a:r>
+              <a:rPr lang="en-US" altLang="ko-KR" sz="800" dirty="0" smtClean="0">
+                <a:solidFill>
+                  <a:schemeClr val="bg1"/>
+                </a:solidFill>
+              </a:rPr>
+              <a:t>save </a:t>
+            </a:r>
+            <a:r>
+              <a:rPr lang="en-US" altLang="ko-KR" sz="800" dirty="0" err="1" smtClean="0">
+                <a:solidFill>
+                  <a:schemeClr val="bg1"/>
+                </a:solidFill>
+              </a:rPr>
+              <a:t>config</a:t>
+            </a:r>
+            <a:r>
+              <a:rPr lang="en-US" altLang="ko-KR" sz="800" dirty="0" smtClean="0">
+                <a:solidFill>
+                  <a:schemeClr val="bg1"/>
+                </a:solidFill>
+              </a:rPr>
+              <a:t> </a:t>
+            </a:r>
+          </a:p>
+        </p:txBody>
+      </p:sp>
+      <p:sp>
+        <p:nvSpPr>
+          <p:cNvPr id="308" name="TextBox 307"/>
+          <p:cNvSpPr txBox="1"/>
+          <p:nvPr/>
+        </p:nvSpPr>
+        <p:spPr>
+          <a:xfrm>
+            <a:off x="4881844" y="1413356"/>
+            <a:ext cx="774086" cy="215444"/>
+          </a:xfrm>
+          <a:prstGeom prst="rect">
+            <a:avLst/>
+          </a:prstGeom>
+          <a:noFill/>
+        </p:spPr>
+        <p:txBody>
+          <a:bodyPr wrap="square" rtlCol="0">
+            <a:spAutoFit/>
+          </a:bodyPr>
+          <a:lstStyle/>
+          <a:p>
+            <a:r>
+              <a:rPr lang="en-US" altLang="ko-KR" sz="800" dirty="0" smtClean="0">
+                <a:solidFill>
+                  <a:schemeClr val="bg1"/>
+                </a:solidFill>
+              </a:rPr>
+              <a:t>load </a:t>
+            </a:r>
+            <a:r>
+              <a:rPr lang="en-US" altLang="ko-KR" sz="800" dirty="0" err="1" smtClean="0">
+                <a:solidFill>
+                  <a:schemeClr val="bg1"/>
+                </a:solidFill>
+              </a:rPr>
+              <a:t>config</a:t>
+            </a:r>
+            <a:r>
+              <a:rPr lang="en-US" altLang="ko-KR" sz="800" dirty="0" smtClean="0">
+                <a:solidFill>
+                  <a:schemeClr val="bg1"/>
+                </a:solidFill>
+              </a:rPr>
+              <a:t> </a:t>
+            </a:r>
+          </a:p>
+        </p:txBody>
+      </p:sp>
+      <p:sp>
+        <p:nvSpPr>
+          <p:cNvPr id="309" name="원통 308"/>
+          <p:cNvSpPr/>
+          <p:nvPr/>
+        </p:nvSpPr>
+        <p:spPr>
+          <a:xfrm>
+            <a:off x="5231597" y="1048103"/>
+            <a:ext cx="1012049" cy="364657"/>
+          </a:xfrm>
+          <a:prstGeom prst="can">
+            <a:avLst/>
+          </a:prstGeom>
+          <a:solidFill>
+            <a:schemeClr val="tx1">
+              <a:lumMod val="85000"/>
+            </a:schemeClr>
+          </a:solidFill>
+          <a:ln w="6350">
+            <a:solidFill>
+              <a:schemeClr val="bg1"/>
+            </a:solidFill>
+          </a:ln>
+        </p:spPr>
+        <p:style>
+          <a:lnRef idx="2">
+            <a:schemeClr val="accent1">
+              <a:shade val="50000"/>
+            </a:schemeClr>
+          </a:lnRef>
+          <a:fillRef idx="1">
+            <a:schemeClr val="accent1"/>
+          </a:fillRef>
+          <a:effectRef idx="0">
+            <a:schemeClr val="accent1"/>
+          </a:effectRef>
+          <a:fontRef idx="minor">
+            <a:schemeClr val="lt1"/>
+          </a:fontRef>
+        </p:style>
+        <p:txBody>
+          <a:bodyPr rtlCol="0" anchor="ctr"/>
+          <a:lstStyle/>
+          <a:p>
+            <a:pPr algn="ctr"/>
+            <a:r>
+              <a:rPr lang="en-US" altLang="ko-KR" sz="800" dirty="0" err="1" smtClean="0">
+                <a:solidFill>
+                  <a:schemeClr val="bg1"/>
+                </a:solidFill>
+              </a:rPr>
+              <a:t>RuleManager</a:t>
+            </a:r>
+            <a:endParaRPr lang="en-US" altLang="ko-KR" sz="800" dirty="0" smtClean="0">
+              <a:solidFill>
+                <a:schemeClr val="bg1"/>
+              </a:solidFill>
+            </a:endParaRPr>
+          </a:p>
+          <a:p>
+            <a:pPr algn="ctr"/>
+            <a:r>
+              <a:rPr lang="en-US" altLang="ko-KR" sz="800" dirty="0" smtClean="0">
+                <a:solidFill>
+                  <a:schemeClr val="bg1"/>
+                </a:solidFill>
+              </a:rPr>
+              <a:t>DB</a:t>
+            </a:r>
+            <a:endParaRPr lang="ko-KR" altLang="en-US" sz="800" dirty="0">
+              <a:solidFill>
+                <a:schemeClr val="bg1"/>
+              </a:solidFill>
+            </a:endParaRPr>
+          </a:p>
+        </p:txBody>
+      </p:sp>
+      <p:cxnSp>
+        <p:nvCxnSpPr>
+          <p:cNvPr id="310" name="꺾인 연결선 309"/>
+          <p:cNvCxnSpPr>
+            <a:endCxn id="286" idx="4"/>
+          </p:cNvCxnSpPr>
+          <p:nvPr/>
+        </p:nvCxnSpPr>
+        <p:spPr>
+          <a:xfrm rot="5400000" flipH="1" flipV="1">
+            <a:off x="6179677" y="2255507"/>
+            <a:ext cx="88586" cy="1"/>
+          </a:xfrm>
+          <a:prstGeom prst="bentConnector3">
+            <a:avLst>
+              <a:gd name="adj1" fmla="val 50000"/>
+            </a:avLst>
+          </a:prstGeom>
+          <a:ln>
+            <a:tailEnd type="triangle" w="sm" len="sm"/>
+          </a:ln>
+        </p:spPr>
+        <p:style>
+          <a:lnRef idx="1">
+            <a:schemeClr val="accent1"/>
+          </a:lnRef>
+          <a:fillRef idx="0">
+            <a:schemeClr val="accent1"/>
+          </a:fillRef>
+          <a:effectRef idx="0">
+            <a:schemeClr val="accent1"/>
+          </a:effectRef>
+          <a:fontRef idx="minor">
+            <a:schemeClr val="tx1"/>
+          </a:fontRef>
+        </p:style>
+      </p:cxnSp>
+      <p:cxnSp>
+        <p:nvCxnSpPr>
+          <p:cNvPr id="312" name="꺾인 연결선 425"/>
+          <p:cNvCxnSpPr>
+            <a:endCxn id="309" idx="4"/>
+          </p:cNvCxnSpPr>
+          <p:nvPr/>
+        </p:nvCxnSpPr>
+        <p:spPr>
+          <a:xfrm rot="10800000">
+            <a:off x="6243647" y="1230432"/>
+            <a:ext cx="492405" cy="423444"/>
+          </a:xfrm>
+          <a:prstGeom prst="bentConnector3">
+            <a:avLst>
+              <a:gd name="adj1" fmla="val -128"/>
+            </a:avLst>
+          </a:prstGeom>
+          <a:ln>
+            <a:solidFill>
+              <a:srgbClr val="7030A0"/>
+            </a:solidFill>
+            <a:headEnd type="oval" w="sm" len="sm"/>
+            <a:tailEnd type="triangle" w="sm" len="sm"/>
+          </a:ln>
+        </p:spPr>
+        <p:style>
+          <a:lnRef idx="1">
+            <a:schemeClr val="accent1"/>
+          </a:lnRef>
+          <a:fillRef idx="0">
+            <a:schemeClr val="accent1"/>
+          </a:fillRef>
+          <a:effectRef idx="0">
+            <a:schemeClr val="accent1"/>
+          </a:effectRef>
+          <a:fontRef idx="minor">
+            <a:schemeClr val="tx1"/>
+          </a:fontRef>
+        </p:style>
+      </p:cxnSp>
+      <p:sp>
+        <p:nvSpPr>
+          <p:cNvPr id="313" name="직사각형 312"/>
+          <p:cNvSpPr/>
+          <p:nvPr/>
+        </p:nvSpPr>
+        <p:spPr>
+          <a:xfrm>
+            <a:off x="5062848" y="1628800"/>
+            <a:ext cx="646103" cy="234026"/>
+          </a:xfrm>
+          <a:prstGeom prst="rect">
+            <a:avLst/>
+          </a:prstGeom>
+          <a:solidFill>
+            <a:schemeClr val="accent6">
+              <a:lumMod val="60000"/>
+              <a:lumOff val="40000"/>
+            </a:schemeClr>
+          </a:solidFill>
+          <a:ln w="6350">
+            <a:solidFill>
+              <a:schemeClr val="bg1"/>
+            </a:solidFill>
+          </a:ln>
+        </p:spPr>
+        <p:style>
+          <a:lnRef idx="2">
+            <a:schemeClr val="accent1">
+              <a:shade val="50000"/>
+            </a:schemeClr>
+          </a:lnRef>
+          <a:fillRef idx="1">
+            <a:schemeClr val="accent1"/>
+          </a:fillRef>
+          <a:effectRef idx="0">
+            <a:schemeClr val="accent1"/>
+          </a:effectRef>
+          <a:fontRef idx="minor">
+            <a:schemeClr val="lt1"/>
+          </a:fontRef>
+        </p:style>
+        <p:txBody>
+          <a:bodyPr rtlCol="0" anchor="ctr"/>
+          <a:lstStyle/>
+          <a:p>
+            <a:pPr algn="ctr"/>
+            <a:r>
+              <a:rPr lang="en-US" altLang="ko-KR" sz="800" dirty="0" err="1" smtClean="0">
+                <a:solidFill>
+                  <a:schemeClr val="bg1"/>
+                </a:solidFill>
+              </a:rPr>
+              <a:t>Config</a:t>
+            </a:r>
+            <a:endParaRPr lang="ko-KR" altLang="en-US" sz="800" dirty="0">
+              <a:solidFill>
+                <a:schemeClr val="bg1"/>
+              </a:solidFill>
+            </a:endParaRPr>
+          </a:p>
+        </p:txBody>
+      </p:sp>
+      <p:sp>
+        <p:nvSpPr>
+          <p:cNvPr id="315" name="직사각형 314"/>
+          <p:cNvSpPr/>
+          <p:nvPr/>
+        </p:nvSpPr>
+        <p:spPr>
+          <a:xfrm>
+            <a:off x="7383464" y="1640020"/>
+            <a:ext cx="630344" cy="216024"/>
+          </a:xfrm>
+          <a:prstGeom prst="rect">
+            <a:avLst/>
+          </a:prstGeom>
+          <a:solidFill>
+            <a:schemeClr val="accent6">
+              <a:lumMod val="60000"/>
+              <a:lumOff val="40000"/>
+            </a:schemeClr>
+          </a:solidFill>
+          <a:ln w="6350">
+            <a:solidFill>
+              <a:schemeClr val="bg1"/>
+            </a:solidFill>
+          </a:ln>
+        </p:spPr>
+        <p:style>
+          <a:lnRef idx="2">
+            <a:schemeClr val="accent1">
+              <a:shade val="50000"/>
+            </a:schemeClr>
+          </a:lnRef>
+          <a:fillRef idx="1">
+            <a:schemeClr val="accent1"/>
+          </a:fillRef>
+          <a:effectRef idx="0">
+            <a:schemeClr val="accent1"/>
+          </a:effectRef>
+          <a:fontRef idx="minor">
+            <a:schemeClr val="lt1"/>
+          </a:fontRef>
+        </p:style>
+        <p:txBody>
+          <a:bodyPr rtlCol="0" anchor="ctr"/>
+          <a:lstStyle/>
+          <a:p>
+            <a:pPr algn="ctr"/>
+            <a:r>
+              <a:rPr lang="en-US" altLang="ko-KR" sz="800" dirty="0" smtClean="0">
+                <a:solidFill>
+                  <a:schemeClr val="bg1"/>
+                </a:solidFill>
+              </a:rPr>
+              <a:t>Action</a:t>
+            </a:r>
+            <a:endParaRPr lang="ko-KR" altLang="en-US" sz="800" dirty="0">
+              <a:solidFill>
+                <a:schemeClr val="bg1"/>
+              </a:solidFill>
+            </a:endParaRPr>
+          </a:p>
+        </p:txBody>
+      </p:sp>
+      <p:cxnSp>
+        <p:nvCxnSpPr>
+          <p:cNvPr id="316" name="꺾인 연결선 425"/>
+          <p:cNvCxnSpPr>
+            <a:stCxn id="315" idx="0"/>
+            <a:endCxn id="212" idx="4"/>
+          </p:cNvCxnSpPr>
+          <p:nvPr/>
+        </p:nvCxnSpPr>
+        <p:spPr>
+          <a:xfrm rot="5400000" flipH="1" flipV="1">
+            <a:off x="7653360" y="1296554"/>
+            <a:ext cx="388743" cy="298190"/>
+          </a:xfrm>
+          <a:prstGeom prst="bentConnector3">
+            <a:avLst>
+              <a:gd name="adj1" fmla="val 50000"/>
+            </a:avLst>
+          </a:prstGeom>
+          <a:ln>
+            <a:solidFill>
+              <a:srgbClr val="7030A0"/>
+            </a:solidFill>
+            <a:headEnd type="oval" w="sm" len="sm"/>
+            <a:tailEnd type="triangle" w="sm" len="sm"/>
+          </a:ln>
+        </p:spPr>
+        <p:style>
+          <a:lnRef idx="1">
+            <a:schemeClr val="accent1"/>
+          </a:lnRef>
+          <a:fillRef idx="0">
+            <a:schemeClr val="accent1"/>
+          </a:fillRef>
+          <a:effectRef idx="0">
+            <a:schemeClr val="accent1"/>
+          </a:effectRef>
+          <a:fontRef idx="minor">
+            <a:schemeClr val="tx1"/>
+          </a:fontRef>
+        </p:style>
+      </p:cxnSp>
+      <p:cxnSp>
+        <p:nvCxnSpPr>
+          <p:cNvPr id="317" name="꺾인 연결선 425"/>
+          <p:cNvCxnSpPr>
+            <a:stCxn id="286" idx="0"/>
+            <a:endCxn id="199" idx="2"/>
+          </p:cNvCxnSpPr>
+          <p:nvPr/>
+        </p:nvCxnSpPr>
+        <p:spPr>
+          <a:xfrm rot="5400000" flipH="1" flipV="1">
+            <a:off x="6303848" y="1781929"/>
+            <a:ext cx="127034" cy="286789"/>
+          </a:xfrm>
+          <a:prstGeom prst="bentConnector3">
+            <a:avLst>
+              <a:gd name="adj1" fmla="val 50000"/>
+            </a:avLst>
+          </a:prstGeom>
+          <a:ln>
+            <a:solidFill>
+              <a:srgbClr val="7030A0"/>
+            </a:solidFill>
+            <a:headEnd type="oval" w="sm" len="sm"/>
+            <a:tailEnd type="triangle" w="sm" len="sm"/>
+          </a:ln>
+        </p:spPr>
+        <p:style>
+          <a:lnRef idx="1">
+            <a:schemeClr val="accent1"/>
+          </a:lnRef>
+          <a:fillRef idx="0">
+            <a:schemeClr val="accent1"/>
+          </a:fillRef>
+          <a:effectRef idx="0">
+            <a:schemeClr val="accent1"/>
+          </a:effectRef>
+          <a:fontRef idx="minor">
+            <a:schemeClr val="tx1"/>
+          </a:fontRef>
+        </p:style>
+      </p:cxnSp>
+      <p:cxnSp>
+        <p:nvCxnSpPr>
+          <p:cNvPr id="318" name="꺾인 연결선 425"/>
+          <p:cNvCxnSpPr>
+            <a:stCxn id="199" idx="1"/>
+            <a:endCxn id="313" idx="3"/>
+          </p:cNvCxnSpPr>
+          <p:nvPr/>
+        </p:nvCxnSpPr>
+        <p:spPr>
+          <a:xfrm rot="10800000" flipV="1">
+            <a:off x="5708952" y="1744353"/>
+            <a:ext cx="457999" cy="1460"/>
+          </a:xfrm>
+          <a:prstGeom prst="bentConnector3">
+            <a:avLst>
+              <a:gd name="adj1" fmla="val 50000"/>
+            </a:avLst>
+          </a:prstGeom>
+          <a:ln>
+            <a:solidFill>
+              <a:srgbClr val="7030A0"/>
+            </a:solidFill>
+            <a:headEnd type="oval" w="sm" len="sm"/>
+            <a:tailEnd type="triangle" w="sm" len="sm"/>
+          </a:ln>
+        </p:spPr>
+        <p:style>
+          <a:lnRef idx="1">
+            <a:schemeClr val="accent1"/>
+          </a:lnRef>
+          <a:fillRef idx="0">
+            <a:schemeClr val="accent1"/>
+          </a:fillRef>
+          <a:effectRef idx="0">
+            <a:schemeClr val="accent1"/>
+          </a:effectRef>
+          <a:fontRef idx="minor">
+            <a:schemeClr val="tx1"/>
+          </a:fontRef>
+        </p:style>
+      </p:cxnSp>
+      <p:cxnSp>
+        <p:nvCxnSpPr>
+          <p:cNvPr id="319" name="꺾인 연결선 425"/>
+          <p:cNvCxnSpPr>
+            <a:stCxn id="199" idx="3"/>
+            <a:endCxn id="315" idx="1"/>
+          </p:cNvCxnSpPr>
+          <p:nvPr/>
+        </p:nvCxnSpPr>
+        <p:spPr>
+          <a:xfrm>
+            <a:off x="6854570" y="1744353"/>
+            <a:ext cx="528894" cy="3679"/>
+          </a:xfrm>
+          <a:prstGeom prst="bentConnector3">
+            <a:avLst>
+              <a:gd name="adj1" fmla="val 50000"/>
+            </a:avLst>
+          </a:prstGeom>
+          <a:ln>
+            <a:solidFill>
+              <a:srgbClr val="7030A0"/>
+            </a:solidFill>
+            <a:headEnd type="oval" w="sm" len="sm"/>
+            <a:tailEnd type="triangle" w="sm" len="sm"/>
+          </a:ln>
+        </p:spPr>
+        <p:style>
+          <a:lnRef idx="1">
+            <a:schemeClr val="accent1"/>
+          </a:lnRef>
+          <a:fillRef idx="0">
+            <a:schemeClr val="accent1"/>
+          </a:fillRef>
+          <a:effectRef idx="0">
+            <a:schemeClr val="accent1"/>
+          </a:effectRef>
+          <a:fontRef idx="minor">
+            <a:schemeClr val="tx1"/>
+          </a:fontRef>
+        </p:style>
+      </p:cxnSp>
     </p:spTree>
     <p:extLst>
       <p:ext uri="{BB962C8B-B14F-4D97-AF65-F5344CB8AC3E}">
-        <p14:creationId xmlns:p14="http://schemas.microsoft.com/office/powerpoint/2010/main" xmlns="" val="1933598799"/>
+        <p14:creationId xmlns:p14="http://schemas.microsoft.com/office/powerpoint/2010/main" val="1933598799"/>
       </p:ext>
     </p:extLst>
   </p:cSld>

</xml_diff>

<commit_message>
Dydamic view - RuleManager
</commit_message>
<xml_diff>
--- a/doc/dynamic view.pptx
+++ b/doc/dynamic view.pptx
@@ -118,7 +118,7 @@
       </p14:sectionLst>
     </p:ext>
     <p:ext uri="{EFAFB233-063F-42B5-8137-9DF3F51BA10A}">
-      <p15:sldGuideLst xmlns="" xmlns:p15="http://schemas.microsoft.com/office/powerpoint/2012/main">
+      <p15:sldGuideLst xmlns:p15="http://schemas.microsoft.com/office/powerpoint/2012/main" xmlns="">
         <p15:guide id="1" orient="horz" pos="527">
           <p15:clr>
             <a:srgbClr val="A4A3A4"/>
@@ -147,7 +147,7 @@
       </p15:sldGuideLst>
     </p:ext>
     <p:ext uri="{2D200454-40CA-4A62-9FC3-DE9A4176ACB9}">
-      <p15:notesGuideLst xmlns="" xmlns:p15="http://schemas.microsoft.com/office/powerpoint/2012/main">
+      <p15:notesGuideLst xmlns:p15="http://schemas.microsoft.com/office/powerpoint/2012/main" xmlns="">
         <p15:guide id="1" orient="horz" pos="2879">
           <p15:clr>
             <a:srgbClr val="A4A3A4"/>
@@ -5701,7 +5701,7 @@
         </p:nvSpPr>
         <p:spPr>
           <a:xfrm>
-            <a:off x="7092280" y="5589820"/>
+            <a:off x="7164288" y="5589820"/>
             <a:ext cx="1296144" cy="215444"/>
           </a:xfrm>
           <a:prstGeom prst="rect">
@@ -8393,7 +8393,7 @@
         </p:nvSpPr>
         <p:spPr>
           <a:xfrm>
-            <a:off x="7529158" y="963245"/>
+            <a:off x="7529158" y="1080444"/>
             <a:ext cx="935336" cy="288032"/>
           </a:xfrm>
           <a:prstGeom prst="ellipse">
@@ -8455,7 +8455,7 @@
         </p:nvSpPr>
         <p:spPr>
           <a:xfrm>
-            <a:off x="7834172" y="1245055"/>
+            <a:off x="7834172" y="1362254"/>
             <a:ext cx="842284" cy="338554"/>
           </a:xfrm>
           <a:prstGeom prst="rect">
@@ -9248,7 +9248,7 @@
         </p:nvSpPr>
         <p:spPr>
           <a:xfrm>
-            <a:off x="8050196" y="1274672"/>
+            <a:off x="8050196" y="1391871"/>
             <a:ext cx="72008" cy="72008"/>
           </a:xfrm>
           <a:prstGeom prst="rect">
@@ -9334,7 +9334,7 @@
         </p:nvSpPr>
         <p:spPr>
           <a:xfrm>
-            <a:off x="6084168" y="914632"/>
+            <a:off x="6660232" y="980728"/>
             <a:ext cx="936104" cy="215444"/>
           </a:xfrm>
           <a:prstGeom prst="rect">
@@ -9367,8 +9367,8 @@
         </p:nvSpPr>
         <p:spPr>
           <a:xfrm>
-            <a:off x="4572000" y="914632"/>
-            <a:ext cx="4031680" cy="1866296"/>
+            <a:off x="4788025" y="1030876"/>
+            <a:ext cx="3815656" cy="1822060"/>
           </a:xfrm>
           <a:prstGeom prst="rect">
             <a:avLst/>
@@ -9839,18 +9839,18 @@
       <p:cxnSp>
         <p:nvCxnSpPr>
           <p:cNvPr id="301" name="꺾인 연결선 300"/>
-          <p:cNvCxnSpPr/>
+          <p:cNvCxnSpPr>
+            <a:endCxn id="8" idx="1"/>
+          </p:cNvCxnSpPr>
           <p:nvPr/>
         </p:nvCxnSpPr>
         <p:spPr>
           <a:xfrm rot="5400000" flipH="1" flipV="1">
-            <a:off x="5937331" y="2495700"/>
-            <a:ext cx="138406" cy="1"/>
-          </a:xfrm>
-          <a:prstGeom prst="bentConnector3">
-            <a:avLst>
-              <a:gd name="adj1" fmla="val 50000"/>
-            </a:avLst>
+            <a:off x="5620063" y="2352508"/>
+            <a:ext cx="147190" cy="146287"/>
+          </a:xfrm>
+          <a:prstGeom prst="bentConnector2">
+            <a:avLst/>
           </a:prstGeom>
           <a:ln>
             <a:tailEnd type="triangle" w="sm" len="sm"/>
@@ -10001,19 +10001,17 @@
         <p:nvCxnSpPr>
           <p:cNvPr id="305" name="꺾인 연결선 409"/>
           <p:cNvCxnSpPr>
-            <a:endCxn id="313" idx="0"/>
+            <a:stCxn id="309" idx="2"/>
           </p:cNvCxnSpPr>
           <p:nvPr/>
         </p:nvCxnSpPr>
         <p:spPr>
-          <a:xfrm rot="16200000" flipH="1">
-            <a:off x="5112015" y="1354914"/>
-            <a:ext cx="385191" cy="162580"/>
-          </a:xfrm>
-          <a:prstGeom prst="bentConnector3">
-            <a:avLst>
-              <a:gd name="adj1" fmla="val 50000"/>
-            </a:avLst>
+          <a:xfrm rot="10800000" flipV="1">
+            <a:off x="5148065" y="1230432"/>
+            <a:ext cx="83533" cy="409588"/>
+          </a:xfrm>
+          <a:prstGeom prst="bentConnector2">
+            <a:avLst/>
           </a:prstGeom>
           <a:ln>
             <a:solidFill>
@@ -10218,19 +10216,17 @@
         <p:nvCxnSpPr>
           <p:cNvPr id="310" name="꺾인 연결선 309"/>
           <p:cNvCxnSpPr>
-            <a:endCxn id="286" idx="4"/>
+            <a:stCxn id="29" idx="3"/>
           </p:cNvCxnSpPr>
           <p:nvPr/>
         </p:nvCxnSpPr>
         <p:spPr>
-          <a:xfrm rot="5400000" flipH="1" flipV="1">
-            <a:off x="6179677" y="2255507"/>
-            <a:ext cx="88586" cy="1"/>
-          </a:xfrm>
-          <a:prstGeom prst="bentConnector3">
-            <a:avLst>
-              <a:gd name="adj1" fmla="val 50000"/>
-            </a:avLst>
+          <a:xfrm flipV="1">
+            <a:off x="6296249" y="2211214"/>
+            <a:ext cx="147959" cy="165544"/>
+          </a:xfrm>
+          <a:prstGeom prst="bentConnector2">
+            <a:avLst/>
           </a:prstGeom>
           <a:ln>
             <a:tailEnd type="triangle" w="sm" len="sm"/>
@@ -10429,8 +10425,8 @@
         </p:nvCxnSpPr>
         <p:spPr>
           <a:xfrm rot="5400000" flipH="1" flipV="1">
-            <a:off x="7653360" y="1296554"/>
-            <a:ext cx="388743" cy="298190"/>
+            <a:off x="7711959" y="1355153"/>
+            <a:ext cx="271544" cy="298190"/>
           </a:xfrm>
           <a:prstGeom prst="bentConnector3">
             <a:avLst>
@@ -10586,6 +10582,782 @@
           </a:fontRef>
         </p:style>
       </p:cxnSp>
+      <p:sp>
+        <p:nvSpPr>
+          <p:cNvPr id="8" name="직사각형 7"/>
+          <p:cNvSpPr/>
+          <p:nvPr/>
+        </p:nvSpPr>
+        <p:spPr>
+          <a:xfrm>
+            <a:off x="5766802" y="2316051"/>
+            <a:ext cx="114362" cy="72009"/>
+          </a:xfrm>
+          <a:prstGeom prst="rect">
+            <a:avLst/>
+          </a:prstGeom>
+          <a:noFill/>
+          <a:ln>
+            <a:noFill/>
+          </a:ln>
+        </p:spPr>
+        <p:style>
+          <a:lnRef idx="2">
+            <a:schemeClr val="accent1">
+              <a:shade val="50000"/>
+            </a:schemeClr>
+          </a:lnRef>
+          <a:fillRef idx="1">
+            <a:schemeClr val="accent1"/>
+          </a:fillRef>
+          <a:effectRef idx="0">
+            <a:schemeClr val="accent1"/>
+          </a:effectRef>
+          <a:fontRef idx="minor">
+            <a:schemeClr val="lt1"/>
+          </a:fontRef>
+        </p:style>
+        <p:txBody>
+          <a:bodyPr rtlCol="0" anchor="ctr"/>
+          <a:lstStyle/>
+          <a:p>
+            <a:pPr algn="ctr"/>
+            <a:endParaRPr lang="ko-KR" altLang="en-US"/>
+          </a:p>
+        </p:txBody>
+      </p:sp>
+      <p:sp>
+        <p:nvSpPr>
+          <p:cNvPr id="29" name="직사각형 28"/>
+          <p:cNvSpPr/>
+          <p:nvPr/>
+        </p:nvSpPr>
+        <p:spPr>
+          <a:xfrm>
+            <a:off x="6188237" y="2332627"/>
+            <a:ext cx="108012" cy="88261"/>
+          </a:xfrm>
+          <a:prstGeom prst="rect">
+            <a:avLst/>
+          </a:prstGeom>
+          <a:noFill/>
+          <a:ln>
+            <a:noFill/>
+          </a:ln>
+        </p:spPr>
+        <p:style>
+          <a:lnRef idx="2">
+            <a:schemeClr val="accent1">
+              <a:shade val="50000"/>
+            </a:schemeClr>
+          </a:lnRef>
+          <a:fillRef idx="1">
+            <a:schemeClr val="accent1"/>
+          </a:fillRef>
+          <a:effectRef idx="0">
+            <a:schemeClr val="accent1"/>
+          </a:effectRef>
+          <a:fontRef idx="minor">
+            <a:schemeClr val="lt1"/>
+          </a:fontRef>
+        </p:style>
+        <p:txBody>
+          <a:bodyPr rtlCol="0" anchor="ctr"/>
+          <a:lstStyle/>
+          <a:p>
+            <a:pPr algn="ctr"/>
+            <a:endParaRPr lang="ko-KR" altLang="en-US"/>
+          </a:p>
+        </p:txBody>
+      </p:sp>
+      <p:sp>
+        <p:nvSpPr>
+          <p:cNvPr id="326" name="직사각형 325"/>
+          <p:cNvSpPr/>
+          <p:nvPr/>
+        </p:nvSpPr>
+        <p:spPr>
+          <a:xfrm>
+            <a:off x="6963318" y="6201597"/>
+            <a:ext cx="72008" cy="72008"/>
+          </a:xfrm>
+          <a:prstGeom prst="rect">
+            <a:avLst/>
+          </a:prstGeom>
+          <a:noFill/>
+          <a:ln>
+            <a:noFill/>
+          </a:ln>
+        </p:spPr>
+        <p:style>
+          <a:lnRef idx="2">
+            <a:schemeClr val="accent1">
+              <a:shade val="50000"/>
+            </a:schemeClr>
+          </a:lnRef>
+          <a:fillRef idx="1">
+            <a:schemeClr val="accent1"/>
+          </a:fillRef>
+          <a:effectRef idx="0">
+            <a:schemeClr val="accent1"/>
+          </a:effectRef>
+          <a:fontRef idx="minor">
+            <a:schemeClr val="lt1"/>
+          </a:fontRef>
+        </p:style>
+        <p:txBody>
+          <a:bodyPr rtlCol="0" anchor="ctr"/>
+          <a:lstStyle/>
+          <a:p>
+            <a:pPr algn="ctr"/>
+            <a:endParaRPr lang="ko-KR" altLang="en-US"/>
+          </a:p>
+        </p:txBody>
+      </p:sp>
+      <p:sp>
+        <p:nvSpPr>
+          <p:cNvPr id="327" name="직사각형 326"/>
+          <p:cNvSpPr/>
+          <p:nvPr/>
+        </p:nvSpPr>
+        <p:spPr>
+          <a:xfrm>
+            <a:off x="6891310" y="6201597"/>
+            <a:ext cx="72008" cy="72008"/>
+          </a:xfrm>
+          <a:prstGeom prst="rect">
+            <a:avLst/>
+          </a:prstGeom>
+          <a:noFill/>
+          <a:ln>
+            <a:noFill/>
+          </a:ln>
+        </p:spPr>
+        <p:style>
+          <a:lnRef idx="2">
+            <a:schemeClr val="accent1">
+              <a:shade val="50000"/>
+            </a:schemeClr>
+          </a:lnRef>
+          <a:fillRef idx="1">
+            <a:schemeClr val="accent1"/>
+          </a:fillRef>
+          <a:effectRef idx="0">
+            <a:schemeClr val="accent1"/>
+          </a:effectRef>
+          <a:fontRef idx="minor">
+            <a:schemeClr val="lt1"/>
+          </a:fontRef>
+        </p:style>
+        <p:txBody>
+          <a:bodyPr rtlCol="0" anchor="ctr"/>
+          <a:lstStyle/>
+          <a:p>
+            <a:pPr algn="ctr"/>
+            <a:endParaRPr lang="ko-KR" altLang="en-US"/>
+          </a:p>
+        </p:txBody>
+      </p:sp>
+      <p:sp>
+        <p:nvSpPr>
+          <p:cNvPr id="328" name="직사각형 327"/>
+          <p:cNvSpPr/>
+          <p:nvPr/>
+        </p:nvSpPr>
+        <p:spPr>
+          <a:xfrm>
+            <a:off x="7539382" y="6201597"/>
+            <a:ext cx="72008" cy="72008"/>
+          </a:xfrm>
+          <a:prstGeom prst="rect">
+            <a:avLst/>
+          </a:prstGeom>
+          <a:noFill/>
+          <a:ln>
+            <a:noFill/>
+          </a:ln>
+        </p:spPr>
+        <p:style>
+          <a:lnRef idx="2">
+            <a:schemeClr val="accent1">
+              <a:shade val="50000"/>
+            </a:schemeClr>
+          </a:lnRef>
+          <a:fillRef idx="1">
+            <a:schemeClr val="accent1"/>
+          </a:fillRef>
+          <a:effectRef idx="0">
+            <a:schemeClr val="accent1"/>
+          </a:effectRef>
+          <a:fontRef idx="minor">
+            <a:schemeClr val="lt1"/>
+          </a:fontRef>
+        </p:style>
+        <p:txBody>
+          <a:bodyPr rtlCol="0" anchor="ctr"/>
+          <a:lstStyle/>
+          <a:p>
+            <a:pPr algn="ctr"/>
+            <a:endParaRPr lang="ko-KR" altLang="en-US"/>
+          </a:p>
+        </p:txBody>
+      </p:sp>
+      <p:sp>
+        <p:nvSpPr>
+          <p:cNvPr id="329" name="직사각형 328"/>
+          <p:cNvSpPr/>
+          <p:nvPr/>
+        </p:nvSpPr>
+        <p:spPr>
+          <a:xfrm>
+            <a:off x="7467374" y="6201597"/>
+            <a:ext cx="72008" cy="72008"/>
+          </a:xfrm>
+          <a:prstGeom prst="rect">
+            <a:avLst/>
+          </a:prstGeom>
+          <a:noFill/>
+          <a:ln>
+            <a:noFill/>
+          </a:ln>
+        </p:spPr>
+        <p:style>
+          <a:lnRef idx="2">
+            <a:schemeClr val="accent1">
+              <a:shade val="50000"/>
+            </a:schemeClr>
+          </a:lnRef>
+          <a:fillRef idx="1">
+            <a:schemeClr val="accent1"/>
+          </a:fillRef>
+          <a:effectRef idx="0">
+            <a:schemeClr val="accent1"/>
+          </a:effectRef>
+          <a:fontRef idx="minor">
+            <a:schemeClr val="lt1"/>
+          </a:fontRef>
+        </p:style>
+        <p:txBody>
+          <a:bodyPr rtlCol="0" anchor="ctr"/>
+          <a:lstStyle/>
+          <a:p>
+            <a:pPr algn="ctr"/>
+            <a:endParaRPr lang="ko-KR" altLang="en-US"/>
+          </a:p>
+        </p:txBody>
+      </p:sp>
+      <p:sp>
+        <p:nvSpPr>
+          <p:cNvPr id="330" name="직사각형 329"/>
+          <p:cNvSpPr/>
+          <p:nvPr/>
+        </p:nvSpPr>
+        <p:spPr>
+          <a:xfrm>
+            <a:off x="8115446" y="6201597"/>
+            <a:ext cx="72008" cy="72008"/>
+          </a:xfrm>
+          <a:prstGeom prst="rect">
+            <a:avLst/>
+          </a:prstGeom>
+          <a:noFill/>
+          <a:ln>
+            <a:noFill/>
+          </a:ln>
+        </p:spPr>
+        <p:style>
+          <a:lnRef idx="2">
+            <a:schemeClr val="accent1">
+              <a:shade val="50000"/>
+            </a:schemeClr>
+          </a:lnRef>
+          <a:fillRef idx="1">
+            <a:schemeClr val="accent1"/>
+          </a:fillRef>
+          <a:effectRef idx="0">
+            <a:schemeClr val="accent1"/>
+          </a:effectRef>
+          <a:fontRef idx="minor">
+            <a:schemeClr val="lt1"/>
+          </a:fontRef>
+        </p:style>
+        <p:txBody>
+          <a:bodyPr rtlCol="0" anchor="ctr"/>
+          <a:lstStyle/>
+          <a:p>
+            <a:pPr algn="ctr"/>
+            <a:endParaRPr lang="ko-KR" altLang="en-US"/>
+          </a:p>
+        </p:txBody>
+      </p:sp>
+      <p:sp>
+        <p:nvSpPr>
+          <p:cNvPr id="331" name="직사각형 330"/>
+          <p:cNvSpPr/>
+          <p:nvPr/>
+        </p:nvSpPr>
+        <p:spPr>
+          <a:xfrm>
+            <a:off x="8043438" y="6201597"/>
+            <a:ext cx="72008" cy="72008"/>
+          </a:xfrm>
+          <a:prstGeom prst="rect">
+            <a:avLst/>
+          </a:prstGeom>
+          <a:noFill/>
+          <a:ln>
+            <a:noFill/>
+          </a:ln>
+        </p:spPr>
+        <p:style>
+          <a:lnRef idx="2">
+            <a:schemeClr val="accent1">
+              <a:shade val="50000"/>
+            </a:schemeClr>
+          </a:lnRef>
+          <a:fillRef idx="1">
+            <a:schemeClr val="accent1"/>
+          </a:fillRef>
+          <a:effectRef idx="0">
+            <a:schemeClr val="accent1"/>
+          </a:effectRef>
+          <a:fontRef idx="minor">
+            <a:schemeClr val="lt1"/>
+          </a:fontRef>
+        </p:style>
+        <p:txBody>
+          <a:bodyPr rtlCol="0" anchor="ctr"/>
+          <a:lstStyle/>
+          <a:p>
+            <a:pPr algn="ctr"/>
+            <a:endParaRPr lang="ko-KR" altLang="en-US"/>
+          </a:p>
+        </p:txBody>
+      </p:sp>
+      <p:sp>
+        <p:nvSpPr>
+          <p:cNvPr id="332" name="직사각형 331"/>
+          <p:cNvSpPr/>
+          <p:nvPr/>
+        </p:nvSpPr>
+        <p:spPr>
+          <a:xfrm>
+            <a:off x="8691510" y="6201597"/>
+            <a:ext cx="72008" cy="72008"/>
+          </a:xfrm>
+          <a:prstGeom prst="rect">
+            <a:avLst/>
+          </a:prstGeom>
+          <a:noFill/>
+          <a:ln>
+            <a:noFill/>
+          </a:ln>
+        </p:spPr>
+        <p:style>
+          <a:lnRef idx="2">
+            <a:schemeClr val="accent1">
+              <a:shade val="50000"/>
+            </a:schemeClr>
+          </a:lnRef>
+          <a:fillRef idx="1">
+            <a:schemeClr val="accent1"/>
+          </a:fillRef>
+          <a:effectRef idx="0">
+            <a:schemeClr val="accent1"/>
+          </a:effectRef>
+          <a:fontRef idx="minor">
+            <a:schemeClr val="lt1"/>
+          </a:fontRef>
+        </p:style>
+        <p:txBody>
+          <a:bodyPr rtlCol="0" anchor="ctr"/>
+          <a:lstStyle/>
+          <a:p>
+            <a:pPr algn="ctr"/>
+            <a:endParaRPr lang="ko-KR" altLang="en-US"/>
+          </a:p>
+        </p:txBody>
+      </p:sp>
+      <p:sp>
+        <p:nvSpPr>
+          <p:cNvPr id="333" name="직사각형 332"/>
+          <p:cNvSpPr/>
+          <p:nvPr/>
+        </p:nvSpPr>
+        <p:spPr>
+          <a:xfrm>
+            <a:off x="8619502" y="6201597"/>
+            <a:ext cx="72008" cy="72008"/>
+          </a:xfrm>
+          <a:prstGeom prst="rect">
+            <a:avLst/>
+          </a:prstGeom>
+          <a:noFill/>
+          <a:ln>
+            <a:noFill/>
+          </a:ln>
+        </p:spPr>
+        <p:style>
+          <a:lnRef idx="2">
+            <a:schemeClr val="accent1">
+              <a:shade val="50000"/>
+            </a:schemeClr>
+          </a:lnRef>
+          <a:fillRef idx="1">
+            <a:schemeClr val="accent1"/>
+          </a:fillRef>
+          <a:effectRef idx="0">
+            <a:schemeClr val="accent1"/>
+          </a:effectRef>
+          <a:fontRef idx="minor">
+            <a:schemeClr val="lt1"/>
+          </a:fontRef>
+        </p:style>
+        <p:txBody>
+          <a:bodyPr rtlCol="0" anchor="ctr"/>
+          <a:lstStyle/>
+          <a:p>
+            <a:pPr algn="ctr"/>
+            <a:endParaRPr lang="ko-KR" altLang="en-US"/>
+          </a:p>
+        </p:txBody>
+      </p:sp>
+      <p:cxnSp>
+        <p:nvCxnSpPr>
+          <p:cNvPr id="334" name="직선 연결선 333"/>
+          <p:cNvCxnSpPr/>
+          <p:nvPr/>
+        </p:nvCxnSpPr>
+        <p:spPr>
+          <a:xfrm>
+            <a:off x="6844044" y="6152517"/>
+            <a:ext cx="402618" cy="0"/>
+          </a:xfrm>
+          <a:prstGeom prst="line">
+            <a:avLst/>
+          </a:prstGeom>
+          <a:ln>
+            <a:solidFill>
+              <a:schemeClr val="bg1"/>
+            </a:solidFill>
+          </a:ln>
+        </p:spPr>
+        <p:style>
+          <a:lnRef idx="1">
+            <a:schemeClr val="accent1"/>
+          </a:lnRef>
+          <a:fillRef idx="0">
+            <a:schemeClr val="accent1"/>
+          </a:fillRef>
+          <a:effectRef idx="0">
+            <a:schemeClr val="accent1"/>
+          </a:effectRef>
+          <a:fontRef idx="minor">
+            <a:schemeClr val="tx1"/>
+          </a:fontRef>
+        </p:style>
+      </p:cxnSp>
+      <p:cxnSp>
+        <p:nvCxnSpPr>
+          <p:cNvPr id="335" name="직선 연결선 334"/>
+          <p:cNvCxnSpPr/>
+          <p:nvPr/>
+        </p:nvCxnSpPr>
+        <p:spPr>
+          <a:xfrm>
+            <a:off x="6838822" y="6286434"/>
+            <a:ext cx="402466" cy="0"/>
+          </a:xfrm>
+          <a:prstGeom prst="line">
+            <a:avLst/>
+          </a:prstGeom>
+          <a:ln>
+            <a:solidFill>
+              <a:schemeClr val="bg1"/>
+            </a:solidFill>
+          </a:ln>
+        </p:spPr>
+        <p:style>
+          <a:lnRef idx="1">
+            <a:schemeClr val="accent1"/>
+          </a:lnRef>
+          <a:fillRef idx="0">
+            <a:schemeClr val="accent1"/>
+          </a:fillRef>
+          <a:effectRef idx="0">
+            <a:schemeClr val="accent1"/>
+          </a:effectRef>
+          <a:fontRef idx="minor">
+            <a:schemeClr val="tx1"/>
+          </a:fontRef>
+        </p:style>
+      </p:cxnSp>
+      <p:cxnSp>
+        <p:nvCxnSpPr>
+          <p:cNvPr id="336" name="직선 연결선 335"/>
+          <p:cNvCxnSpPr/>
+          <p:nvPr/>
+        </p:nvCxnSpPr>
+        <p:spPr>
+          <a:xfrm>
+            <a:off x="6910902" y="6152517"/>
+            <a:ext cx="0" cy="133917"/>
+          </a:xfrm>
+          <a:prstGeom prst="line">
+            <a:avLst/>
+          </a:prstGeom>
+          <a:ln>
+            <a:solidFill>
+              <a:schemeClr val="bg1"/>
+            </a:solidFill>
+          </a:ln>
+        </p:spPr>
+        <p:style>
+          <a:lnRef idx="1">
+            <a:schemeClr val="accent1"/>
+          </a:lnRef>
+          <a:fillRef idx="0">
+            <a:schemeClr val="accent1"/>
+          </a:fillRef>
+          <a:effectRef idx="0">
+            <a:schemeClr val="accent1"/>
+          </a:effectRef>
+          <a:fontRef idx="minor">
+            <a:schemeClr val="tx1"/>
+          </a:fontRef>
+        </p:style>
+      </p:cxnSp>
+      <p:cxnSp>
+        <p:nvCxnSpPr>
+          <p:cNvPr id="338" name="직선 연결선 337"/>
+          <p:cNvCxnSpPr/>
+          <p:nvPr/>
+        </p:nvCxnSpPr>
+        <p:spPr>
+          <a:xfrm>
+            <a:off x="7086052" y="6145298"/>
+            <a:ext cx="0" cy="133917"/>
+          </a:xfrm>
+          <a:prstGeom prst="line">
+            <a:avLst/>
+          </a:prstGeom>
+          <a:ln>
+            <a:solidFill>
+              <a:schemeClr val="bg1"/>
+            </a:solidFill>
+          </a:ln>
+        </p:spPr>
+        <p:style>
+          <a:lnRef idx="1">
+            <a:schemeClr val="accent1"/>
+          </a:lnRef>
+          <a:fillRef idx="0">
+            <a:schemeClr val="accent1"/>
+          </a:fillRef>
+          <a:effectRef idx="0">
+            <a:schemeClr val="accent1"/>
+          </a:effectRef>
+          <a:fontRef idx="minor">
+            <a:schemeClr val="tx1"/>
+          </a:fontRef>
+        </p:style>
+      </p:cxnSp>
+      <p:cxnSp>
+        <p:nvCxnSpPr>
+          <p:cNvPr id="340" name="직선 연결선 339"/>
+          <p:cNvCxnSpPr/>
+          <p:nvPr/>
+        </p:nvCxnSpPr>
+        <p:spPr>
+          <a:xfrm>
+            <a:off x="7169280" y="6140809"/>
+            <a:ext cx="0" cy="133917"/>
+          </a:xfrm>
+          <a:prstGeom prst="line">
+            <a:avLst/>
+          </a:prstGeom>
+          <a:ln>
+            <a:solidFill>
+              <a:schemeClr val="bg1"/>
+            </a:solidFill>
+          </a:ln>
+        </p:spPr>
+        <p:style>
+          <a:lnRef idx="1">
+            <a:schemeClr val="accent1"/>
+          </a:lnRef>
+          <a:fillRef idx="0">
+            <a:schemeClr val="accent1"/>
+          </a:fillRef>
+          <a:effectRef idx="0">
+            <a:schemeClr val="accent1"/>
+          </a:effectRef>
+          <a:fontRef idx="minor">
+            <a:schemeClr val="tx1"/>
+          </a:fontRef>
+        </p:style>
+      </p:cxnSp>
+      <p:cxnSp>
+        <p:nvCxnSpPr>
+          <p:cNvPr id="350" name="직선 연결선 349"/>
+          <p:cNvCxnSpPr/>
+          <p:nvPr/>
+        </p:nvCxnSpPr>
+        <p:spPr>
+          <a:xfrm>
+            <a:off x="6997214" y="6152517"/>
+            <a:ext cx="0" cy="122209"/>
+          </a:xfrm>
+          <a:prstGeom prst="line">
+            <a:avLst/>
+          </a:prstGeom>
+          <a:ln>
+            <a:solidFill>
+              <a:schemeClr val="bg1"/>
+            </a:solidFill>
+          </a:ln>
+        </p:spPr>
+        <p:style>
+          <a:lnRef idx="1">
+            <a:schemeClr val="accent1"/>
+          </a:lnRef>
+          <a:fillRef idx="0">
+            <a:schemeClr val="accent1"/>
+          </a:fillRef>
+          <a:effectRef idx="0">
+            <a:schemeClr val="accent1"/>
+          </a:effectRef>
+          <a:fontRef idx="minor">
+            <a:schemeClr val="tx1"/>
+          </a:fontRef>
+        </p:style>
+      </p:cxnSp>
+      <p:sp>
+        <p:nvSpPr>
+          <p:cNvPr id="353" name="직사각형 352"/>
+          <p:cNvSpPr/>
+          <p:nvPr/>
+        </p:nvSpPr>
+        <p:spPr>
+          <a:xfrm>
+            <a:off x="6789968" y="6168769"/>
+            <a:ext cx="114362" cy="72009"/>
+          </a:xfrm>
+          <a:prstGeom prst="rect">
+            <a:avLst/>
+          </a:prstGeom>
+          <a:noFill/>
+          <a:ln>
+            <a:noFill/>
+          </a:ln>
+        </p:spPr>
+        <p:style>
+          <a:lnRef idx="2">
+            <a:schemeClr val="accent1">
+              <a:shade val="50000"/>
+            </a:schemeClr>
+          </a:lnRef>
+          <a:fillRef idx="1">
+            <a:schemeClr val="accent1"/>
+          </a:fillRef>
+          <a:effectRef idx="0">
+            <a:schemeClr val="accent1"/>
+          </a:effectRef>
+          <a:fontRef idx="minor">
+            <a:schemeClr val="lt1"/>
+          </a:fontRef>
+        </p:style>
+        <p:txBody>
+          <a:bodyPr rtlCol="0" anchor="ctr"/>
+          <a:lstStyle/>
+          <a:p>
+            <a:pPr algn="ctr"/>
+            <a:endParaRPr lang="ko-KR" altLang="en-US"/>
+          </a:p>
+        </p:txBody>
+      </p:sp>
+      <p:sp>
+        <p:nvSpPr>
+          <p:cNvPr id="354" name="직사각형 353"/>
+          <p:cNvSpPr/>
+          <p:nvPr/>
+        </p:nvSpPr>
+        <p:spPr>
+          <a:xfrm>
+            <a:off x="7211403" y="6185345"/>
+            <a:ext cx="108012" cy="88261"/>
+          </a:xfrm>
+          <a:prstGeom prst="rect">
+            <a:avLst/>
+          </a:prstGeom>
+          <a:noFill/>
+          <a:ln>
+            <a:noFill/>
+          </a:ln>
+        </p:spPr>
+        <p:style>
+          <a:lnRef idx="2">
+            <a:schemeClr val="accent1">
+              <a:shade val="50000"/>
+            </a:schemeClr>
+          </a:lnRef>
+          <a:fillRef idx="1">
+            <a:schemeClr val="accent1"/>
+          </a:fillRef>
+          <a:effectRef idx="0">
+            <a:schemeClr val="accent1"/>
+          </a:effectRef>
+          <a:fontRef idx="minor">
+            <a:schemeClr val="lt1"/>
+          </a:fontRef>
+        </p:style>
+        <p:txBody>
+          <a:bodyPr rtlCol="0" anchor="ctr"/>
+          <a:lstStyle/>
+          <a:p>
+            <a:pPr algn="ctr"/>
+            <a:endParaRPr lang="ko-KR" altLang="en-US"/>
+          </a:p>
+        </p:txBody>
+      </p:sp>
+      <p:sp>
+        <p:nvSpPr>
+          <p:cNvPr id="355" name="TextBox 354"/>
+          <p:cNvSpPr txBox="1"/>
+          <p:nvPr/>
+        </p:nvSpPr>
+        <p:spPr>
+          <a:xfrm>
+            <a:off x="7164288" y="6093296"/>
+            <a:ext cx="1296144" cy="215444"/>
+          </a:xfrm>
+          <a:prstGeom prst="rect">
+            <a:avLst/>
+          </a:prstGeom>
+          <a:noFill/>
+        </p:spPr>
+        <p:txBody>
+          <a:bodyPr wrap="square" rtlCol="0">
+            <a:spAutoFit/>
+          </a:bodyPr>
+          <a:lstStyle/>
+          <a:p>
+            <a:r>
+              <a:rPr lang="en-US" altLang="ko-KR" sz="800" dirty="0" smtClean="0">
+                <a:solidFill>
+                  <a:schemeClr val="bg1"/>
+                </a:solidFill>
+              </a:rPr>
+              <a:t>queue</a:t>
+            </a:r>
+            <a:endParaRPr lang="ko-KR" altLang="en-US" sz="800" dirty="0">
+              <a:solidFill>
+                <a:schemeClr val="bg1"/>
+              </a:solidFill>
+            </a:endParaRPr>
+          </a:p>
+        </p:txBody>
+      </p:sp>
     </p:spTree>
     <p:extLst>
       <p:ext uri="{BB962C8B-B14F-4D97-AF65-F5344CB8AC3E}">

</xml_diff>